<commit_message>
update to guide, code, and presentation
</commit_message>
<xml_diff>
--- a/Slides/Soutenance_Final.pptx
+++ b/Slides/Soutenance_Final.pptx
@@ -5,10 +5,10 @@
     <p:sldMasterId id="2147483648" r:id="rId1"/>
   </p:sldMasterIdLst>
   <p:notesMasterIdLst>
-    <p:notesMasterId r:id="rId15"/>
+    <p:notesMasterId r:id="rId19"/>
   </p:notesMasterIdLst>
   <p:handoutMasterIdLst>
-    <p:handoutMasterId r:id="rId16"/>
+    <p:handoutMasterId r:id="rId20"/>
   </p:handoutMasterIdLst>
   <p:sldIdLst>
     <p:sldId id="274" r:id="rId2"/>
@@ -19,11 +19,15 @@
     <p:sldId id="287" r:id="rId7"/>
     <p:sldId id="271" r:id="rId8"/>
     <p:sldId id="288" r:id="rId9"/>
-    <p:sldId id="278" r:id="rId10"/>
-    <p:sldId id="279" r:id="rId11"/>
-    <p:sldId id="280" r:id="rId12"/>
-    <p:sldId id="281" r:id="rId13"/>
-    <p:sldId id="286" r:id="rId14"/>
+    <p:sldId id="290" r:id="rId10"/>
+    <p:sldId id="291" r:id="rId11"/>
+    <p:sldId id="292" r:id="rId12"/>
+    <p:sldId id="293" r:id="rId13"/>
+    <p:sldId id="278" r:id="rId14"/>
+    <p:sldId id="279" r:id="rId15"/>
+    <p:sldId id="280" r:id="rId16"/>
+    <p:sldId id="281" r:id="rId17"/>
+    <p:sldId id="286" r:id="rId18"/>
   </p:sldIdLst>
   <p:sldSz cx="12192000" cy="6858000"/>
   <p:notesSz cx="6858000" cy="9144000"/>
@@ -3742,8 +3746,8 @@
     <dgm:cxn modelId="{61A431AF-CFC9-490E-98CF-F6488F3C6D9C}" type="presOf" srcId="{2B6A55A5-45D3-4E17-9C60-8FB16C933545}" destId="{05478942-E273-4856-8553-F0FD8F015AA2}" srcOrd="0" destOrd="1" presId="urn:microsoft.com/office/officeart/2005/8/layout/cycle4"/>
     <dgm:cxn modelId="{5F7AD9D5-E7E6-4F46-A4C5-3A0CE6F62C8E}" srcId="{8FEE133A-1A79-4187-9AFD-4F06B42A70BC}" destId="{35F1F2D2-FC47-4990-98DB-731AFE036343}" srcOrd="0" destOrd="0" parTransId="{D8C3661F-62F4-45E8-BB01-35BAAF924AEB}" sibTransId="{4EFE689A-014D-4F95-82DA-3254DF013F6C}"/>
     <dgm:cxn modelId="{97B8E8D6-6FCE-438F-84D7-14FD178A9EF3}" type="presOf" srcId="{850DD825-7D08-4BBC-94B9-7E217910F9A2}" destId="{53088BBF-CDFB-43AD-88FA-A16B4FDD4AEA}" srcOrd="1" destOrd="1" presId="urn:microsoft.com/office/officeart/2005/8/layout/cycle4"/>
+    <dgm:cxn modelId="{1C137277-FCCE-4E78-A791-2ADCE3EDEAE7}" type="presOf" srcId="{5A50A77D-7959-4302-B136-B1316B3CEC1D}" destId="{431C4C2F-7F42-4D62-8EEF-918E7AD22EA0}" srcOrd="0" destOrd="2" presId="urn:microsoft.com/office/officeart/2005/8/layout/cycle4"/>
     <dgm:cxn modelId="{A2830668-E8D8-479D-BDD1-DDDBB0D25879}" type="presOf" srcId="{DCE41F30-8A4B-4090-95D5-6CBD1CFA1EEC}" destId="{A67A60E5-5291-49E4-B3E5-53A58B528285}" srcOrd="0" destOrd="0" presId="urn:microsoft.com/office/officeart/2005/8/layout/cycle4"/>
-    <dgm:cxn modelId="{1C137277-FCCE-4E78-A791-2ADCE3EDEAE7}" type="presOf" srcId="{5A50A77D-7959-4302-B136-B1316B3CEC1D}" destId="{431C4C2F-7F42-4D62-8EEF-918E7AD22EA0}" srcOrd="0" destOrd="2" presId="urn:microsoft.com/office/officeart/2005/8/layout/cycle4"/>
     <dgm:cxn modelId="{58755D72-6A8A-4181-8EB5-41F1412B480B}" srcId="{8FEE133A-1A79-4187-9AFD-4F06B42A70BC}" destId="{62885FA7-E7FB-4933-9935-6A8AA90289B4}" srcOrd="2" destOrd="0" parTransId="{9870B421-E3D6-4556-A843-2F0EDB4F207B}" sibTransId="{EB0831C9-645B-4C0B-8FAE-4F47D0F4E0C7}"/>
     <dgm:cxn modelId="{558EB1E9-7D3B-4CFB-91ED-0AE5FFB267A1}" type="presOf" srcId="{850DD825-7D08-4BBC-94B9-7E217910F9A2}" destId="{431C4C2F-7F42-4D62-8EEF-918E7AD22EA0}" srcOrd="0" destOrd="1" presId="urn:microsoft.com/office/officeart/2005/8/layout/cycle4"/>
     <dgm:cxn modelId="{566F2C05-C614-467E-BF41-9EC9D316C5BC}" type="presOf" srcId="{21C7A246-DDB5-40DD-9118-CC4963BF878A}" destId="{BC6F0824-1351-49BA-BADB-F02B71A91728}" srcOrd="0" destOrd="1" presId="urn:microsoft.com/office/officeart/2005/8/layout/cycle4"/>
@@ -4142,21 +4146,21 @@
     </dgm:pt>
   </dgm:ptLst>
   <dgm:cxnLst>
+    <dgm:cxn modelId="{BFE5F03E-99EE-488D-A25F-FA4A305398F3}" type="presOf" srcId="{EEB7DF95-B1E1-4355-BDED-67254F3A40BF}" destId="{156A4B50-5EBB-4BD2-8AF0-C722439DBC8D}" srcOrd="0" destOrd="0" presId="urn:microsoft.com/office/officeart/2005/8/layout/radial1"/>
     <dgm:cxn modelId="{CE2AF7AB-2949-4DCD-9C29-6B60E91D8468}" srcId="{0916D3E2-7950-4B1E-A80A-B1A0DFE4D7BE}" destId="{B8F4B4B5-48BB-4436-A4C8-0772D59377AC}" srcOrd="2" destOrd="0" parTransId="{EEB7DF95-B1E1-4355-BDED-67254F3A40BF}" sibTransId="{07F8EC93-687D-4C25-BBFA-77894EDF7DA2}"/>
+    <dgm:cxn modelId="{2D7DE33D-C3DB-49E5-ADF6-52C214CF1C59}" srcId="{0916D3E2-7950-4B1E-A80A-B1A0DFE4D7BE}" destId="{7F397B27-ED42-4C0B-84EB-F42483A443DB}" srcOrd="1" destOrd="0" parTransId="{DD81B84C-4525-4615-9233-87E402AFBABC}" sibTransId="{97EBF3C2-DAC2-40A4-AE80-264E3F21FCCC}"/>
+    <dgm:cxn modelId="{7470EB8E-365B-4C7B-B345-F3A82F2BDE86}" type="presOf" srcId="{EEB7DF95-B1E1-4355-BDED-67254F3A40BF}" destId="{0FA48441-B5ED-464B-AB5B-44DAB679EE64}" srcOrd="1" destOrd="0" presId="urn:microsoft.com/office/officeart/2005/8/layout/radial1"/>
     <dgm:cxn modelId="{D7CE5B38-4681-488A-875C-5BC6D4608B17}" type="presOf" srcId="{B8F4B4B5-48BB-4436-A4C8-0772D59377AC}" destId="{B8775ABA-3037-409F-B1F5-5479D38AC897}" srcOrd="0" destOrd="0" presId="urn:microsoft.com/office/officeart/2005/8/layout/radial1"/>
+    <dgm:cxn modelId="{A9B36F8A-C74B-47A9-B539-806F6BB77A1A}" srcId="{CC293B1C-4CF8-4FF0-BBC7-4942ED2D7F88}" destId="{0916D3E2-7950-4B1E-A80A-B1A0DFE4D7BE}" srcOrd="0" destOrd="0" parTransId="{78ED7DF1-7D14-4D64-A8E3-CBD6C30B03FB}" sibTransId="{402F8436-663D-4DB8-A22F-0A8F501EB425}"/>
+    <dgm:cxn modelId="{4F76CFC7-AC86-4FD6-BD3B-3B31C6A8EDDA}" type="presOf" srcId="{F26E0BCB-616E-4F5C-9212-B89461307743}" destId="{FB6E935B-AB56-4686-BAF4-89171D311D48}" srcOrd="0" destOrd="0" presId="urn:microsoft.com/office/officeart/2005/8/layout/radial1"/>
+    <dgm:cxn modelId="{53089D63-12EB-40F9-92A2-F39B07E20E6B}" type="presOf" srcId="{0916D3E2-7950-4B1E-A80A-B1A0DFE4D7BE}" destId="{334F0DA9-4D69-40E7-AE37-8BB2E71C3ACD}" srcOrd="0" destOrd="0" presId="urn:microsoft.com/office/officeart/2005/8/layout/radial1"/>
+    <dgm:cxn modelId="{2E6F4476-BF79-4C90-823B-71099E5FD8D3}" type="presOf" srcId="{DD81B84C-4525-4615-9233-87E402AFBABC}" destId="{9CD455AE-EC69-44E0-B929-B59BCD7E9894}" srcOrd="1" destOrd="0" presId="urn:microsoft.com/office/officeart/2005/8/layout/radial1"/>
+    <dgm:cxn modelId="{6037BACF-1495-4D63-973A-E9906686C9EC}" type="presOf" srcId="{9B35DA45-8824-4EE3-89F0-3F4E07F980E3}" destId="{51D4E2D9-6364-4FE7-BE7F-89898165258A}" srcOrd="0" destOrd="0" presId="urn:microsoft.com/office/officeart/2005/8/layout/radial1"/>
+    <dgm:cxn modelId="{4E83842D-6898-45A2-8C76-AC263926CE66}" type="presOf" srcId="{CC293B1C-4CF8-4FF0-BBC7-4942ED2D7F88}" destId="{05AAFE4B-4748-4F9C-AA5B-DEC71FC73E20}" srcOrd="0" destOrd="0" presId="urn:microsoft.com/office/officeart/2005/8/layout/radial1"/>
+    <dgm:cxn modelId="{EE79DC2E-EE32-4B0A-ADFD-E11D61A99647}" type="presOf" srcId="{DD81B84C-4525-4615-9233-87E402AFBABC}" destId="{3134C74D-D45F-4D44-8DA9-5DD9ACC7028A}" srcOrd="0" destOrd="0" presId="urn:microsoft.com/office/officeart/2005/8/layout/radial1"/>
     <dgm:cxn modelId="{08978BA1-AE5A-4DFF-A0C3-92D4A0078A98}" srcId="{0916D3E2-7950-4B1E-A80A-B1A0DFE4D7BE}" destId="{9B35DA45-8824-4EE3-89F0-3F4E07F980E3}" srcOrd="0" destOrd="0" parTransId="{F26E0BCB-616E-4F5C-9212-B89461307743}" sibTransId="{6FFF208B-A136-4388-9736-DE2BA4AFD5AF}"/>
+    <dgm:cxn modelId="{1173F0C1-237A-44C5-81A9-6289AFEB7E80}" type="presOf" srcId="{7F397B27-ED42-4C0B-84EB-F42483A443DB}" destId="{FC75532D-1A75-4D81-A458-80C91B398F9D}" srcOrd="0" destOrd="0" presId="urn:microsoft.com/office/officeart/2005/8/layout/radial1"/>
     <dgm:cxn modelId="{8C318C29-2BA6-4073-9DC3-993B41DBBD97}" type="presOf" srcId="{F26E0BCB-616E-4F5C-9212-B89461307743}" destId="{B26CA117-7877-4BBB-8697-7BAA6B4D1769}" srcOrd="1" destOrd="0" presId="urn:microsoft.com/office/officeart/2005/8/layout/radial1"/>
-    <dgm:cxn modelId="{BFE5F03E-99EE-488D-A25F-FA4A305398F3}" type="presOf" srcId="{EEB7DF95-B1E1-4355-BDED-67254F3A40BF}" destId="{156A4B50-5EBB-4BD2-8AF0-C722439DBC8D}" srcOrd="0" destOrd="0" presId="urn:microsoft.com/office/officeart/2005/8/layout/radial1"/>
-    <dgm:cxn modelId="{4F76CFC7-AC86-4FD6-BD3B-3B31C6A8EDDA}" type="presOf" srcId="{F26E0BCB-616E-4F5C-9212-B89461307743}" destId="{FB6E935B-AB56-4686-BAF4-89171D311D48}" srcOrd="0" destOrd="0" presId="urn:microsoft.com/office/officeart/2005/8/layout/radial1"/>
-    <dgm:cxn modelId="{7470EB8E-365B-4C7B-B345-F3A82F2BDE86}" type="presOf" srcId="{EEB7DF95-B1E1-4355-BDED-67254F3A40BF}" destId="{0FA48441-B5ED-464B-AB5B-44DAB679EE64}" srcOrd="1" destOrd="0" presId="urn:microsoft.com/office/officeart/2005/8/layout/radial1"/>
-    <dgm:cxn modelId="{2E6F4476-BF79-4C90-823B-71099E5FD8D3}" type="presOf" srcId="{DD81B84C-4525-4615-9233-87E402AFBABC}" destId="{9CD455AE-EC69-44E0-B929-B59BCD7E9894}" srcOrd="1" destOrd="0" presId="urn:microsoft.com/office/officeart/2005/8/layout/radial1"/>
-    <dgm:cxn modelId="{2D7DE33D-C3DB-49E5-ADF6-52C214CF1C59}" srcId="{0916D3E2-7950-4B1E-A80A-B1A0DFE4D7BE}" destId="{7F397B27-ED42-4C0B-84EB-F42483A443DB}" srcOrd="1" destOrd="0" parTransId="{DD81B84C-4525-4615-9233-87E402AFBABC}" sibTransId="{97EBF3C2-DAC2-40A4-AE80-264E3F21FCCC}"/>
-    <dgm:cxn modelId="{A9B36F8A-C74B-47A9-B539-806F6BB77A1A}" srcId="{CC293B1C-4CF8-4FF0-BBC7-4942ED2D7F88}" destId="{0916D3E2-7950-4B1E-A80A-B1A0DFE4D7BE}" srcOrd="0" destOrd="0" parTransId="{78ED7DF1-7D14-4D64-A8E3-CBD6C30B03FB}" sibTransId="{402F8436-663D-4DB8-A22F-0A8F501EB425}"/>
-    <dgm:cxn modelId="{4E83842D-6898-45A2-8C76-AC263926CE66}" type="presOf" srcId="{CC293B1C-4CF8-4FF0-BBC7-4942ED2D7F88}" destId="{05AAFE4B-4748-4F9C-AA5B-DEC71FC73E20}" srcOrd="0" destOrd="0" presId="urn:microsoft.com/office/officeart/2005/8/layout/radial1"/>
-    <dgm:cxn modelId="{53089D63-12EB-40F9-92A2-F39B07E20E6B}" type="presOf" srcId="{0916D3E2-7950-4B1E-A80A-B1A0DFE4D7BE}" destId="{334F0DA9-4D69-40E7-AE37-8BB2E71C3ACD}" srcOrd="0" destOrd="0" presId="urn:microsoft.com/office/officeart/2005/8/layout/radial1"/>
-    <dgm:cxn modelId="{EE79DC2E-EE32-4B0A-ADFD-E11D61A99647}" type="presOf" srcId="{DD81B84C-4525-4615-9233-87E402AFBABC}" destId="{3134C74D-D45F-4D44-8DA9-5DD9ACC7028A}" srcOrd="0" destOrd="0" presId="urn:microsoft.com/office/officeart/2005/8/layout/radial1"/>
-    <dgm:cxn modelId="{1173F0C1-237A-44C5-81A9-6289AFEB7E80}" type="presOf" srcId="{7F397B27-ED42-4C0B-84EB-F42483A443DB}" destId="{FC75532D-1A75-4D81-A458-80C91B398F9D}" srcOrd="0" destOrd="0" presId="urn:microsoft.com/office/officeart/2005/8/layout/radial1"/>
-    <dgm:cxn modelId="{6037BACF-1495-4D63-973A-E9906686C9EC}" type="presOf" srcId="{9B35DA45-8824-4EE3-89F0-3F4E07F980E3}" destId="{51D4E2D9-6364-4FE7-BE7F-89898165258A}" srcOrd="0" destOrd="0" presId="urn:microsoft.com/office/officeart/2005/8/layout/radial1"/>
     <dgm:cxn modelId="{772C3BB5-DF35-42DE-A439-0DCB31D63FB8}" type="presParOf" srcId="{05AAFE4B-4748-4F9C-AA5B-DEC71FC73E20}" destId="{334F0DA9-4D69-40E7-AE37-8BB2E71C3ACD}" srcOrd="0" destOrd="0" presId="urn:microsoft.com/office/officeart/2005/8/layout/radial1"/>
     <dgm:cxn modelId="{20FC6565-C496-4E94-8CCE-904149940058}" type="presParOf" srcId="{05AAFE4B-4748-4F9C-AA5B-DEC71FC73E20}" destId="{FB6E935B-AB56-4686-BAF4-89171D311D48}" srcOrd="1" destOrd="0" presId="urn:microsoft.com/office/officeart/2005/8/layout/radial1"/>
     <dgm:cxn modelId="{1BDA0C39-DB3E-4726-AC03-ECA79335B44E}" type="presParOf" srcId="{FB6E935B-AB56-4686-BAF4-89171D311D48}" destId="{B26CA117-7877-4BBB-8697-7BAA6B4D1769}" srcOrd="0" destOrd="0" presId="urn:microsoft.com/office/officeart/2005/8/layout/radial1"/>
@@ -4568,22 +4572,22 @@
     </dgm:pt>
   </dgm:ptLst>
   <dgm:cxnLst>
-    <dgm:cxn modelId="{1AE06204-B328-4A88-90DE-47487907D919}" type="presOf" srcId="{47253CFC-4569-4709-81D3-DEEB42841B34}" destId="{65C1CC62-47DD-4AE0-BB4E-E1AA4210EAD1}" srcOrd="1" destOrd="0" presId="urn:microsoft.com/office/officeart/2005/8/layout/hList7"/>
-    <dgm:cxn modelId="{57921F95-0423-45E7-AE0D-672371E39D53}" type="presOf" srcId="{5EE301F9-AA62-4FDD-BBD4-EB5F68D85FEC}" destId="{6B2B5E85-AAEA-413B-89EF-96FC0B61D0DB}" srcOrd="1" destOrd="0" presId="urn:microsoft.com/office/officeart/2005/8/layout/hList7"/>
-    <dgm:cxn modelId="{2E016A71-4A74-45F5-AD15-07D3B1D0466D}" srcId="{95C89F30-E4C0-41F0-9F78-CFBA2BC6B6E7}" destId="{47253CFC-4569-4709-81D3-DEEB42841B34}" srcOrd="2" destOrd="0" parTransId="{790D9CA9-D5EB-4ABB-B3FF-C076CA534420}" sibTransId="{2F25E3F7-E9EB-4C08-9116-69D5C4FD6E2A}"/>
-    <dgm:cxn modelId="{CF0035A1-5E18-4F9A-AAAD-C4F8302A689F}" type="presOf" srcId="{81607F9D-ACA8-4EBC-97F3-AE620D537126}" destId="{FCBD48AD-6356-4016-B622-1476036943D2}" srcOrd="1" destOrd="0" presId="urn:microsoft.com/office/officeart/2005/8/layout/hList7"/>
     <dgm:cxn modelId="{AFAAAFAD-A0DE-47C1-9249-77B5BDE05E36}" type="presOf" srcId="{81607F9D-ACA8-4EBC-97F3-AE620D537126}" destId="{AECDF339-533B-4319-9DD1-FE0312AA5FE7}" srcOrd="0" destOrd="0" presId="urn:microsoft.com/office/officeart/2005/8/layout/hList7"/>
     <dgm:cxn modelId="{38CD83C8-6796-4198-B7C8-EFF34EC9AA55}" type="presOf" srcId="{BA786E09-868C-446C-BCAD-1B9A337A2314}" destId="{9B6DBF9B-EFA6-45E8-AAE9-1FBCC2922B5E}" srcOrd="0" destOrd="0" presId="urn:microsoft.com/office/officeart/2005/8/layout/hList7"/>
-    <dgm:cxn modelId="{4E004507-C92D-4D0B-9DBB-DB4591A9B903}" srcId="{95C89F30-E4C0-41F0-9F78-CFBA2BC6B6E7}" destId="{BA786E09-868C-446C-BCAD-1B9A337A2314}" srcOrd="3" destOrd="0" parTransId="{59BE49D1-A09D-46A0-A218-5983A849445B}" sibTransId="{870FB8E6-A3E1-4439-9131-142A0512FE32}"/>
+    <dgm:cxn modelId="{2E016A71-4A74-45F5-AD15-07D3B1D0466D}" srcId="{95C89F30-E4C0-41F0-9F78-CFBA2BC6B6E7}" destId="{47253CFC-4569-4709-81D3-DEEB42841B34}" srcOrd="2" destOrd="0" parTransId="{790D9CA9-D5EB-4ABB-B3FF-C076CA534420}" sibTransId="{2F25E3F7-E9EB-4C08-9116-69D5C4FD6E2A}"/>
     <dgm:cxn modelId="{F6F9661A-BC21-475D-819D-50626DE6BCFB}" type="presOf" srcId="{2F25E3F7-E9EB-4C08-9116-69D5C4FD6E2A}" destId="{2845AC54-25A9-480C-BA9C-51BB56258253}" srcOrd="0" destOrd="0" presId="urn:microsoft.com/office/officeart/2005/8/layout/hList7"/>
     <dgm:cxn modelId="{C645A4BB-EDB6-4E76-AB82-9AD72E6BF557}" type="presOf" srcId="{BA786E09-868C-446C-BCAD-1B9A337A2314}" destId="{31F77346-6636-44FE-8237-42E5F75F0855}" srcOrd="1" destOrd="0" presId="urn:microsoft.com/office/officeart/2005/8/layout/hList7"/>
+    <dgm:cxn modelId="{194860A3-1900-4650-B671-CEC4587BA924}" type="presOf" srcId="{94CA40FB-60B0-465C-89DE-37B57251E362}" destId="{6A4D6A8E-A18C-499A-84BC-74FED5388C93}" srcOrd="0" destOrd="0" presId="urn:microsoft.com/office/officeart/2005/8/layout/hList7"/>
+    <dgm:cxn modelId="{57921F95-0423-45E7-AE0D-672371E39D53}" type="presOf" srcId="{5EE301F9-AA62-4FDD-BBD4-EB5F68D85FEC}" destId="{6B2B5E85-AAEA-413B-89EF-96FC0B61D0DB}" srcOrd="1" destOrd="0" presId="urn:microsoft.com/office/officeart/2005/8/layout/hList7"/>
+    <dgm:cxn modelId="{4E004507-C92D-4D0B-9DBB-DB4591A9B903}" srcId="{95C89F30-E4C0-41F0-9F78-CFBA2BC6B6E7}" destId="{BA786E09-868C-446C-BCAD-1B9A337A2314}" srcOrd="3" destOrd="0" parTransId="{59BE49D1-A09D-46A0-A218-5983A849445B}" sibTransId="{870FB8E6-A3E1-4439-9131-142A0512FE32}"/>
+    <dgm:cxn modelId="{1AE06204-B328-4A88-90DE-47487907D919}" type="presOf" srcId="{47253CFC-4569-4709-81D3-DEEB42841B34}" destId="{65C1CC62-47DD-4AE0-BB4E-E1AA4210EAD1}" srcOrd="1" destOrd="0" presId="urn:microsoft.com/office/officeart/2005/8/layout/hList7"/>
+    <dgm:cxn modelId="{F309A241-CAAA-4CAA-89A7-3EF413DFED5F}" type="presOf" srcId="{47253CFC-4569-4709-81D3-DEEB42841B34}" destId="{18E220CA-4E07-4273-9F20-D66E44D1CC15}" srcOrd="0" destOrd="0" presId="urn:microsoft.com/office/officeart/2005/8/layout/hList7"/>
+    <dgm:cxn modelId="{E53B2165-E749-413E-9F1A-C9CC76DA6A5C}" srcId="{95C89F30-E4C0-41F0-9F78-CFBA2BC6B6E7}" destId="{5EE301F9-AA62-4FDD-BBD4-EB5F68D85FEC}" srcOrd="0" destOrd="0" parTransId="{752A3FC9-4F42-4B45-864D-D48201C144BC}" sibTransId="{7A2D0BBB-4796-4683-A258-869CCE2EFDEE}"/>
+    <dgm:cxn modelId="{CF0035A1-5E18-4F9A-AAAD-C4F8302A689F}" type="presOf" srcId="{81607F9D-ACA8-4EBC-97F3-AE620D537126}" destId="{FCBD48AD-6356-4016-B622-1476036943D2}" srcOrd="1" destOrd="0" presId="urn:microsoft.com/office/officeart/2005/8/layout/hList7"/>
     <dgm:cxn modelId="{BDD1CA52-8007-48A8-B091-1E74889DEE99}" type="presOf" srcId="{95C89F30-E4C0-41F0-9F78-CFBA2BC6B6E7}" destId="{68497B09-3716-4EBD-AC6B-8AE2BDCC8972}" srcOrd="0" destOrd="0" presId="urn:microsoft.com/office/officeart/2005/8/layout/hList7"/>
+    <dgm:cxn modelId="{B6D21F72-7318-4B23-BC86-23B4E85AD610}" type="presOf" srcId="{5EE301F9-AA62-4FDD-BBD4-EB5F68D85FEC}" destId="{90FFEDE6-D24B-46AA-AC61-5A2CA3E513CC}" srcOrd="0" destOrd="0" presId="urn:microsoft.com/office/officeart/2005/8/layout/hList7"/>
     <dgm:cxn modelId="{C503CDFC-F7CF-4B5B-9CB9-D0B888450B80}" srcId="{95C89F30-E4C0-41F0-9F78-CFBA2BC6B6E7}" destId="{81607F9D-ACA8-4EBC-97F3-AE620D537126}" srcOrd="1" destOrd="0" parTransId="{5614C387-4578-47E1-B8ED-4C19C139B6D6}" sibTransId="{94CA40FB-60B0-465C-89DE-37B57251E362}"/>
     <dgm:cxn modelId="{2EC55B3D-BFE3-4C06-B5CF-4DA8F00E7DD6}" type="presOf" srcId="{7A2D0BBB-4796-4683-A258-869CCE2EFDEE}" destId="{46B8E31D-92A9-4F7C-AC64-291B22E56C19}" srcOrd="0" destOrd="0" presId="urn:microsoft.com/office/officeart/2005/8/layout/hList7"/>
-    <dgm:cxn modelId="{194860A3-1900-4650-B671-CEC4587BA924}" type="presOf" srcId="{94CA40FB-60B0-465C-89DE-37B57251E362}" destId="{6A4D6A8E-A18C-499A-84BC-74FED5388C93}" srcOrd="0" destOrd="0" presId="urn:microsoft.com/office/officeart/2005/8/layout/hList7"/>
-    <dgm:cxn modelId="{F309A241-CAAA-4CAA-89A7-3EF413DFED5F}" type="presOf" srcId="{47253CFC-4569-4709-81D3-DEEB42841B34}" destId="{18E220CA-4E07-4273-9F20-D66E44D1CC15}" srcOrd="0" destOrd="0" presId="urn:microsoft.com/office/officeart/2005/8/layout/hList7"/>
-    <dgm:cxn modelId="{B6D21F72-7318-4B23-BC86-23B4E85AD610}" type="presOf" srcId="{5EE301F9-AA62-4FDD-BBD4-EB5F68D85FEC}" destId="{90FFEDE6-D24B-46AA-AC61-5A2CA3E513CC}" srcOrd="0" destOrd="0" presId="urn:microsoft.com/office/officeart/2005/8/layout/hList7"/>
-    <dgm:cxn modelId="{E53B2165-E749-413E-9F1A-C9CC76DA6A5C}" srcId="{95C89F30-E4C0-41F0-9F78-CFBA2BC6B6E7}" destId="{5EE301F9-AA62-4FDD-BBD4-EB5F68D85FEC}" srcOrd="0" destOrd="0" parTransId="{752A3FC9-4F42-4B45-864D-D48201C144BC}" sibTransId="{7A2D0BBB-4796-4683-A258-869CCE2EFDEE}"/>
     <dgm:cxn modelId="{4D0448AB-072A-4D18-810D-2383F44A3112}" type="presParOf" srcId="{68497B09-3716-4EBD-AC6B-8AE2BDCC8972}" destId="{5C007895-D27B-4555-8633-C9BBD58A106D}" srcOrd="0" destOrd="0" presId="urn:microsoft.com/office/officeart/2005/8/layout/hList7"/>
     <dgm:cxn modelId="{EB40CABA-D7D8-449B-A3EF-706C96A2B35D}" type="presParOf" srcId="{68497B09-3716-4EBD-AC6B-8AE2BDCC8972}" destId="{851E5CC9-679F-4CF6-B00F-A025B4DEF2B3}" srcOrd="1" destOrd="0" presId="urn:microsoft.com/office/officeart/2005/8/layout/hList7"/>
     <dgm:cxn modelId="{E6D0BBE2-1389-41E3-A561-EB44452418BA}" type="presParOf" srcId="{851E5CC9-679F-4CF6-B00F-A025B4DEF2B3}" destId="{02F5FF00-4C9F-4B29-8EE7-22E5EFD6E9BE}" srcOrd="0" destOrd="0" presId="urn:microsoft.com/office/officeart/2005/8/layout/hList7"/>
@@ -4628,1122 +4632,6 @@
       <dsp:cNvGrpSpPr/>
     </dsp:nvGrpSpPr>
     <dsp:grpSpPr/>
-    <dsp:sp modelId="{68AC0C8C-6683-4490-8F38-983C8CB47C3F}">
-      <dsp:nvSpPr>
-        <dsp:cNvPr id="0" name=""/>
-        <dsp:cNvSpPr/>
-      </dsp:nvSpPr>
-      <dsp:spPr>
-        <a:xfrm>
-          <a:off x="4124889" y="2973665"/>
-          <a:ext cx="2160280" cy="1399372"/>
-        </a:xfrm>
-        <a:prstGeom prst="roundRect">
-          <a:avLst>
-            <a:gd name="adj" fmla="val 10000"/>
-          </a:avLst>
-        </a:prstGeom>
-        <a:solidFill>
-          <a:schemeClr val="lt1">
-            <a:alpha val="90000"/>
-            <a:hueOff val="0"/>
-            <a:satOff val="0"/>
-            <a:lumOff val="0"/>
-            <a:alphaOff val="0"/>
-          </a:schemeClr>
-        </a:solidFill>
-        <a:ln w="6350" cap="flat" cmpd="sng" algn="ctr">
-          <a:solidFill>
-            <a:schemeClr val="accent4">
-              <a:hueOff val="0"/>
-              <a:satOff val="0"/>
-              <a:lumOff val="0"/>
-              <a:alphaOff val="0"/>
-            </a:schemeClr>
-          </a:solidFill>
-          <a:prstDash val="solid"/>
-          <a:miter lim="800000"/>
-        </a:ln>
-        <a:effectLst/>
-        <a:scene3d>
-          <a:camera prst="orthographicFront"/>
-          <a:lightRig rig="flat" dir="t"/>
-        </a:scene3d>
-        <a:sp3d z="-190500" extrusionH="12700" prstMaterial="plastic">
-          <a:bevelT w="50800" h="50800"/>
-        </a:sp3d>
-      </dsp:spPr>
-      <dsp:style>
-        <a:lnRef idx="1">
-          <a:scrgbClr r="0" g="0" b="0"/>
-        </a:lnRef>
-        <a:fillRef idx="1">
-          <a:scrgbClr r="0" g="0" b="0"/>
-        </a:fillRef>
-        <a:effectRef idx="2">
-          <a:scrgbClr r="0" g="0" b="0"/>
-        </a:effectRef>
-        <a:fontRef idx="minor"/>
-      </dsp:style>
-      <dsp:txBody>
-        <a:bodyPr spcFirstLastPara="0" vert="horz" wrap="square" lIns="53340" tIns="53340" rIns="53340" bIns="53340" numCol="1" spcCol="1270" anchor="t" anchorCtr="0">
-          <a:noAutofit/>
-        </a:bodyPr>
-        <a:lstStyle/>
-        <a:p>
-          <a:pPr marL="57150" lvl="1" indent="-57150" algn="l" defTabSz="488950">
-            <a:lnSpc>
-              <a:spcPct val="90000"/>
-            </a:lnSpc>
-            <a:spcBef>
-              <a:spcPct val="0"/>
-            </a:spcBef>
-            <a:spcAft>
-              <a:spcPct val="15000"/>
-            </a:spcAft>
-            <a:buChar char="••"/>
-          </a:pPr>
-          <a:r>
-            <a:rPr lang="fr-FR" sz="1100" kern="1200" dirty="0" err="1"/>
-            <a:t>Risk</a:t>
-          </a:r>
-          <a:r>
-            <a:rPr lang="fr-FR" sz="1100" kern="1200" dirty="0"/>
-            <a:t> of high </a:t>
-          </a:r>
-          <a:r>
-            <a:rPr lang="fr-FR" sz="1100" kern="1200" dirty="0" err="1"/>
-            <a:t>demand</a:t>
-          </a:r>
-          <a:r>
-            <a:rPr lang="fr-FR" sz="1100" kern="1200" dirty="0"/>
-            <a:t> (server)</a:t>
-          </a:r>
-        </a:p>
-        <a:p>
-          <a:pPr marL="57150" lvl="1" indent="-57150" algn="l" defTabSz="488950">
-            <a:lnSpc>
-              <a:spcPct val="90000"/>
-            </a:lnSpc>
-            <a:spcBef>
-              <a:spcPct val="0"/>
-            </a:spcBef>
-            <a:spcAft>
-              <a:spcPct val="15000"/>
-            </a:spcAft>
-            <a:buChar char="••"/>
-          </a:pPr>
-          <a:r>
-            <a:rPr lang="fr-FR" sz="1100" kern="1200" dirty="0" err="1" smtClean="0"/>
-            <a:t>Portability</a:t>
-          </a:r>
-          <a:r>
-            <a:rPr lang="fr-FR" sz="1100" kern="1200" dirty="0" smtClean="0"/>
-            <a:t> to Mac</a:t>
-          </a:r>
-          <a:endParaRPr lang="fr-FR" sz="1100" kern="1200" dirty="0"/>
-        </a:p>
-        <a:p>
-          <a:pPr marL="57150" lvl="1" indent="-57150" algn="l" defTabSz="488950">
-            <a:lnSpc>
-              <a:spcPct val="90000"/>
-            </a:lnSpc>
-            <a:spcBef>
-              <a:spcPct val="0"/>
-            </a:spcBef>
-            <a:spcAft>
-              <a:spcPct val="15000"/>
-            </a:spcAft>
-            <a:buChar char="••"/>
-          </a:pPr>
-          <a:r>
-            <a:rPr lang="fr-FR" sz="1100" kern="1200" dirty="0" err="1" smtClean="0"/>
-            <a:t>Lack</a:t>
-          </a:r>
-          <a:r>
-            <a:rPr lang="fr-FR" sz="1100" kern="1200" dirty="0" smtClean="0"/>
-            <a:t> of control on </a:t>
-          </a:r>
-          <a:r>
-            <a:rPr lang="fr-FR" sz="1100" kern="1200" dirty="0" err="1" smtClean="0"/>
-            <a:t>database</a:t>
-          </a:r>
-          <a:endParaRPr lang="fr-FR" sz="1100" kern="1200" dirty="0"/>
-        </a:p>
-      </dsp:txBody>
-      <dsp:txXfrm>
-        <a:off x="4803713" y="3354248"/>
-        <a:ext cx="1450716" cy="988049"/>
-      </dsp:txXfrm>
-    </dsp:sp>
-    <dsp:sp modelId="{431C4C2F-7F42-4D62-8EEF-918E7AD22EA0}">
-      <dsp:nvSpPr>
-        <dsp:cNvPr id="0" name=""/>
-        <dsp:cNvSpPr/>
-      </dsp:nvSpPr>
-      <dsp:spPr>
-        <a:xfrm>
-          <a:off x="562523" y="2973665"/>
-          <a:ext cx="2160280" cy="1399372"/>
-        </a:xfrm>
-        <a:prstGeom prst="roundRect">
-          <a:avLst>
-            <a:gd name="adj" fmla="val 10000"/>
-          </a:avLst>
-        </a:prstGeom>
-        <a:solidFill>
-          <a:schemeClr val="lt1">
-            <a:alpha val="90000"/>
-            <a:hueOff val="0"/>
-            <a:satOff val="0"/>
-            <a:lumOff val="0"/>
-            <a:alphaOff val="0"/>
-          </a:schemeClr>
-        </a:solidFill>
-        <a:ln w="6350" cap="flat" cmpd="sng" algn="ctr">
-          <a:solidFill>
-            <a:schemeClr val="accent5">
-              <a:hueOff val="0"/>
-              <a:satOff val="0"/>
-              <a:lumOff val="0"/>
-              <a:alphaOff val="0"/>
-            </a:schemeClr>
-          </a:solidFill>
-          <a:prstDash val="solid"/>
-          <a:miter lim="800000"/>
-        </a:ln>
-        <a:effectLst/>
-        <a:scene3d>
-          <a:camera prst="orthographicFront"/>
-          <a:lightRig rig="flat" dir="t"/>
-        </a:scene3d>
-        <a:sp3d z="-190500" extrusionH="12700" prstMaterial="plastic">
-          <a:bevelT w="50800" h="50800"/>
-        </a:sp3d>
-      </dsp:spPr>
-      <dsp:style>
-        <a:lnRef idx="1">
-          <a:scrgbClr r="0" g="0" b="0"/>
-        </a:lnRef>
-        <a:fillRef idx="1">
-          <a:scrgbClr r="0" g="0" b="0"/>
-        </a:fillRef>
-        <a:effectRef idx="2">
-          <a:scrgbClr r="0" g="0" b="0"/>
-        </a:effectRef>
-        <a:fontRef idx="minor"/>
-      </dsp:style>
-      <dsp:txBody>
-        <a:bodyPr spcFirstLastPara="0" vert="horz" wrap="square" lIns="53340" tIns="53340" rIns="53340" bIns="53340" numCol="1" spcCol="1270" anchor="t" anchorCtr="0">
-          <a:noAutofit/>
-        </a:bodyPr>
-        <a:lstStyle/>
-        <a:p>
-          <a:pPr marL="57150" lvl="1" indent="-57150" algn="l" defTabSz="488950">
-            <a:lnSpc>
-              <a:spcPct val="90000"/>
-            </a:lnSpc>
-            <a:spcBef>
-              <a:spcPct val="0"/>
-            </a:spcBef>
-            <a:spcAft>
-              <a:spcPct val="15000"/>
-            </a:spcAft>
-            <a:buChar char="••"/>
-          </a:pPr>
-          <a:r>
-            <a:rPr lang="fr-FR" sz="1100" kern="1200" dirty="0"/>
-            <a:t>No </a:t>
-          </a:r>
-          <a:r>
-            <a:rPr lang="fr-FR" sz="1100" kern="1200" dirty="0" err="1"/>
-            <a:t>competition</a:t>
-          </a:r>
-          <a:endParaRPr lang="fr-FR" sz="1100" kern="1200" dirty="0"/>
-        </a:p>
-        <a:p>
-          <a:pPr marL="57150" lvl="1" indent="-57150" algn="l" defTabSz="488950">
-            <a:lnSpc>
-              <a:spcPct val="90000"/>
-            </a:lnSpc>
-            <a:spcBef>
-              <a:spcPct val="0"/>
-            </a:spcBef>
-            <a:spcAft>
-              <a:spcPct val="15000"/>
-            </a:spcAft>
-            <a:buChar char="••"/>
-          </a:pPr>
-          <a:r>
-            <a:rPr lang="fr-FR" sz="1100" kern="1200" dirty="0"/>
-            <a:t>High utility</a:t>
-          </a:r>
-        </a:p>
-        <a:p>
-          <a:pPr marL="57150" lvl="1" indent="-57150" algn="l" defTabSz="488950">
-            <a:lnSpc>
-              <a:spcPct val="90000"/>
-            </a:lnSpc>
-            <a:spcBef>
-              <a:spcPct val="0"/>
-            </a:spcBef>
-            <a:spcAft>
-              <a:spcPct val="15000"/>
-            </a:spcAft>
-            <a:buChar char="••"/>
-          </a:pPr>
-          <a:r>
-            <a:rPr lang="fr-FR" sz="1100" kern="1200" dirty="0" err="1" smtClean="0"/>
-            <a:t>Easy</a:t>
-          </a:r>
-          <a:r>
-            <a:rPr lang="fr-FR" sz="1100" kern="1200" dirty="0" smtClean="0"/>
-            <a:t> to use</a:t>
-          </a:r>
-          <a:endParaRPr lang="fr-FR" sz="1100" kern="1200" dirty="0"/>
-        </a:p>
-      </dsp:txBody>
-      <dsp:txXfrm>
-        <a:off x="593263" y="3354248"/>
-        <a:ext cx="1450716" cy="988049"/>
-      </dsp:txXfrm>
-    </dsp:sp>
-    <dsp:sp modelId="{05478942-E273-4856-8553-F0FD8F015AA2}">
-      <dsp:nvSpPr>
-        <dsp:cNvPr id="0" name=""/>
-        <dsp:cNvSpPr/>
-      </dsp:nvSpPr>
-      <dsp:spPr>
-        <a:xfrm>
-          <a:off x="4124889" y="0"/>
-          <a:ext cx="2160280" cy="1399372"/>
-        </a:xfrm>
-        <a:prstGeom prst="roundRect">
-          <a:avLst>
-            <a:gd name="adj" fmla="val 10000"/>
-          </a:avLst>
-        </a:prstGeom>
-        <a:solidFill>
-          <a:schemeClr val="lt1">
-            <a:alpha val="90000"/>
-            <a:hueOff val="0"/>
-            <a:satOff val="0"/>
-            <a:lumOff val="0"/>
-            <a:alphaOff val="0"/>
-          </a:schemeClr>
-        </a:solidFill>
-        <a:ln w="6350" cap="flat" cmpd="sng" algn="ctr">
-          <a:solidFill>
-            <a:schemeClr val="accent3">
-              <a:hueOff val="0"/>
-              <a:satOff val="0"/>
-              <a:lumOff val="0"/>
-              <a:alphaOff val="0"/>
-            </a:schemeClr>
-          </a:solidFill>
-          <a:prstDash val="solid"/>
-          <a:miter lim="800000"/>
-        </a:ln>
-        <a:effectLst/>
-        <a:scene3d>
-          <a:camera prst="orthographicFront"/>
-          <a:lightRig rig="flat" dir="t"/>
-        </a:scene3d>
-        <a:sp3d z="-190500" extrusionH="12700" prstMaterial="plastic">
-          <a:bevelT w="50800" h="50800"/>
-        </a:sp3d>
-      </dsp:spPr>
-      <dsp:style>
-        <a:lnRef idx="1">
-          <a:scrgbClr r="0" g="0" b="0"/>
-        </a:lnRef>
-        <a:fillRef idx="1">
-          <a:scrgbClr r="0" g="0" b="0"/>
-        </a:fillRef>
-        <a:effectRef idx="2">
-          <a:scrgbClr r="0" g="0" b="0"/>
-        </a:effectRef>
-        <a:fontRef idx="minor"/>
-      </dsp:style>
-      <dsp:txBody>
-        <a:bodyPr spcFirstLastPara="0" vert="horz" wrap="square" lIns="53340" tIns="53340" rIns="53340" bIns="53340" numCol="1" spcCol="1270" anchor="t" anchorCtr="0">
-          <a:noAutofit/>
-        </a:bodyPr>
-        <a:lstStyle/>
-        <a:p>
-          <a:pPr marL="57150" lvl="1" indent="-57150" algn="l" defTabSz="488950">
-            <a:lnSpc>
-              <a:spcPct val="90000"/>
-            </a:lnSpc>
-            <a:spcBef>
-              <a:spcPct val="0"/>
-            </a:spcBef>
-            <a:spcAft>
-              <a:spcPct val="15000"/>
-            </a:spcAft>
-            <a:buChar char="••"/>
-          </a:pPr>
-          <a:r>
-            <a:rPr lang="fr-FR" sz="1100" kern="1200" dirty="0"/>
-            <a:t>Short deadlines</a:t>
-          </a:r>
-        </a:p>
-        <a:p>
-          <a:pPr marL="57150" lvl="1" indent="-57150" algn="l" defTabSz="488950">
-            <a:lnSpc>
-              <a:spcPct val="90000"/>
-            </a:lnSpc>
-            <a:spcBef>
-              <a:spcPct val="0"/>
-            </a:spcBef>
-            <a:spcAft>
-              <a:spcPct val="15000"/>
-            </a:spcAft>
-            <a:buChar char="••"/>
-          </a:pPr>
-          <a:r>
-            <a:rPr lang="fr-FR" sz="1100" kern="1200" dirty="0" err="1" smtClean="0"/>
-            <a:t>Emerging</a:t>
-          </a:r>
-          <a:r>
-            <a:rPr lang="fr-FR" sz="1100" kern="1200" dirty="0" smtClean="0"/>
-            <a:t> </a:t>
-          </a:r>
-          <a:r>
-            <a:rPr lang="fr-FR" sz="1100" kern="1200" dirty="0" err="1" smtClean="0"/>
-            <a:t>scientific</a:t>
-          </a:r>
-          <a:r>
-            <a:rPr lang="fr-FR" sz="1100" kern="1200" dirty="0" smtClean="0"/>
-            <a:t> </a:t>
-          </a:r>
-          <a:r>
-            <a:rPr lang="fr-FR" sz="1100" kern="1200" dirty="0" err="1" smtClean="0"/>
-            <a:t>field</a:t>
-          </a:r>
-          <a:endParaRPr lang="fr-FR" sz="1100" kern="1200" dirty="0"/>
-        </a:p>
-        <a:p>
-          <a:pPr marL="57150" lvl="1" indent="-57150" algn="l" defTabSz="488950">
-            <a:lnSpc>
-              <a:spcPct val="90000"/>
-            </a:lnSpc>
-            <a:spcBef>
-              <a:spcPct val="0"/>
-            </a:spcBef>
-            <a:spcAft>
-              <a:spcPct val="15000"/>
-            </a:spcAft>
-            <a:buChar char="••"/>
-          </a:pPr>
-          <a:r>
-            <a:rPr lang="fr-FR" sz="1100" kern="1200" dirty="0" smtClean="0"/>
-            <a:t>Client </a:t>
-          </a:r>
-          <a:r>
-            <a:rPr lang="fr-FR" sz="1100" kern="1200" dirty="0" err="1" smtClean="0"/>
-            <a:t>infrequently</a:t>
-          </a:r>
-          <a:r>
-            <a:rPr lang="fr-FR" sz="1100" kern="1200" dirty="0" smtClean="0"/>
-            <a:t> </a:t>
-          </a:r>
-          <a:r>
-            <a:rPr lang="fr-FR" sz="1100" kern="1200" dirty="0" err="1" smtClean="0"/>
-            <a:t>available</a:t>
-          </a:r>
-          <a:endParaRPr lang="fr-FR" sz="1100" kern="1200" dirty="0"/>
-        </a:p>
-      </dsp:txBody>
-      <dsp:txXfrm>
-        <a:off x="4803713" y="30740"/>
-        <a:ext cx="1450716" cy="988049"/>
-      </dsp:txXfrm>
-    </dsp:sp>
-    <dsp:sp modelId="{BC6F0824-1351-49BA-BADB-F02B71A91728}">
-      <dsp:nvSpPr>
-        <dsp:cNvPr id="0" name=""/>
-        <dsp:cNvSpPr/>
-      </dsp:nvSpPr>
-      <dsp:spPr>
-        <a:xfrm>
-          <a:off x="562523" y="0"/>
-          <a:ext cx="2160280" cy="1399372"/>
-        </a:xfrm>
-        <a:prstGeom prst="roundRect">
-          <a:avLst>
-            <a:gd name="adj" fmla="val 10000"/>
-          </a:avLst>
-        </a:prstGeom>
-        <a:solidFill>
-          <a:schemeClr val="lt1">
-            <a:alpha val="90000"/>
-            <a:hueOff val="0"/>
-            <a:satOff val="0"/>
-            <a:lumOff val="0"/>
-            <a:alphaOff val="0"/>
-          </a:schemeClr>
-        </a:solidFill>
-        <a:ln w="6350" cap="flat" cmpd="sng" algn="ctr">
-          <a:solidFill>
-            <a:schemeClr val="accent2">
-              <a:hueOff val="0"/>
-              <a:satOff val="0"/>
-              <a:lumOff val="0"/>
-              <a:alphaOff val="0"/>
-            </a:schemeClr>
-          </a:solidFill>
-          <a:prstDash val="solid"/>
-          <a:miter lim="800000"/>
-        </a:ln>
-        <a:effectLst/>
-        <a:scene3d>
-          <a:camera prst="orthographicFront"/>
-          <a:lightRig rig="flat" dir="t"/>
-        </a:scene3d>
-        <a:sp3d z="-190500" extrusionH="12700" prstMaterial="plastic">
-          <a:bevelT w="50800" h="50800"/>
-        </a:sp3d>
-      </dsp:spPr>
-      <dsp:style>
-        <a:lnRef idx="1">
-          <a:scrgbClr r="0" g="0" b="0"/>
-        </a:lnRef>
-        <a:fillRef idx="1">
-          <a:scrgbClr r="0" g="0" b="0"/>
-        </a:fillRef>
-        <a:effectRef idx="2">
-          <a:scrgbClr r="0" g="0" b="0"/>
-        </a:effectRef>
-        <a:fontRef idx="minor"/>
-      </dsp:style>
-      <dsp:txBody>
-        <a:bodyPr spcFirstLastPara="0" vert="horz" wrap="square" lIns="53340" tIns="53340" rIns="53340" bIns="53340" numCol="1" spcCol="1270" anchor="t" anchorCtr="0">
-          <a:noAutofit/>
-        </a:bodyPr>
-        <a:lstStyle/>
-        <a:p>
-          <a:pPr marL="57150" lvl="1" indent="-57150" algn="l" defTabSz="488950">
-            <a:lnSpc>
-              <a:spcPct val="90000"/>
-            </a:lnSpc>
-            <a:spcBef>
-              <a:spcPct val="0"/>
-            </a:spcBef>
-            <a:spcAft>
-              <a:spcPct val="15000"/>
-            </a:spcAft>
-            <a:buChar char="••"/>
-          </a:pPr>
-          <a:r>
-            <a:rPr lang="fr-FR" sz="1100" kern="1200" dirty="0"/>
-            <a:t>Diverse </a:t>
-          </a:r>
-          <a:r>
-            <a:rPr lang="fr-FR" sz="1100" kern="1200" dirty="0" err="1"/>
-            <a:t>skill</a:t>
-          </a:r>
-          <a:r>
-            <a:rPr lang="fr-FR" sz="1100" kern="1200" dirty="0"/>
-            <a:t> set</a:t>
-          </a:r>
-        </a:p>
-        <a:p>
-          <a:pPr marL="57150" lvl="1" indent="-57150" algn="l" defTabSz="488950">
-            <a:lnSpc>
-              <a:spcPct val="90000"/>
-            </a:lnSpc>
-            <a:spcBef>
-              <a:spcPct val="0"/>
-            </a:spcBef>
-            <a:spcAft>
-              <a:spcPct val="15000"/>
-            </a:spcAft>
-            <a:buChar char="••"/>
-          </a:pPr>
-          <a:r>
-            <a:rPr lang="fr-FR" sz="1100" kern="1200" dirty="0"/>
-            <a:t>Access to expert </a:t>
-          </a:r>
-          <a:r>
-            <a:rPr lang="fr-FR" sz="1100" kern="1200" dirty="0" err="1"/>
-            <a:t>advise</a:t>
-          </a:r>
-          <a:endParaRPr lang="fr-FR" sz="1100" kern="1200" dirty="0"/>
-        </a:p>
-        <a:p>
-          <a:pPr marL="57150" lvl="1" indent="-57150" algn="l" defTabSz="488950">
-            <a:lnSpc>
-              <a:spcPct val="90000"/>
-            </a:lnSpc>
-            <a:spcBef>
-              <a:spcPct val="0"/>
-            </a:spcBef>
-            <a:spcAft>
-              <a:spcPct val="15000"/>
-            </a:spcAft>
-            <a:buChar char="••"/>
-          </a:pPr>
-          <a:r>
-            <a:rPr lang="fr-FR" sz="1100" kern="1200" dirty="0"/>
-            <a:t>Open source </a:t>
-          </a:r>
-          <a:r>
-            <a:rPr lang="fr-FR" sz="1100" kern="1200" dirty="0" smtClean="0"/>
-            <a:t>packages (no budget </a:t>
-          </a:r>
-          <a:r>
-            <a:rPr lang="fr-FR" sz="1100" kern="1200" dirty="0" err="1" smtClean="0"/>
-            <a:t>needed</a:t>
-          </a:r>
-          <a:r>
-            <a:rPr lang="fr-FR" sz="1100" kern="1200" dirty="0" smtClean="0"/>
-            <a:t>)</a:t>
-          </a:r>
-          <a:endParaRPr lang="fr-FR" sz="1100" kern="1200" dirty="0"/>
-        </a:p>
-      </dsp:txBody>
-      <dsp:txXfrm>
-        <a:off x="593263" y="30740"/>
-        <a:ext cx="1450716" cy="988049"/>
-      </dsp:txXfrm>
-    </dsp:sp>
-    <dsp:sp modelId="{E72BDFA6-376E-4614-9D7C-A68241E884D9}">
-      <dsp:nvSpPr>
-        <dsp:cNvPr id="0" name=""/>
-        <dsp:cNvSpPr/>
-      </dsp:nvSpPr>
-      <dsp:spPr>
-        <a:xfrm>
-          <a:off x="1467742" y="249263"/>
-          <a:ext cx="1893525" cy="1893525"/>
-        </a:xfrm>
-        <a:prstGeom prst="pieWedge">
-          <a:avLst/>
-        </a:prstGeom>
-        <a:gradFill rotWithShape="0">
-          <a:gsLst>
-            <a:gs pos="0">
-              <a:schemeClr val="accent2">
-                <a:hueOff val="0"/>
-                <a:satOff val="0"/>
-                <a:lumOff val="0"/>
-                <a:alphaOff val="0"/>
-                <a:satMod val="103000"/>
-                <a:lumMod val="102000"/>
-                <a:tint val="94000"/>
-              </a:schemeClr>
-            </a:gs>
-            <a:gs pos="50000">
-              <a:schemeClr val="accent2">
-                <a:hueOff val="0"/>
-                <a:satOff val="0"/>
-                <a:lumOff val="0"/>
-                <a:alphaOff val="0"/>
-                <a:satMod val="110000"/>
-                <a:lumMod val="100000"/>
-                <a:shade val="100000"/>
-              </a:schemeClr>
-            </a:gs>
-            <a:gs pos="100000">
-              <a:schemeClr val="accent2">
-                <a:hueOff val="0"/>
-                <a:satOff val="0"/>
-                <a:lumOff val="0"/>
-                <a:alphaOff val="0"/>
-                <a:lumMod val="99000"/>
-                <a:satMod val="120000"/>
-                <a:shade val="78000"/>
-              </a:schemeClr>
-            </a:gs>
-          </a:gsLst>
-          <a:lin ang="5400000" scaled="0"/>
-        </a:gradFill>
-        <a:ln>
-          <a:noFill/>
-        </a:ln>
-        <a:effectLst/>
-        <a:scene3d>
-          <a:camera prst="orthographicFront"/>
-          <a:lightRig rig="flat" dir="t"/>
-        </a:scene3d>
-        <a:sp3d prstMaterial="plastic">
-          <a:bevelT w="120900" h="88900"/>
-          <a:bevelB w="88900" h="31750" prst="angle"/>
-        </a:sp3d>
-      </dsp:spPr>
-      <dsp:style>
-        <a:lnRef idx="0">
-          <a:scrgbClr r="0" g="0" b="0"/>
-        </a:lnRef>
-        <a:fillRef idx="3">
-          <a:scrgbClr r="0" g="0" b="0"/>
-        </a:fillRef>
-        <a:effectRef idx="2">
-          <a:scrgbClr r="0" g="0" b="0"/>
-        </a:effectRef>
-        <a:fontRef idx="minor">
-          <a:schemeClr val="lt1"/>
-        </a:fontRef>
-      </dsp:style>
-      <dsp:txBody>
-        <a:bodyPr spcFirstLastPara="0" vert="horz" wrap="square" lIns="334264" tIns="334264" rIns="334264" bIns="334264" numCol="1" spcCol="1270" anchor="ctr" anchorCtr="0">
-          <a:noAutofit/>
-        </a:bodyPr>
-        <a:lstStyle/>
-        <a:p>
-          <a:pPr lvl="0" algn="ctr" defTabSz="2089150">
-            <a:lnSpc>
-              <a:spcPct val="90000"/>
-            </a:lnSpc>
-            <a:spcBef>
-              <a:spcPct val="0"/>
-            </a:spcBef>
-            <a:spcAft>
-              <a:spcPct val="35000"/>
-            </a:spcAft>
-          </a:pPr>
-          <a:r>
-            <a:rPr lang="fr-FR" sz="4700" kern="1200" dirty="0"/>
-            <a:t>S</a:t>
-          </a:r>
-        </a:p>
-      </dsp:txBody>
-      <dsp:txXfrm>
-        <a:off x="2022343" y="803864"/>
-        <a:ext cx="1338924" cy="1338924"/>
-      </dsp:txXfrm>
-    </dsp:sp>
-    <dsp:sp modelId="{A67A60E5-5291-49E4-B3E5-53A58B528285}">
-      <dsp:nvSpPr>
-        <dsp:cNvPr id="0" name=""/>
-        <dsp:cNvSpPr/>
-      </dsp:nvSpPr>
-      <dsp:spPr>
-        <a:xfrm rot="5400000">
-          <a:off x="3448728" y="249263"/>
-          <a:ext cx="1893525" cy="1893525"/>
-        </a:xfrm>
-        <a:prstGeom prst="pieWedge">
-          <a:avLst/>
-        </a:prstGeom>
-        <a:gradFill rotWithShape="0">
-          <a:gsLst>
-            <a:gs pos="0">
-              <a:schemeClr val="accent3">
-                <a:hueOff val="0"/>
-                <a:satOff val="0"/>
-                <a:lumOff val="0"/>
-                <a:alphaOff val="0"/>
-                <a:satMod val="103000"/>
-                <a:lumMod val="102000"/>
-                <a:tint val="94000"/>
-              </a:schemeClr>
-            </a:gs>
-            <a:gs pos="50000">
-              <a:schemeClr val="accent3">
-                <a:hueOff val="0"/>
-                <a:satOff val="0"/>
-                <a:lumOff val="0"/>
-                <a:alphaOff val="0"/>
-                <a:satMod val="110000"/>
-                <a:lumMod val="100000"/>
-                <a:shade val="100000"/>
-              </a:schemeClr>
-            </a:gs>
-            <a:gs pos="100000">
-              <a:schemeClr val="accent3">
-                <a:hueOff val="0"/>
-                <a:satOff val="0"/>
-                <a:lumOff val="0"/>
-                <a:alphaOff val="0"/>
-                <a:lumMod val="99000"/>
-                <a:satMod val="120000"/>
-                <a:shade val="78000"/>
-              </a:schemeClr>
-            </a:gs>
-          </a:gsLst>
-          <a:lin ang="5400000" scaled="0"/>
-        </a:gradFill>
-        <a:ln>
-          <a:noFill/>
-        </a:ln>
-        <a:effectLst/>
-        <a:scene3d>
-          <a:camera prst="orthographicFront"/>
-          <a:lightRig rig="flat" dir="t"/>
-        </a:scene3d>
-        <a:sp3d prstMaterial="plastic">
-          <a:bevelT w="120900" h="88900"/>
-          <a:bevelB w="88900" h="31750" prst="angle"/>
-        </a:sp3d>
-      </dsp:spPr>
-      <dsp:style>
-        <a:lnRef idx="0">
-          <a:scrgbClr r="0" g="0" b="0"/>
-        </a:lnRef>
-        <a:fillRef idx="3">
-          <a:scrgbClr r="0" g="0" b="0"/>
-        </a:fillRef>
-        <a:effectRef idx="2">
-          <a:scrgbClr r="0" g="0" b="0"/>
-        </a:effectRef>
-        <a:fontRef idx="minor">
-          <a:schemeClr val="lt1"/>
-        </a:fontRef>
-      </dsp:style>
-      <dsp:txBody>
-        <a:bodyPr spcFirstLastPara="0" vert="horz" wrap="square" lIns="334264" tIns="334264" rIns="334264" bIns="334264" numCol="1" spcCol="1270" anchor="ctr" anchorCtr="0">
-          <a:noAutofit/>
-        </a:bodyPr>
-        <a:lstStyle/>
-        <a:p>
-          <a:pPr lvl="0" algn="ctr" defTabSz="2089150">
-            <a:lnSpc>
-              <a:spcPct val="90000"/>
-            </a:lnSpc>
-            <a:spcBef>
-              <a:spcPct val="0"/>
-            </a:spcBef>
-            <a:spcAft>
-              <a:spcPct val="35000"/>
-            </a:spcAft>
-          </a:pPr>
-          <a:r>
-            <a:rPr lang="fr-FR" sz="4700" kern="1200" dirty="0"/>
-            <a:t>W</a:t>
-          </a:r>
-        </a:p>
-      </dsp:txBody>
-      <dsp:txXfrm rot="-5400000">
-        <a:off x="3448728" y="803864"/>
-        <a:ext cx="1338924" cy="1338924"/>
-      </dsp:txXfrm>
-    </dsp:sp>
-    <dsp:sp modelId="{CF4FC7F6-A89C-4633-A10E-BFE92B369DCD}">
-      <dsp:nvSpPr>
-        <dsp:cNvPr id="0" name=""/>
-        <dsp:cNvSpPr/>
-      </dsp:nvSpPr>
-      <dsp:spPr>
-        <a:xfrm rot="10800000">
-          <a:off x="3448728" y="2230249"/>
-          <a:ext cx="1893525" cy="1893525"/>
-        </a:xfrm>
-        <a:prstGeom prst="pieWedge">
-          <a:avLst/>
-        </a:prstGeom>
-        <a:gradFill rotWithShape="0">
-          <a:gsLst>
-            <a:gs pos="0">
-              <a:schemeClr val="accent4">
-                <a:hueOff val="0"/>
-                <a:satOff val="0"/>
-                <a:lumOff val="0"/>
-                <a:alphaOff val="0"/>
-                <a:satMod val="103000"/>
-                <a:lumMod val="102000"/>
-                <a:tint val="94000"/>
-              </a:schemeClr>
-            </a:gs>
-            <a:gs pos="50000">
-              <a:schemeClr val="accent4">
-                <a:hueOff val="0"/>
-                <a:satOff val="0"/>
-                <a:lumOff val="0"/>
-                <a:alphaOff val="0"/>
-                <a:satMod val="110000"/>
-                <a:lumMod val="100000"/>
-                <a:shade val="100000"/>
-              </a:schemeClr>
-            </a:gs>
-            <a:gs pos="100000">
-              <a:schemeClr val="accent4">
-                <a:hueOff val="0"/>
-                <a:satOff val="0"/>
-                <a:lumOff val="0"/>
-                <a:alphaOff val="0"/>
-                <a:lumMod val="99000"/>
-                <a:satMod val="120000"/>
-                <a:shade val="78000"/>
-              </a:schemeClr>
-            </a:gs>
-          </a:gsLst>
-          <a:lin ang="5400000" scaled="0"/>
-        </a:gradFill>
-        <a:ln>
-          <a:noFill/>
-        </a:ln>
-        <a:effectLst/>
-        <a:scene3d>
-          <a:camera prst="orthographicFront"/>
-          <a:lightRig rig="flat" dir="t"/>
-        </a:scene3d>
-        <a:sp3d prstMaterial="plastic">
-          <a:bevelT w="120900" h="88900"/>
-          <a:bevelB w="88900" h="31750" prst="angle"/>
-        </a:sp3d>
-      </dsp:spPr>
-      <dsp:style>
-        <a:lnRef idx="0">
-          <a:scrgbClr r="0" g="0" b="0"/>
-        </a:lnRef>
-        <a:fillRef idx="3">
-          <a:scrgbClr r="0" g="0" b="0"/>
-        </a:fillRef>
-        <a:effectRef idx="2">
-          <a:scrgbClr r="0" g="0" b="0"/>
-        </a:effectRef>
-        <a:fontRef idx="minor">
-          <a:schemeClr val="lt1"/>
-        </a:fontRef>
-      </dsp:style>
-      <dsp:txBody>
-        <a:bodyPr spcFirstLastPara="0" vert="horz" wrap="square" lIns="334264" tIns="334264" rIns="334264" bIns="334264" numCol="1" spcCol="1270" anchor="ctr" anchorCtr="0">
-          <a:noAutofit/>
-        </a:bodyPr>
-        <a:lstStyle/>
-        <a:p>
-          <a:pPr lvl="0" algn="ctr" defTabSz="2089150">
-            <a:lnSpc>
-              <a:spcPct val="90000"/>
-            </a:lnSpc>
-            <a:spcBef>
-              <a:spcPct val="0"/>
-            </a:spcBef>
-            <a:spcAft>
-              <a:spcPct val="35000"/>
-            </a:spcAft>
-          </a:pPr>
-          <a:r>
-            <a:rPr lang="fr-FR" sz="4700" kern="1200" dirty="0"/>
-            <a:t>T</a:t>
-          </a:r>
-        </a:p>
-      </dsp:txBody>
-      <dsp:txXfrm rot="10800000">
-        <a:off x="3448728" y="2230249"/>
-        <a:ext cx="1338924" cy="1338924"/>
-      </dsp:txXfrm>
-    </dsp:sp>
-    <dsp:sp modelId="{C0852406-3DC0-4222-A1F8-184593FC4596}">
-      <dsp:nvSpPr>
-        <dsp:cNvPr id="0" name=""/>
-        <dsp:cNvSpPr/>
-      </dsp:nvSpPr>
-      <dsp:spPr>
-        <a:xfrm rot="16200000">
-          <a:off x="1467742" y="2230249"/>
-          <a:ext cx="1893525" cy="1893525"/>
-        </a:xfrm>
-        <a:prstGeom prst="pieWedge">
-          <a:avLst/>
-        </a:prstGeom>
-        <a:gradFill rotWithShape="0">
-          <a:gsLst>
-            <a:gs pos="0">
-              <a:schemeClr val="accent5">
-                <a:hueOff val="0"/>
-                <a:satOff val="0"/>
-                <a:lumOff val="0"/>
-                <a:alphaOff val="0"/>
-                <a:satMod val="103000"/>
-                <a:lumMod val="102000"/>
-                <a:tint val="94000"/>
-              </a:schemeClr>
-            </a:gs>
-            <a:gs pos="50000">
-              <a:schemeClr val="accent5">
-                <a:hueOff val="0"/>
-                <a:satOff val="0"/>
-                <a:lumOff val="0"/>
-                <a:alphaOff val="0"/>
-                <a:satMod val="110000"/>
-                <a:lumMod val="100000"/>
-                <a:shade val="100000"/>
-              </a:schemeClr>
-            </a:gs>
-            <a:gs pos="100000">
-              <a:schemeClr val="accent5">
-                <a:hueOff val="0"/>
-                <a:satOff val="0"/>
-                <a:lumOff val="0"/>
-                <a:alphaOff val="0"/>
-                <a:lumMod val="99000"/>
-                <a:satMod val="120000"/>
-                <a:shade val="78000"/>
-              </a:schemeClr>
-            </a:gs>
-          </a:gsLst>
-          <a:lin ang="5400000" scaled="0"/>
-        </a:gradFill>
-        <a:ln>
-          <a:noFill/>
-        </a:ln>
-        <a:effectLst/>
-        <a:scene3d>
-          <a:camera prst="orthographicFront"/>
-          <a:lightRig rig="flat" dir="t"/>
-        </a:scene3d>
-        <a:sp3d prstMaterial="plastic">
-          <a:bevelT w="120900" h="88900"/>
-          <a:bevelB w="88900" h="31750" prst="angle"/>
-        </a:sp3d>
-      </dsp:spPr>
-      <dsp:style>
-        <a:lnRef idx="0">
-          <a:scrgbClr r="0" g="0" b="0"/>
-        </a:lnRef>
-        <a:fillRef idx="3">
-          <a:scrgbClr r="0" g="0" b="0"/>
-        </a:fillRef>
-        <a:effectRef idx="2">
-          <a:scrgbClr r="0" g="0" b="0"/>
-        </a:effectRef>
-        <a:fontRef idx="minor">
-          <a:schemeClr val="lt1"/>
-        </a:fontRef>
-      </dsp:style>
-      <dsp:txBody>
-        <a:bodyPr spcFirstLastPara="0" vert="horz" wrap="square" lIns="334264" tIns="334264" rIns="334264" bIns="334264" numCol="1" spcCol="1270" anchor="ctr" anchorCtr="0">
-          <a:noAutofit/>
-        </a:bodyPr>
-        <a:lstStyle/>
-        <a:p>
-          <a:pPr lvl="0" algn="ctr" defTabSz="2089150">
-            <a:lnSpc>
-              <a:spcPct val="90000"/>
-            </a:lnSpc>
-            <a:spcBef>
-              <a:spcPct val="0"/>
-            </a:spcBef>
-            <a:spcAft>
-              <a:spcPct val="35000"/>
-            </a:spcAft>
-          </a:pPr>
-          <a:r>
-            <a:rPr lang="fr-FR" sz="4700" kern="1200" dirty="0"/>
-            <a:t>O</a:t>
-          </a:r>
-        </a:p>
-      </dsp:txBody>
-      <dsp:txXfrm rot="5400000">
-        <a:off x="2022343" y="2230249"/>
-        <a:ext cx="1338924" cy="1338924"/>
-      </dsp:txXfrm>
-    </dsp:sp>
-    <dsp:sp modelId="{3B6382B4-DDDF-482E-9E6A-38E6F7DB930C}">
-      <dsp:nvSpPr>
-        <dsp:cNvPr id="0" name=""/>
-        <dsp:cNvSpPr/>
-      </dsp:nvSpPr>
-      <dsp:spPr>
-        <a:xfrm>
-          <a:off x="5778076" y="1808005"/>
-          <a:ext cx="653769" cy="568494"/>
-        </a:xfrm>
-        <a:prstGeom prst="circularArrow">
-          <a:avLst/>
-        </a:prstGeom>
-        <a:solidFill>
-          <a:schemeClr val="accent2">
-            <a:tint val="40000"/>
-            <a:hueOff val="0"/>
-            <a:satOff val="0"/>
-            <a:lumOff val="0"/>
-            <a:alpha val="0"/>
-          </a:schemeClr>
-        </a:solidFill>
-        <a:ln>
-          <a:noFill/>
-        </a:ln>
-        <a:effectLst>
-          <a:outerShdw blurRad="57150" dist="19050" dir="5400000" algn="ctr" rotWithShape="0">
-            <a:srgbClr val="000000">
-              <a:alpha val="63000"/>
-            </a:srgbClr>
-          </a:outerShdw>
-        </a:effectLst>
-        <a:scene3d>
-          <a:camera prst="orthographicFront"/>
-          <a:lightRig rig="flat" dir="t"/>
-        </a:scene3d>
-        <a:sp3d z="190500" prstMaterial="plastic">
-          <a:bevelT w="120900" h="88900"/>
-          <a:bevelB w="88900" h="31750" prst="angle"/>
-        </a:sp3d>
-      </dsp:spPr>
-      <dsp:style>
-        <a:lnRef idx="0">
-          <a:scrgbClr r="0" g="0" b="0"/>
-        </a:lnRef>
-        <a:fillRef idx="1">
-          <a:scrgbClr r="0" g="0" b="0"/>
-        </a:fillRef>
-        <a:effectRef idx="3">
-          <a:scrgbClr r="0" g="0" b="0"/>
-        </a:effectRef>
-        <a:fontRef idx="minor">
-          <a:schemeClr val="lt1"/>
-        </a:fontRef>
-      </dsp:style>
-    </dsp:sp>
-    <dsp:sp modelId="{72B333DC-EBE8-4650-A713-61338E0F2C2D}">
-      <dsp:nvSpPr>
-        <dsp:cNvPr id="0" name=""/>
-        <dsp:cNvSpPr/>
-      </dsp:nvSpPr>
-      <dsp:spPr>
-        <a:xfrm rot="10800000">
-          <a:off x="5778076" y="1891116"/>
-          <a:ext cx="653769" cy="568494"/>
-        </a:xfrm>
-        <a:prstGeom prst="circularArrow">
-          <a:avLst/>
-        </a:prstGeom>
-        <a:solidFill>
-          <a:schemeClr val="accent2">
-            <a:tint val="40000"/>
-            <a:hueOff val="0"/>
-            <a:satOff val="0"/>
-            <a:lumOff val="0"/>
-            <a:alpha val="0"/>
-          </a:schemeClr>
-        </a:solidFill>
-        <a:ln>
-          <a:noFill/>
-        </a:ln>
-        <a:effectLst>
-          <a:outerShdw blurRad="57150" dist="19050" dir="5400000" algn="ctr" rotWithShape="0">
-            <a:srgbClr val="000000">
-              <a:alpha val="63000"/>
-            </a:srgbClr>
-          </a:outerShdw>
-        </a:effectLst>
-        <a:scene3d>
-          <a:camera prst="orthographicFront"/>
-          <a:lightRig rig="flat" dir="t"/>
-        </a:scene3d>
-        <a:sp3d z="190500" prstMaterial="plastic">
-          <a:bevelT w="120900" h="88900"/>
-          <a:bevelB w="88900" h="31750" prst="angle"/>
-        </a:sp3d>
-      </dsp:spPr>
-      <dsp:style>
-        <a:lnRef idx="0">
-          <a:scrgbClr r="0" g="0" b="0"/>
-        </a:lnRef>
-        <a:fillRef idx="1">
-          <a:scrgbClr r="0" g="0" b="0"/>
-        </a:fillRef>
-        <a:effectRef idx="3">
-          <a:scrgbClr r="0" g="0" b="0"/>
-        </a:effectRef>
-        <a:fontRef idx="minor">
-          <a:schemeClr val="lt1"/>
-        </a:fontRef>
-      </dsp:style>
-    </dsp:sp>
   </dsp:spTree>
 </dsp:drawing>
 </file>
@@ -5756,568 +4644,6 @@
       <dsp:cNvGrpSpPr/>
     </dsp:nvGrpSpPr>
     <dsp:grpSpPr/>
-    <dsp:sp modelId="{334F0DA9-4D69-40E7-AE37-8BB2E71C3ACD}">
-      <dsp:nvSpPr>
-        <dsp:cNvPr id="0" name=""/>
-        <dsp:cNvSpPr/>
-      </dsp:nvSpPr>
-      <dsp:spPr>
-        <a:xfrm>
-          <a:off x="2161156" y="1846422"/>
-          <a:ext cx="1405505" cy="1405505"/>
-        </a:xfrm>
-        <a:prstGeom prst="ellipse">
-          <a:avLst/>
-        </a:prstGeom>
-        <a:solidFill>
-          <a:srgbClr val="FFC000"/>
-        </a:solidFill>
-        <a:ln>
-          <a:noFill/>
-        </a:ln>
-        <a:effectLst/>
-        <a:scene3d>
-          <a:camera prst="orthographicFront"/>
-          <a:lightRig rig="flat" dir="t"/>
-        </a:scene3d>
-        <a:sp3d prstMaterial="plastic">
-          <a:bevelT w="120900" h="88900"/>
-          <a:bevelB w="88900" h="31750" prst="angle"/>
-        </a:sp3d>
-      </dsp:spPr>
-      <dsp:style>
-        <a:lnRef idx="0">
-          <a:scrgbClr r="0" g="0" b="0"/>
-        </a:lnRef>
-        <a:fillRef idx="3">
-          <a:scrgbClr r="0" g="0" b="0"/>
-        </a:fillRef>
-        <a:effectRef idx="2">
-          <a:scrgbClr r="0" g="0" b="0"/>
-        </a:effectRef>
-        <a:fontRef idx="minor">
-          <a:schemeClr val="lt1"/>
-        </a:fontRef>
-      </dsp:style>
-      <dsp:txBody>
-        <a:bodyPr spcFirstLastPara="0" vert="horz" wrap="square" lIns="41275" tIns="41275" rIns="41275" bIns="41275" numCol="1" spcCol="1270" anchor="ctr" anchorCtr="0">
-          <a:noAutofit/>
-        </a:bodyPr>
-        <a:lstStyle/>
-        <a:p>
-          <a:pPr lvl="0" algn="ctr" defTabSz="2889250">
-            <a:lnSpc>
-              <a:spcPct val="90000"/>
-            </a:lnSpc>
-            <a:spcBef>
-              <a:spcPct val="0"/>
-            </a:spcBef>
-            <a:spcAft>
-              <a:spcPct val="35000"/>
-            </a:spcAft>
-          </a:pPr>
-          <a:r>
-            <a:rPr lang="fr-FR" sz="6500" kern="1200" dirty="0"/>
-            <a:t>T</a:t>
-          </a:r>
-        </a:p>
-      </dsp:txBody>
-      <dsp:txXfrm>
-        <a:off x="2366987" y="2052253"/>
-        <a:ext cx="993843" cy="993843"/>
-      </dsp:txXfrm>
-    </dsp:sp>
-    <dsp:sp modelId="{FB6E935B-AB56-4686-BAF4-89171D311D48}">
-      <dsp:nvSpPr>
-        <dsp:cNvPr id="0" name=""/>
-        <dsp:cNvSpPr/>
-      </dsp:nvSpPr>
-      <dsp:spPr>
-        <a:xfrm rot="16200000">
-          <a:off x="2651363" y="1611792"/>
-          <a:ext cx="425090" cy="44168"/>
-        </a:xfrm>
-        <a:custGeom>
-          <a:avLst/>
-          <a:gdLst/>
-          <a:ahLst/>
-          <a:cxnLst/>
-          <a:rect l="0" t="0" r="0" b="0"/>
-          <a:pathLst>
-            <a:path>
-              <a:moveTo>
-                <a:pt x="0" y="22084"/>
-              </a:moveTo>
-              <a:lnTo>
-                <a:pt x="425090" y="22084"/>
-              </a:lnTo>
-            </a:path>
-          </a:pathLst>
-        </a:custGeom>
-        <a:noFill/>
-        <a:ln w="12700" cap="flat" cmpd="sng" algn="ctr">
-          <a:solidFill>
-            <a:schemeClr val="accent2">
-              <a:hueOff val="0"/>
-              <a:satOff val="0"/>
-              <a:lumOff val="0"/>
-              <a:alphaOff val="0"/>
-            </a:schemeClr>
-          </a:solidFill>
-          <a:prstDash val="solid"/>
-          <a:miter lim="800000"/>
-        </a:ln>
-        <a:effectLst/>
-        <a:scene3d>
-          <a:camera prst="orthographicFront"/>
-          <a:lightRig rig="flat" dir="t"/>
-        </a:scene3d>
-        <a:sp3d prstMaterial="matte"/>
-      </dsp:spPr>
-      <dsp:style>
-        <a:lnRef idx="2">
-          <a:scrgbClr r="0" g="0" b="0"/>
-        </a:lnRef>
-        <a:fillRef idx="0">
-          <a:scrgbClr r="0" g="0" b="0"/>
-        </a:fillRef>
-        <a:effectRef idx="0">
-          <a:scrgbClr r="0" g="0" b="0"/>
-        </a:effectRef>
-        <a:fontRef idx="minor"/>
-      </dsp:style>
-      <dsp:txBody>
-        <a:bodyPr spcFirstLastPara="0" vert="horz" wrap="square" lIns="12700" tIns="0" rIns="12700" bIns="0" numCol="1" spcCol="1270" anchor="ctr" anchorCtr="0">
-          <a:noAutofit/>
-        </a:bodyPr>
-        <a:lstStyle/>
-        <a:p>
-          <a:pPr lvl="0" algn="ctr" defTabSz="222250">
-            <a:lnSpc>
-              <a:spcPct val="90000"/>
-            </a:lnSpc>
-            <a:spcBef>
-              <a:spcPct val="0"/>
-            </a:spcBef>
-            <a:spcAft>
-              <a:spcPct val="35000"/>
-            </a:spcAft>
-          </a:pPr>
-          <a:endParaRPr lang="fr-FR" sz="500" kern="1200"/>
-        </a:p>
-      </dsp:txBody>
-      <dsp:txXfrm>
-        <a:off x="2853281" y="1623249"/>
-        <a:ext cx="21254" cy="21254"/>
-      </dsp:txXfrm>
-    </dsp:sp>
-    <dsp:sp modelId="{51D4E2D9-6364-4FE7-BE7F-89898165258A}">
-      <dsp:nvSpPr>
-        <dsp:cNvPr id="0" name=""/>
-        <dsp:cNvSpPr/>
-      </dsp:nvSpPr>
-      <dsp:spPr>
-        <a:xfrm>
-          <a:off x="2161156" y="15826"/>
-          <a:ext cx="1405505" cy="1405505"/>
-        </a:xfrm>
-        <a:prstGeom prst="ellipse">
-          <a:avLst/>
-        </a:prstGeom>
-        <a:solidFill>
-          <a:srgbClr val="00B050"/>
-        </a:solidFill>
-        <a:ln>
-          <a:noFill/>
-        </a:ln>
-        <a:effectLst/>
-        <a:scene3d>
-          <a:camera prst="orthographicFront"/>
-          <a:lightRig rig="flat" dir="t"/>
-        </a:scene3d>
-        <a:sp3d prstMaterial="plastic">
-          <a:bevelT w="120900" h="88900"/>
-          <a:bevelB w="88900" h="31750" prst="angle"/>
-        </a:sp3d>
-      </dsp:spPr>
-      <dsp:style>
-        <a:lnRef idx="0">
-          <a:scrgbClr r="0" g="0" b="0"/>
-        </a:lnRef>
-        <a:fillRef idx="3">
-          <a:scrgbClr r="0" g="0" b="0"/>
-        </a:fillRef>
-        <a:effectRef idx="2">
-          <a:scrgbClr r="0" g="0" b="0"/>
-        </a:effectRef>
-        <a:fontRef idx="minor">
-          <a:schemeClr val="lt1"/>
-        </a:fontRef>
-      </dsp:style>
-      <dsp:txBody>
-        <a:bodyPr spcFirstLastPara="0" vert="horz" wrap="square" lIns="10795" tIns="10795" rIns="10795" bIns="10795" numCol="1" spcCol="1270" anchor="ctr" anchorCtr="0">
-          <a:noAutofit/>
-        </a:bodyPr>
-        <a:lstStyle/>
-        <a:p>
-          <a:pPr lvl="0" algn="ctr" defTabSz="755650">
-            <a:lnSpc>
-              <a:spcPct val="90000"/>
-            </a:lnSpc>
-            <a:spcBef>
-              <a:spcPct val="0"/>
-            </a:spcBef>
-            <a:spcAft>
-              <a:spcPct val="35000"/>
-            </a:spcAft>
-          </a:pPr>
-          <a:r>
-            <a:rPr lang="fr-FR" sz="1700" kern="1200" dirty="0" err="1"/>
-            <a:t>Risk</a:t>
-          </a:r>
-          <a:r>
-            <a:rPr lang="fr-FR" sz="1700" kern="1200" dirty="0"/>
-            <a:t> of high </a:t>
-          </a:r>
-          <a:r>
-            <a:rPr lang="fr-FR" sz="1700" kern="1200" dirty="0" err="1"/>
-            <a:t>demand</a:t>
-          </a:r>
-          <a:r>
-            <a:rPr lang="fr-FR" sz="1700" kern="1200" dirty="0"/>
-            <a:t> (server)</a:t>
-          </a:r>
-        </a:p>
-      </dsp:txBody>
-      <dsp:txXfrm>
-        <a:off x="2366987" y="221657"/>
-        <a:ext cx="993843" cy="993843"/>
-      </dsp:txXfrm>
-    </dsp:sp>
-    <dsp:sp modelId="{3134C74D-D45F-4D44-8DA9-5DD9ACC7028A}">
-      <dsp:nvSpPr>
-        <dsp:cNvPr id="0" name=""/>
-        <dsp:cNvSpPr/>
-      </dsp:nvSpPr>
-      <dsp:spPr>
-        <a:xfrm rot="1800000">
-          <a:off x="3444034" y="2984739"/>
-          <a:ext cx="425090" cy="44168"/>
-        </a:xfrm>
-        <a:custGeom>
-          <a:avLst/>
-          <a:gdLst/>
-          <a:ahLst/>
-          <a:cxnLst/>
-          <a:rect l="0" t="0" r="0" b="0"/>
-          <a:pathLst>
-            <a:path>
-              <a:moveTo>
-                <a:pt x="0" y="22084"/>
-              </a:moveTo>
-              <a:lnTo>
-                <a:pt x="425090" y="22084"/>
-              </a:lnTo>
-            </a:path>
-          </a:pathLst>
-        </a:custGeom>
-        <a:noFill/>
-        <a:ln w="12700" cap="flat" cmpd="sng" algn="ctr">
-          <a:solidFill>
-            <a:schemeClr val="accent2">
-              <a:hueOff val="0"/>
-              <a:satOff val="0"/>
-              <a:lumOff val="0"/>
-              <a:alphaOff val="0"/>
-            </a:schemeClr>
-          </a:solidFill>
-          <a:prstDash val="solid"/>
-          <a:miter lim="800000"/>
-        </a:ln>
-        <a:effectLst/>
-        <a:scene3d>
-          <a:camera prst="orthographicFront"/>
-          <a:lightRig rig="flat" dir="t"/>
-        </a:scene3d>
-        <a:sp3d prstMaterial="matte"/>
-      </dsp:spPr>
-      <dsp:style>
-        <a:lnRef idx="2">
-          <a:scrgbClr r="0" g="0" b="0"/>
-        </a:lnRef>
-        <a:fillRef idx="0">
-          <a:scrgbClr r="0" g="0" b="0"/>
-        </a:fillRef>
-        <a:effectRef idx="0">
-          <a:scrgbClr r="0" g="0" b="0"/>
-        </a:effectRef>
-        <a:fontRef idx="minor"/>
-      </dsp:style>
-      <dsp:txBody>
-        <a:bodyPr spcFirstLastPara="0" vert="horz" wrap="square" lIns="12700" tIns="0" rIns="12700" bIns="0" numCol="1" spcCol="1270" anchor="ctr" anchorCtr="0">
-          <a:noAutofit/>
-        </a:bodyPr>
-        <a:lstStyle/>
-        <a:p>
-          <a:pPr lvl="0" algn="ctr" defTabSz="222250">
-            <a:lnSpc>
-              <a:spcPct val="90000"/>
-            </a:lnSpc>
-            <a:spcBef>
-              <a:spcPct val="0"/>
-            </a:spcBef>
-            <a:spcAft>
-              <a:spcPct val="35000"/>
-            </a:spcAft>
-          </a:pPr>
-          <a:endParaRPr lang="en-CA" sz="500" kern="1200"/>
-        </a:p>
-      </dsp:txBody>
-      <dsp:txXfrm>
-        <a:off x="3645952" y="2996196"/>
-        <a:ext cx="21254" cy="21254"/>
-      </dsp:txXfrm>
-    </dsp:sp>
-    <dsp:sp modelId="{FC75532D-1A75-4D81-A458-80C91B398F9D}">
-      <dsp:nvSpPr>
-        <dsp:cNvPr id="0" name=""/>
-        <dsp:cNvSpPr/>
-      </dsp:nvSpPr>
-      <dsp:spPr>
-        <a:xfrm>
-          <a:off x="3746498" y="2761719"/>
-          <a:ext cx="1405505" cy="1405505"/>
-        </a:xfrm>
-        <a:prstGeom prst="ellipse">
-          <a:avLst/>
-        </a:prstGeom>
-        <a:solidFill>
-          <a:srgbClr val="00B050"/>
-        </a:solidFill>
-        <a:ln>
-          <a:noFill/>
-        </a:ln>
-        <a:effectLst/>
-        <a:scene3d>
-          <a:camera prst="orthographicFront"/>
-          <a:lightRig rig="flat" dir="t"/>
-        </a:scene3d>
-        <a:sp3d prstMaterial="plastic">
-          <a:bevelT w="120900" h="88900"/>
-          <a:bevelB w="88900" h="31750" prst="angle"/>
-        </a:sp3d>
-      </dsp:spPr>
-      <dsp:style>
-        <a:lnRef idx="0">
-          <a:scrgbClr r="0" g="0" b="0"/>
-        </a:lnRef>
-        <a:fillRef idx="3">
-          <a:scrgbClr r="0" g="0" b="0"/>
-        </a:fillRef>
-        <a:effectRef idx="2">
-          <a:scrgbClr r="0" g="0" b="0"/>
-        </a:effectRef>
-        <a:fontRef idx="minor">
-          <a:schemeClr val="lt1"/>
-        </a:fontRef>
-      </dsp:style>
-      <dsp:txBody>
-        <a:bodyPr spcFirstLastPara="0" vert="horz" wrap="square" lIns="10795" tIns="10795" rIns="10795" bIns="10795" numCol="1" spcCol="1270" anchor="ctr" anchorCtr="0">
-          <a:noAutofit/>
-        </a:bodyPr>
-        <a:lstStyle/>
-        <a:p>
-          <a:pPr lvl="0" algn="ctr" defTabSz="755650">
-            <a:lnSpc>
-              <a:spcPct val="90000"/>
-            </a:lnSpc>
-            <a:spcBef>
-              <a:spcPct val="0"/>
-            </a:spcBef>
-            <a:spcAft>
-              <a:spcPct val="35000"/>
-            </a:spcAft>
-          </a:pPr>
-          <a:r>
-            <a:rPr lang="fr-FR" sz="1700" kern="1200" dirty="0" err="1" smtClean="0"/>
-            <a:t>Portability</a:t>
-          </a:r>
-          <a:r>
-            <a:rPr lang="fr-FR" sz="1700" kern="1200" dirty="0" smtClean="0"/>
-            <a:t> to Mac</a:t>
-          </a:r>
-          <a:endParaRPr lang="fr-FR" sz="1700" kern="1200" dirty="0"/>
-        </a:p>
-      </dsp:txBody>
-      <dsp:txXfrm>
-        <a:off x="3952329" y="2967550"/>
-        <a:ext cx="993843" cy="993843"/>
-      </dsp:txXfrm>
-    </dsp:sp>
-    <dsp:sp modelId="{156A4B50-5EBB-4BD2-8AF0-C722439DBC8D}">
-      <dsp:nvSpPr>
-        <dsp:cNvPr id="0" name=""/>
-        <dsp:cNvSpPr/>
-      </dsp:nvSpPr>
-      <dsp:spPr>
-        <a:xfrm rot="9000000">
-          <a:off x="1858692" y="2984739"/>
-          <a:ext cx="425090" cy="44168"/>
-        </a:xfrm>
-        <a:custGeom>
-          <a:avLst/>
-          <a:gdLst/>
-          <a:ahLst/>
-          <a:cxnLst/>
-          <a:rect l="0" t="0" r="0" b="0"/>
-          <a:pathLst>
-            <a:path>
-              <a:moveTo>
-                <a:pt x="0" y="22084"/>
-              </a:moveTo>
-              <a:lnTo>
-                <a:pt x="425090" y="22084"/>
-              </a:lnTo>
-            </a:path>
-          </a:pathLst>
-        </a:custGeom>
-        <a:noFill/>
-        <a:ln w="12700" cap="flat" cmpd="sng" algn="ctr">
-          <a:solidFill>
-            <a:schemeClr val="accent2">
-              <a:hueOff val="0"/>
-              <a:satOff val="0"/>
-              <a:lumOff val="0"/>
-              <a:alphaOff val="0"/>
-            </a:schemeClr>
-          </a:solidFill>
-          <a:prstDash val="solid"/>
-          <a:miter lim="800000"/>
-        </a:ln>
-        <a:effectLst/>
-        <a:scene3d>
-          <a:camera prst="orthographicFront"/>
-          <a:lightRig rig="flat" dir="t"/>
-        </a:scene3d>
-        <a:sp3d prstMaterial="matte"/>
-      </dsp:spPr>
-      <dsp:style>
-        <a:lnRef idx="2">
-          <a:scrgbClr r="0" g="0" b="0"/>
-        </a:lnRef>
-        <a:fillRef idx="0">
-          <a:scrgbClr r="0" g="0" b="0"/>
-        </a:fillRef>
-        <a:effectRef idx="0">
-          <a:scrgbClr r="0" g="0" b="0"/>
-        </a:effectRef>
-        <a:fontRef idx="minor"/>
-      </dsp:style>
-      <dsp:txBody>
-        <a:bodyPr spcFirstLastPara="0" vert="horz" wrap="square" lIns="12700" tIns="0" rIns="12700" bIns="0" numCol="1" spcCol="1270" anchor="ctr" anchorCtr="0">
-          <a:noAutofit/>
-        </a:bodyPr>
-        <a:lstStyle/>
-        <a:p>
-          <a:pPr lvl="0" algn="ctr" defTabSz="222250">
-            <a:lnSpc>
-              <a:spcPct val="90000"/>
-            </a:lnSpc>
-            <a:spcBef>
-              <a:spcPct val="0"/>
-            </a:spcBef>
-            <a:spcAft>
-              <a:spcPct val="35000"/>
-            </a:spcAft>
-          </a:pPr>
-          <a:endParaRPr lang="en-CA" sz="500" kern="1200"/>
-        </a:p>
-      </dsp:txBody>
-      <dsp:txXfrm rot="10800000">
-        <a:off x="2060610" y="2996196"/>
-        <a:ext cx="21254" cy="21254"/>
-      </dsp:txXfrm>
-    </dsp:sp>
-    <dsp:sp modelId="{B8775ABA-3037-409F-B1F5-5479D38AC897}">
-      <dsp:nvSpPr>
-        <dsp:cNvPr id="0" name=""/>
-        <dsp:cNvSpPr/>
-      </dsp:nvSpPr>
-      <dsp:spPr>
-        <a:xfrm>
-          <a:off x="575814" y="2761719"/>
-          <a:ext cx="1405505" cy="1405505"/>
-        </a:xfrm>
-        <a:prstGeom prst="ellipse">
-          <a:avLst/>
-        </a:prstGeom>
-        <a:solidFill>
-          <a:srgbClr val="00B050"/>
-        </a:solidFill>
-        <a:ln>
-          <a:noFill/>
-        </a:ln>
-        <a:effectLst/>
-        <a:scene3d>
-          <a:camera prst="orthographicFront"/>
-          <a:lightRig rig="flat" dir="t"/>
-        </a:scene3d>
-        <a:sp3d prstMaterial="plastic">
-          <a:bevelT w="120900" h="88900"/>
-          <a:bevelB w="88900" h="31750" prst="angle"/>
-        </a:sp3d>
-      </dsp:spPr>
-      <dsp:style>
-        <a:lnRef idx="0">
-          <a:scrgbClr r="0" g="0" b="0"/>
-        </a:lnRef>
-        <a:fillRef idx="3">
-          <a:scrgbClr r="0" g="0" b="0"/>
-        </a:fillRef>
-        <a:effectRef idx="2">
-          <a:scrgbClr r="0" g="0" b="0"/>
-        </a:effectRef>
-        <a:fontRef idx="minor">
-          <a:schemeClr val="lt1"/>
-        </a:fontRef>
-      </dsp:style>
-      <dsp:txBody>
-        <a:bodyPr spcFirstLastPara="0" vert="horz" wrap="square" lIns="10795" tIns="10795" rIns="10795" bIns="10795" numCol="1" spcCol="1270" anchor="ctr" anchorCtr="0">
-          <a:noAutofit/>
-        </a:bodyPr>
-        <a:lstStyle/>
-        <a:p>
-          <a:pPr lvl="0" algn="ctr" defTabSz="755650">
-            <a:lnSpc>
-              <a:spcPct val="90000"/>
-            </a:lnSpc>
-            <a:spcBef>
-              <a:spcPct val="0"/>
-            </a:spcBef>
-            <a:spcAft>
-              <a:spcPct val="35000"/>
-            </a:spcAft>
-          </a:pPr>
-          <a:r>
-            <a:rPr lang="fr-FR" sz="1700" kern="1200" dirty="0" err="1" smtClean="0"/>
-            <a:t>Lack</a:t>
-          </a:r>
-          <a:r>
-            <a:rPr lang="fr-FR" sz="1700" kern="1200" dirty="0" smtClean="0"/>
-            <a:t> of control on </a:t>
-          </a:r>
-          <a:r>
-            <a:rPr lang="fr-FR" sz="1700" kern="1200" dirty="0" err="1" smtClean="0"/>
-            <a:t>database</a:t>
-          </a:r>
-          <a:endParaRPr lang="fr-FR" sz="1700" kern="1200" dirty="0"/>
-        </a:p>
-      </dsp:txBody>
-      <dsp:txXfrm>
-        <a:off x="781645" y="2967550"/>
-        <a:ext cx="993843" cy="993843"/>
-      </dsp:txXfrm>
-    </dsp:sp>
   </dsp:spTree>
 </dsp:drawing>
 </file>
@@ -6330,528 +4656,6 @@
       <dsp:cNvGrpSpPr/>
     </dsp:nvGrpSpPr>
     <dsp:grpSpPr/>
-    <dsp:sp modelId="{90FFEDE6-D24B-46AA-AC61-5A2CA3E513CC}">
-      <dsp:nvSpPr>
-        <dsp:cNvPr id="0" name=""/>
-        <dsp:cNvSpPr/>
-      </dsp:nvSpPr>
-      <dsp:spPr>
-        <a:xfrm>
-          <a:off x="1949" y="0"/>
-          <a:ext cx="2043917" cy="4863689"/>
-        </a:xfrm>
-        <a:prstGeom prst="roundRect">
-          <a:avLst>
-            <a:gd name="adj" fmla="val 10000"/>
-          </a:avLst>
-        </a:prstGeom>
-        <a:solidFill>
-          <a:schemeClr val="dk2">
-            <a:hueOff val="0"/>
-            <a:satOff val="0"/>
-            <a:lumOff val="0"/>
-            <a:alphaOff val="0"/>
-          </a:schemeClr>
-        </a:solidFill>
-        <a:ln w="19050" cap="flat" cmpd="sng" algn="ctr">
-          <a:solidFill>
-            <a:schemeClr val="lt2">
-              <a:hueOff val="0"/>
-              <a:satOff val="0"/>
-              <a:lumOff val="0"/>
-              <a:alphaOff val="0"/>
-            </a:schemeClr>
-          </a:solidFill>
-          <a:prstDash val="solid"/>
-          <a:miter lim="800000"/>
-        </a:ln>
-        <a:effectLst/>
-      </dsp:spPr>
-      <dsp:style>
-        <a:lnRef idx="3">
-          <a:scrgbClr r="0" g="0" b="0"/>
-        </a:lnRef>
-        <a:fillRef idx="1">
-          <a:scrgbClr r="0" g="0" b="0"/>
-        </a:fillRef>
-        <a:effectRef idx="1">
-          <a:scrgbClr r="0" g="0" b="0"/>
-        </a:effectRef>
-        <a:fontRef idx="minor">
-          <a:schemeClr val="lt1"/>
-        </a:fontRef>
-      </dsp:style>
-      <dsp:txBody>
-        <a:bodyPr spcFirstLastPara="0" vert="horz" wrap="square" lIns="462280" tIns="462280" rIns="462280" bIns="462280" numCol="1" spcCol="1270" anchor="ctr" anchorCtr="0">
-          <a:noAutofit/>
-        </a:bodyPr>
-        <a:lstStyle/>
-        <a:p>
-          <a:pPr lvl="0" algn="ctr" defTabSz="2889250">
-            <a:lnSpc>
-              <a:spcPct val="90000"/>
-            </a:lnSpc>
-            <a:spcBef>
-              <a:spcPct val="0"/>
-            </a:spcBef>
-            <a:spcAft>
-              <a:spcPct val="35000"/>
-            </a:spcAft>
-          </a:pPr>
-          <a:endParaRPr lang="en-CA" sz="6500" kern="1200" dirty="0"/>
-        </a:p>
-      </dsp:txBody>
-      <dsp:txXfrm>
-        <a:off x="1949" y="1945475"/>
-        <a:ext cx="2043917" cy="1945475"/>
-      </dsp:txXfrm>
-    </dsp:sp>
-    <dsp:sp modelId="{BC5035FA-FF8E-421C-9C1A-CC3F16C8A221}">
-      <dsp:nvSpPr>
-        <dsp:cNvPr id="0" name=""/>
-        <dsp:cNvSpPr/>
-      </dsp:nvSpPr>
-      <dsp:spPr>
-        <a:xfrm>
-          <a:off x="214104" y="291821"/>
-          <a:ext cx="1619608" cy="1619608"/>
-        </a:xfrm>
-        <a:prstGeom prst="ellipse">
-          <a:avLst/>
-        </a:prstGeom>
-        <a:blipFill rotWithShape="1">
-          <a:blip xmlns:r="http://schemas.openxmlformats.org/officeDocument/2006/relationships" r:embed="rId1"/>
-          <a:stretch>
-            <a:fillRect/>
-          </a:stretch>
-        </a:blipFill>
-        <a:ln w="19050" cap="flat" cmpd="sng" algn="ctr">
-          <a:solidFill>
-            <a:schemeClr val="lt2">
-              <a:hueOff val="0"/>
-              <a:satOff val="0"/>
-              <a:lumOff val="0"/>
-              <a:alphaOff val="0"/>
-            </a:schemeClr>
-          </a:solidFill>
-          <a:prstDash val="solid"/>
-          <a:miter lim="800000"/>
-        </a:ln>
-        <a:effectLst/>
-      </dsp:spPr>
-      <dsp:style>
-        <a:lnRef idx="3">
-          <a:scrgbClr r="0" g="0" b="0"/>
-        </a:lnRef>
-        <a:fillRef idx="1">
-          <a:scrgbClr r="0" g="0" b="0"/>
-        </a:fillRef>
-        <a:effectRef idx="1">
-          <a:scrgbClr r="0" g="0" b="0"/>
-        </a:effectRef>
-        <a:fontRef idx="minor"/>
-      </dsp:style>
-    </dsp:sp>
-    <dsp:sp modelId="{AECDF339-533B-4319-9DD1-FE0312AA5FE7}">
-      <dsp:nvSpPr>
-        <dsp:cNvPr id="0" name=""/>
-        <dsp:cNvSpPr/>
-      </dsp:nvSpPr>
-      <dsp:spPr>
-        <a:xfrm>
-          <a:off x="2107184" y="0"/>
-          <a:ext cx="2043917" cy="4863689"/>
-        </a:xfrm>
-        <a:prstGeom prst="roundRect">
-          <a:avLst>
-            <a:gd name="adj" fmla="val 10000"/>
-          </a:avLst>
-        </a:prstGeom>
-        <a:solidFill>
-          <a:schemeClr val="dk2">
-            <a:hueOff val="0"/>
-            <a:satOff val="0"/>
-            <a:lumOff val="0"/>
-            <a:alphaOff val="0"/>
-          </a:schemeClr>
-        </a:solidFill>
-        <a:ln w="19050" cap="flat" cmpd="sng" algn="ctr">
-          <a:solidFill>
-            <a:schemeClr val="lt2">
-              <a:hueOff val="0"/>
-              <a:satOff val="0"/>
-              <a:lumOff val="0"/>
-              <a:alphaOff val="0"/>
-            </a:schemeClr>
-          </a:solidFill>
-          <a:prstDash val="solid"/>
-          <a:miter lim="800000"/>
-        </a:ln>
-        <a:effectLst/>
-      </dsp:spPr>
-      <dsp:style>
-        <a:lnRef idx="3">
-          <a:scrgbClr r="0" g="0" b="0"/>
-        </a:lnRef>
-        <a:fillRef idx="1">
-          <a:scrgbClr r="0" g="0" b="0"/>
-        </a:fillRef>
-        <a:effectRef idx="1">
-          <a:scrgbClr r="0" g="0" b="0"/>
-        </a:effectRef>
-        <a:fontRef idx="minor">
-          <a:schemeClr val="lt1"/>
-        </a:fontRef>
-      </dsp:style>
-      <dsp:txBody>
-        <a:bodyPr spcFirstLastPara="0" vert="horz" wrap="square" lIns="462280" tIns="462280" rIns="462280" bIns="462280" numCol="1" spcCol="1270" anchor="ctr" anchorCtr="0">
-          <a:noAutofit/>
-        </a:bodyPr>
-        <a:lstStyle/>
-        <a:p>
-          <a:pPr lvl="0" algn="ctr" defTabSz="2889250">
-            <a:lnSpc>
-              <a:spcPct val="90000"/>
-            </a:lnSpc>
-            <a:spcBef>
-              <a:spcPct val="0"/>
-            </a:spcBef>
-            <a:spcAft>
-              <a:spcPct val="35000"/>
-            </a:spcAft>
-          </a:pPr>
-          <a:endParaRPr lang="en-CA" sz="6500" kern="1200" dirty="0"/>
-        </a:p>
-      </dsp:txBody>
-      <dsp:txXfrm>
-        <a:off x="2107184" y="1945475"/>
-        <a:ext cx="2043917" cy="1945475"/>
-      </dsp:txXfrm>
-    </dsp:sp>
-    <dsp:sp modelId="{78D9365F-3E8A-4A62-874D-E842D8E395C6}">
-      <dsp:nvSpPr>
-        <dsp:cNvPr id="0" name=""/>
-        <dsp:cNvSpPr/>
-      </dsp:nvSpPr>
-      <dsp:spPr>
-        <a:xfrm>
-          <a:off x="2319339" y="291821"/>
-          <a:ext cx="1619608" cy="1619608"/>
-        </a:xfrm>
-        <a:prstGeom prst="ellipse">
-          <a:avLst/>
-        </a:prstGeom>
-        <a:blipFill rotWithShape="1">
-          <a:blip xmlns:r="http://schemas.openxmlformats.org/officeDocument/2006/relationships" r:embed="rId2"/>
-          <a:stretch>
-            <a:fillRect/>
-          </a:stretch>
-        </a:blipFill>
-        <a:ln w="19050" cap="flat" cmpd="sng" algn="ctr">
-          <a:solidFill>
-            <a:schemeClr val="lt2">
-              <a:hueOff val="0"/>
-              <a:satOff val="0"/>
-              <a:lumOff val="0"/>
-              <a:alphaOff val="0"/>
-            </a:schemeClr>
-          </a:solidFill>
-          <a:prstDash val="solid"/>
-          <a:miter lim="800000"/>
-        </a:ln>
-        <a:effectLst/>
-      </dsp:spPr>
-      <dsp:style>
-        <a:lnRef idx="3">
-          <a:scrgbClr r="0" g="0" b="0"/>
-        </a:lnRef>
-        <a:fillRef idx="1">
-          <a:scrgbClr r="0" g="0" b="0"/>
-        </a:fillRef>
-        <a:effectRef idx="1">
-          <a:scrgbClr r="0" g="0" b="0"/>
-        </a:effectRef>
-        <a:fontRef idx="minor"/>
-      </dsp:style>
-    </dsp:sp>
-    <dsp:sp modelId="{18E220CA-4E07-4273-9F20-D66E44D1CC15}">
-      <dsp:nvSpPr>
-        <dsp:cNvPr id="0" name=""/>
-        <dsp:cNvSpPr/>
-      </dsp:nvSpPr>
-      <dsp:spPr>
-        <a:xfrm>
-          <a:off x="4212419" y="0"/>
-          <a:ext cx="2043917" cy="4863689"/>
-        </a:xfrm>
-        <a:prstGeom prst="roundRect">
-          <a:avLst>
-            <a:gd name="adj" fmla="val 10000"/>
-          </a:avLst>
-        </a:prstGeom>
-        <a:solidFill>
-          <a:schemeClr val="dk2">
-            <a:hueOff val="0"/>
-            <a:satOff val="0"/>
-            <a:lumOff val="0"/>
-            <a:alphaOff val="0"/>
-          </a:schemeClr>
-        </a:solidFill>
-        <a:ln w="19050" cap="flat" cmpd="sng" algn="ctr">
-          <a:solidFill>
-            <a:schemeClr val="lt2">
-              <a:hueOff val="0"/>
-              <a:satOff val="0"/>
-              <a:lumOff val="0"/>
-              <a:alphaOff val="0"/>
-            </a:schemeClr>
-          </a:solidFill>
-          <a:prstDash val="solid"/>
-          <a:miter lim="800000"/>
-        </a:ln>
-        <a:effectLst/>
-      </dsp:spPr>
-      <dsp:style>
-        <a:lnRef idx="3">
-          <a:scrgbClr r="0" g="0" b="0"/>
-        </a:lnRef>
-        <a:fillRef idx="1">
-          <a:scrgbClr r="0" g="0" b="0"/>
-        </a:fillRef>
-        <a:effectRef idx="1">
-          <a:scrgbClr r="0" g="0" b="0"/>
-        </a:effectRef>
-        <a:fontRef idx="minor">
-          <a:schemeClr val="lt1"/>
-        </a:fontRef>
-      </dsp:style>
-      <dsp:txBody>
-        <a:bodyPr spcFirstLastPara="0" vert="horz" wrap="square" lIns="462280" tIns="462280" rIns="462280" bIns="462280" numCol="1" spcCol="1270" anchor="ctr" anchorCtr="0">
-          <a:noAutofit/>
-        </a:bodyPr>
-        <a:lstStyle/>
-        <a:p>
-          <a:pPr lvl="0" algn="ctr" defTabSz="2889250">
-            <a:lnSpc>
-              <a:spcPct val="90000"/>
-            </a:lnSpc>
-            <a:spcBef>
-              <a:spcPct val="0"/>
-            </a:spcBef>
-            <a:spcAft>
-              <a:spcPct val="35000"/>
-            </a:spcAft>
-          </a:pPr>
-          <a:endParaRPr lang="en-CA" sz="6500" kern="1200" dirty="0"/>
-        </a:p>
-      </dsp:txBody>
-      <dsp:txXfrm>
-        <a:off x="4212419" y="1945475"/>
-        <a:ext cx="2043917" cy="1945475"/>
-      </dsp:txXfrm>
-    </dsp:sp>
-    <dsp:sp modelId="{EF6C3C73-EE47-41C6-84F9-732FE297AA13}">
-      <dsp:nvSpPr>
-        <dsp:cNvPr id="0" name=""/>
-        <dsp:cNvSpPr/>
-      </dsp:nvSpPr>
-      <dsp:spPr>
-        <a:xfrm>
-          <a:off x="4424574" y="291821"/>
-          <a:ext cx="1619608" cy="1619608"/>
-        </a:xfrm>
-        <a:prstGeom prst="ellipse">
-          <a:avLst/>
-        </a:prstGeom>
-        <a:blipFill rotWithShape="1">
-          <a:blip xmlns:r="http://schemas.openxmlformats.org/officeDocument/2006/relationships" r:embed="rId3"/>
-          <a:stretch>
-            <a:fillRect/>
-          </a:stretch>
-        </a:blipFill>
-        <a:ln w="19050" cap="flat" cmpd="sng" algn="ctr">
-          <a:solidFill>
-            <a:schemeClr val="lt2">
-              <a:hueOff val="0"/>
-              <a:satOff val="0"/>
-              <a:lumOff val="0"/>
-              <a:alphaOff val="0"/>
-            </a:schemeClr>
-          </a:solidFill>
-          <a:prstDash val="solid"/>
-          <a:miter lim="800000"/>
-        </a:ln>
-        <a:effectLst/>
-      </dsp:spPr>
-      <dsp:style>
-        <a:lnRef idx="3">
-          <a:scrgbClr r="0" g="0" b="0"/>
-        </a:lnRef>
-        <a:fillRef idx="1">
-          <a:scrgbClr r="0" g="0" b="0"/>
-        </a:fillRef>
-        <a:effectRef idx="1">
-          <a:scrgbClr r="0" g="0" b="0"/>
-        </a:effectRef>
-        <a:fontRef idx="minor"/>
-      </dsp:style>
-    </dsp:sp>
-    <dsp:sp modelId="{9B6DBF9B-EFA6-45E8-AAE9-1FBCC2922B5E}">
-      <dsp:nvSpPr>
-        <dsp:cNvPr id="0" name=""/>
-        <dsp:cNvSpPr/>
-      </dsp:nvSpPr>
-      <dsp:spPr>
-        <a:xfrm>
-          <a:off x="6317654" y="0"/>
-          <a:ext cx="2043917" cy="4863689"/>
-        </a:xfrm>
-        <a:prstGeom prst="roundRect">
-          <a:avLst>
-            <a:gd name="adj" fmla="val 10000"/>
-          </a:avLst>
-        </a:prstGeom>
-        <a:solidFill>
-          <a:schemeClr val="dk2">
-            <a:hueOff val="0"/>
-            <a:satOff val="0"/>
-            <a:lumOff val="0"/>
-            <a:alphaOff val="0"/>
-          </a:schemeClr>
-        </a:solidFill>
-        <a:ln w="19050" cap="flat" cmpd="sng" algn="ctr">
-          <a:solidFill>
-            <a:schemeClr val="lt2">
-              <a:hueOff val="0"/>
-              <a:satOff val="0"/>
-              <a:lumOff val="0"/>
-              <a:alphaOff val="0"/>
-            </a:schemeClr>
-          </a:solidFill>
-          <a:prstDash val="solid"/>
-          <a:miter lim="800000"/>
-        </a:ln>
-        <a:effectLst/>
-      </dsp:spPr>
-      <dsp:style>
-        <a:lnRef idx="3">
-          <a:scrgbClr r="0" g="0" b="0"/>
-        </a:lnRef>
-        <a:fillRef idx="1">
-          <a:scrgbClr r="0" g="0" b="0"/>
-        </a:fillRef>
-        <a:effectRef idx="1">
-          <a:scrgbClr r="0" g="0" b="0"/>
-        </a:effectRef>
-        <a:fontRef idx="minor">
-          <a:schemeClr val="lt1"/>
-        </a:fontRef>
-      </dsp:style>
-      <dsp:txBody>
-        <a:bodyPr spcFirstLastPara="0" vert="horz" wrap="square" lIns="462280" tIns="462280" rIns="462280" bIns="462280" numCol="1" spcCol="1270" anchor="ctr" anchorCtr="0">
-          <a:noAutofit/>
-        </a:bodyPr>
-        <a:lstStyle/>
-        <a:p>
-          <a:pPr lvl="0" algn="ctr" defTabSz="2889250">
-            <a:lnSpc>
-              <a:spcPct val="90000"/>
-            </a:lnSpc>
-            <a:spcBef>
-              <a:spcPct val="0"/>
-            </a:spcBef>
-            <a:spcAft>
-              <a:spcPct val="35000"/>
-            </a:spcAft>
-          </a:pPr>
-          <a:endParaRPr lang="en-CA" sz="6500" kern="1200" dirty="0"/>
-        </a:p>
-      </dsp:txBody>
-      <dsp:txXfrm>
-        <a:off x="6317654" y="1945475"/>
-        <a:ext cx="2043917" cy="1945475"/>
-      </dsp:txXfrm>
-    </dsp:sp>
-    <dsp:sp modelId="{E493E5FB-AA9A-42DE-9CCE-474EDF63F26C}">
-      <dsp:nvSpPr>
-        <dsp:cNvPr id="0" name=""/>
-        <dsp:cNvSpPr/>
-      </dsp:nvSpPr>
-      <dsp:spPr>
-        <a:xfrm>
-          <a:off x="6529809" y="291821"/>
-          <a:ext cx="1619608" cy="1619608"/>
-        </a:xfrm>
-        <a:prstGeom prst="ellipse">
-          <a:avLst/>
-        </a:prstGeom>
-        <a:blipFill rotWithShape="1">
-          <a:blip xmlns:r="http://schemas.openxmlformats.org/officeDocument/2006/relationships" r:embed="rId4"/>
-          <a:stretch>
-            <a:fillRect/>
-          </a:stretch>
-        </a:blipFill>
-        <a:ln w="19050" cap="flat" cmpd="sng" algn="ctr">
-          <a:solidFill>
-            <a:schemeClr val="lt2">
-              <a:hueOff val="0"/>
-              <a:satOff val="0"/>
-              <a:lumOff val="0"/>
-              <a:alphaOff val="0"/>
-            </a:schemeClr>
-          </a:solidFill>
-          <a:prstDash val="solid"/>
-          <a:miter lim="800000"/>
-        </a:ln>
-        <a:effectLst/>
-      </dsp:spPr>
-      <dsp:style>
-        <a:lnRef idx="3">
-          <a:scrgbClr r="0" g="0" b="0"/>
-        </a:lnRef>
-        <a:fillRef idx="1">
-          <a:scrgbClr r="0" g="0" b="0"/>
-        </a:fillRef>
-        <a:effectRef idx="1">
-          <a:scrgbClr r="0" g="0" b="0"/>
-        </a:effectRef>
-        <a:fontRef idx="minor"/>
-      </dsp:style>
-    </dsp:sp>
-    <dsp:sp modelId="{5C007895-D27B-4555-8633-C9BBD58A106D}">
-      <dsp:nvSpPr>
-        <dsp:cNvPr id="0" name=""/>
-        <dsp:cNvSpPr/>
-      </dsp:nvSpPr>
-      <dsp:spPr>
-        <a:xfrm flipH="1">
-          <a:off x="4508466" y="3876524"/>
-          <a:ext cx="1553507" cy="525387"/>
-        </a:xfrm>
-        <a:prstGeom prst="leftRightArrow">
-          <a:avLst/>
-        </a:prstGeom>
-        <a:noFill/>
-        <a:ln w="19050" cap="flat" cmpd="sng" algn="ctr">
-          <a:noFill/>
-          <a:prstDash val="solid"/>
-          <a:miter lim="800000"/>
-        </a:ln>
-        <a:effectLst/>
-      </dsp:spPr>
-      <dsp:style>
-        <a:lnRef idx="3">
-          <a:scrgbClr r="0" g="0" b="0"/>
-        </a:lnRef>
-        <a:fillRef idx="1">
-          <a:scrgbClr r="0" g="0" b="0"/>
-        </a:fillRef>
-        <a:effectRef idx="1">
-          <a:scrgbClr r="0" g="0" b="0"/>
-        </a:effectRef>
-        <a:fontRef idx="minor"/>
-      </dsp:style>
-    </dsp:sp>
   </dsp:spTree>
 </dsp:drawing>
 </file>
@@ -11354,7 +9158,7 @@
           <a:p>
             <a:fld id="{EC83963A-FCD1-4BA3-8F52-F2285ACE2A6A}" type="datetimeFigureOut">
               <a:rPr lang="fr-FR" smtClean="0"/>
-              <a:t>31/01/2020</a:t>
+              <a:t>01/02/2020</a:t>
             </a:fld>
             <a:endParaRPr lang="fr-FR"/>
           </a:p>
@@ -11519,7 +9323,7 @@
           <a:p>
             <a:fld id="{12D3AF9D-FD63-43BA-9EB6-902B12D2DD5D}" type="datetimeFigureOut">
               <a:rPr lang="fr-FR" smtClean="0"/>
-              <a:t>31/01/2020</a:t>
+              <a:t>01/02/2020</a:t>
             </a:fld>
             <a:endParaRPr lang="fr-FR"/>
           </a:p>
@@ -13145,39 +10949,65 @@
           </a:p>
         </p:txBody>
       </p:sp>
-      <p:pic>
-        <p:nvPicPr>
-          <p:cNvPr id="3" name="Image 2"/>
-          <p:cNvPicPr>
-            <a:picLocks noChangeAspect="1"/>
-          </p:cNvPicPr>
+      <p:sp>
+        <p:nvSpPr>
+          <p:cNvPr id="3" name="Title 1"/>
+          <p:cNvSpPr txBox="1">
+            <a:spLocks/>
+          </p:cNvSpPr>
           <p:nvPr/>
-        </p:nvPicPr>
-        <p:blipFill>
-          <a:blip r:embed="rId2"/>
-          <a:stretch>
-            <a:fillRect/>
-          </a:stretch>
-        </p:blipFill>
+        </p:nvSpPr>
         <p:spPr>
           <a:xfrm>
-            <a:off x="2425237" y="1776376"/>
-            <a:ext cx="7053764" cy="5081624"/>
+            <a:off x="648394" y="2101646"/>
+            <a:ext cx="5257456" cy="733833"/>
           </a:xfrm>
           <a:prstGeom prst="rect">
             <a:avLst/>
           </a:prstGeom>
-          <a:ln>
-            <a:solidFill>
-              <a:schemeClr val="tx1"/>
-            </a:solidFill>
-          </a:ln>
-        </p:spPr>
-      </p:pic>
+        </p:spPr>
+        <p:txBody>
+          <a:bodyPr/>
+          <a:lstStyle>
+            <a:lvl1pPr algn="l" defTabSz="914400" rtl="0" eaLnBrk="1" latinLnBrk="0" hangingPunct="1">
+              <a:lnSpc>
+                <a:spcPct val="90000"/>
+              </a:lnSpc>
+              <a:spcBef>
+                <a:spcPct val="0"/>
+              </a:spcBef>
+              <a:buNone/>
+              <a:defRPr sz="4400" kern="1200">
+                <a:solidFill>
+                  <a:schemeClr val="tx1"/>
+                </a:solidFill>
+                <a:latin typeface="+mj-lt"/>
+                <a:ea typeface="+mj-ea"/>
+                <a:cs typeface="+mj-cs"/>
+              </a:defRPr>
+            </a:lvl1pPr>
+          </a:lstStyle>
+          <a:p>
+            <a:r>
+              <a:rPr lang="fr-FR" dirty="0" err="1" smtClean="0"/>
+              <a:t>User’s</a:t>
+            </a:r>
+            <a:r>
+              <a:rPr lang="fr-FR" dirty="0" smtClean="0"/>
+              <a:t> </a:t>
+            </a:r>
+            <a:r>
+              <a:rPr lang="fr-FR" dirty="0" err="1" smtClean="0"/>
+              <a:t>webpage</a:t>
+            </a:r>
+            <a:endParaRPr lang="fr-FR" dirty="0"/>
+          </a:p>
+        </p:txBody>
+      </p:sp>
     </p:spTree>
     <p:extLst>
       <p:ext uri="{BB962C8B-B14F-4D97-AF65-F5344CB8AC3E}">
-        <p14:creationId xmlns:p14="http://schemas.microsoft.com/office/powerpoint/2010/main" val="2980065524"/>
+        <p14:creationId xmlns:p14="http://schemas.microsoft.com/office/powerpoint/2010/main" val="4034940838"/>
       </p:ext>
     </p:extLst>
   </p:cSld>
@@ -13188,6 +11018,161 @@
 </file>
 
 <file path=ppt/slides/slide11.xml><?xml version="1.0" encoding="utf-8"?>
+<p:sld xmlns:a="http://schemas.openxmlformats.org/drawingml/2006/main" xmlns:r="http://schemas.openxmlformats.org/officeDocument/2006/relationships" xmlns:p="http://schemas.openxmlformats.org/presentationml/2006/main">
+  <p:cSld>
+    <p:spTree>
+      <p:nvGrpSpPr>
+        <p:cNvPr id="1" name=""/>
+        <p:cNvGrpSpPr/>
+        <p:nvPr/>
+      </p:nvGrpSpPr>
+      <p:grpSpPr>
+        <a:xfrm>
+          <a:off x="0" y="0"/>
+          <a:ext cx="0" cy="0"/>
+          <a:chOff x="0" y="0"/>
+          <a:chExt cx="0" cy="0"/>
+        </a:xfrm>
+      </p:grpSpPr>
+      <p:sp>
+        <p:nvSpPr>
+          <p:cNvPr id="2" name="Slide Number Placeholder 1"/>
+          <p:cNvSpPr>
+            <a:spLocks noGrp="1"/>
+          </p:cNvSpPr>
+          <p:nvPr>
+            <p:ph type="sldNum" sz="quarter" idx="4"/>
+          </p:nvPr>
+        </p:nvSpPr>
+        <p:spPr/>
+        <p:txBody>
+          <a:bodyPr/>
+          <a:lstStyle/>
+          <a:p>
+            <a:fld id="{813506F1-DB5F-4FC9-88BA-B486F30FE4BF}" type="slidenum">
+              <a:rPr lang="fr-FR" smtClean="0"/>
+              <a:pPr/>
+              <a:t>10</a:t>
+            </a:fld>
+            <a:endParaRPr lang="fr-FR" dirty="0"/>
+          </a:p>
+        </p:txBody>
+      </p:sp>
+      <p:sp>
+        <p:nvSpPr>
+          <p:cNvPr id="3" name="Title 1"/>
+          <p:cNvSpPr txBox="1">
+            <a:spLocks/>
+          </p:cNvSpPr>
+          <p:nvPr/>
+        </p:nvSpPr>
+        <p:spPr>
+          <a:xfrm>
+            <a:off x="648394" y="2101646"/>
+            <a:ext cx="1188795" cy="733833"/>
+          </a:xfrm>
+          <a:prstGeom prst="rect">
+            <a:avLst/>
+          </a:prstGeom>
+        </p:spPr>
+        <p:txBody>
+          <a:bodyPr/>
+          <a:lstStyle>
+            <a:lvl1pPr algn="l" defTabSz="914400" rtl="0" eaLnBrk="1" latinLnBrk="0" hangingPunct="1">
+              <a:lnSpc>
+                <a:spcPct val="90000"/>
+              </a:lnSpc>
+              <a:spcBef>
+                <a:spcPct val="0"/>
+              </a:spcBef>
+              <a:buNone/>
+              <a:defRPr sz="4400" kern="1200">
+                <a:solidFill>
+                  <a:schemeClr val="tx1"/>
+                </a:solidFill>
+                <a:latin typeface="+mj-lt"/>
+                <a:ea typeface="+mj-ea"/>
+                <a:cs typeface="+mj-cs"/>
+              </a:defRPr>
+            </a:lvl1pPr>
+          </a:lstStyle>
+          <a:p>
+            <a:r>
+              <a:rPr lang="fr-FR" dirty="0" smtClean="0"/>
+              <a:t>App</a:t>
+            </a:r>
+            <a:endParaRPr lang="fr-FR" dirty="0"/>
+          </a:p>
+        </p:txBody>
+      </p:sp>
+    </p:spTree>
+    <p:extLst>
+      <p:ext uri="{BB962C8B-B14F-4D97-AF65-F5344CB8AC3E}">
+        <p14:creationId xmlns:p14="http://schemas.microsoft.com/office/powerpoint/2010/main" val="3608219061"/>
+      </p:ext>
+    </p:extLst>
+  </p:cSld>
+  <p:clrMapOvr>
+    <a:masterClrMapping/>
+  </p:clrMapOvr>
+</p:sld>
+</file>
+
+<file path=ppt/slides/slide12.xml><?xml version="1.0" encoding="utf-8"?>
+<p:sld xmlns:a="http://schemas.openxmlformats.org/drawingml/2006/main" xmlns:r="http://schemas.openxmlformats.org/officeDocument/2006/relationships" xmlns:p="http://schemas.openxmlformats.org/presentationml/2006/main">
+  <p:cSld>
+    <p:spTree>
+      <p:nvGrpSpPr>
+        <p:cNvPr id="1" name=""/>
+        <p:cNvGrpSpPr/>
+        <p:nvPr/>
+      </p:nvGrpSpPr>
+      <p:grpSpPr>
+        <a:xfrm>
+          <a:off x="0" y="0"/>
+          <a:ext cx="0" cy="0"/>
+          <a:chOff x="0" y="0"/>
+          <a:chExt cx="0" cy="0"/>
+        </a:xfrm>
+      </p:grpSpPr>
+      <p:sp>
+        <p:nvSpPr>
+          <p:cNvPr id="2" name="Slide Number Placeholder 1"/>
+          <p:cNvSpPr>
+            <a:spLocks noGrp="1"/>
+          </p:cNvSpPr>
+          <p:nvPr>
+            <p:ph type="sldNum" sz="quarter" idx="4"/>
+          </p:nvPr>
+        </p:nvSpPr>
+        <p:spPr/>
+        <p:txBody>
+          <a:bodyPr/>
+          <a:lstStyle/>
+          <a:p>
+            <a:fld id="{813506F1-DB5F-4FC9-88BA-B486F30FE4BF}" type="slidenum">
+              <a:rPr lang="fr-FR" smtClean="0"/>
+              <a:pPr/>
+              <a:t>11</a:t>
+            </a:fld>
+            <a:endParaRPr lang="fr-FR" dirty="0"/>
+          </a:p>
+        </p:txBody>
+      </p:sp>
+    </p:spTree>
+    <p:extLst>
+      <p:ext uri="{BB962C8B-B14F-4D97-AF65-F5344CB8AC3E}">
+        <p14:creationId xmlns:p14="http://schemas.microsoft.com/office/powerpoint/2010/main" val="1162212200"/>
+      </p:ext>
+    </p:extLst>
+  </p:cSld>
+  <p:clrMapOvr>
+    <a:masterClrMapping/>
+  </p:clrMapOvr>
+</p:sld>
+</file>
+
+<file path=ppt/slides/slide13.xml><?xml version="1.0" encoding="utf-8"?>
 <p:sld xmlns:a="http://schemas.openxmlformats.org/drawingml/2006/main" xmlns:r="http://schemas.openxmlformats.org/officeDocument/2006/relationships" xmlns:p="http://schemas.openxmlformats.org/presentationml/2006/main">
   <p:cSld>
     <p:spTree>
@@ -13222,7 +11207,7 @@
             <a:fld id="{813506F1-DB5F-4FC9-88BA-B486F30FE4BF}" type="slidenum">
               <a:rPr lang="fr-FR" smtClean="0"/>
               <a:pPr/>
-              <a:t>10</a:t>
+              <a:t>12</a:t>
             </a:fld>
             <a:endParaRPr lang="fr-FR" dirty="0"/>
           </a:p>
@@ -13230,7 +11215,148 @@
       </p:sp>
       <p:pic>
         <p:nvPicPr>
-          <p:cNvPr id="5" name="Image 4"/>
+          <p:cNvPr id="4" name="Picture 2"/>
+          <p:cNvPicPr>
+            <a:picLocks noChangeAspect="1"/>
+          </p:cNvPicPr>
+          <p:nvPr/>
+        </p:nvPicPr>
+        <p:blipFill rotWithShape="1">
+          <a:blip r:embed="rId2" cstate="print">
+            <a:extLst>
+              <a:ext uri="{28A0092B-C50C-407E-A947-70E740481C1C}">
+                <a14:useLocalDpi xmlns:a14="http://schemas.microsoft.com/office/drawing/2010/main" val="0"/>
+              </a:ext>
+            </a:extLst>
+          </a:blip>
+          <a:srcRect t="7294"/>
+          <a:stretch/>
+        </p:blipFill>
+        <p:spPr>
+          <a:xfrm>
+            <a:off x="648393" y="1756666"/>
+            <a:ext cx="5074114" cy="5101334"/>
+          </a:xfrm>
+          <a:prstGeom prst="rect">
+            <a:avLst/>
+          </a:prstGeom>
+        </p:spPr>
+      </p:pic>
+      <p:pic>
+        <p:nvPicPr>
+          <p:cNvPr id="5" name="Picture 3"/>
+          <p:cNvPicPr>
+            <a:picLocks noChangeAspect="1"/>
+          </p:cNvPicPr>
+          <p:nvPr/>
+        </p:nvPicPr>
+        <p:blipFill rotWithShape="1">
+          <a:blip r:embed="rId3" cstate="print">
+            <a:extLst>
+              <a:ext uri="{28A0092B-C50C-407E-A947-70E740481C1C}">
+                <a14:useLocalDpi xmlns:a14="http://schemas.microsoft.com/office/drawing/2010/main" val="0"/>
+              </a:ext>
+            </a:extLst>
+          </a:blip>
+          <a:srcRect t="6500" b="29501"/>
+          <a:stretch/>
+        </p:blipFill>
+        <p:spPr>
+          <a:xfrm>
+            <a:off x="6032614" y="1718225"/>
+            <a:ext cx="3454285" cy="2434675"/>
+          </a:xfrm>
+          <a:prstGeom prst="rect">
+            <a:avLst/>
+          </a:prstGeom>
+        </p:spPr>
+      </p:pic>
+      <p:pic>
+        <p:nvPicPr>
+          <p:cNvPr id="6" name="Picture 6"/>
+          <p:cNvPicPr>
+            <a:picLocks noChangeAspect="1"/>
+          </p:cNvPicPr>
+          <p:nvPr/>
+        </p:nvPicPr>
+        <p:blipFill rotWithShape="1">
+          <a:blip r:embed="rId4" cstate="print">
+            <a:extLst>
+              <a:ext uri="{28A0092B-C50C-407E-A947-70E740481C1C}">
+                <a14:useLocalDpi xmlns:a14="http://schemas.microsoft.com/office/drawing/2010/main" val="0"/>
+              </a:ext>
+            </a:extLst>
+          </a:blip>
+          <a:srcRect t="7626" r="14094" b="18958"/>
+          <a:stretch/>
+        </p:blipFill>
+        <p:spPr>
+          <a:xfrm>
+            <a:off x="6032615" y="4152900"/>
+            <a:ext cx="6045085" cy="2705100"/>
+          </a:xfrm>
+          <a:prstGeom prst="rect">
+            <a:avLst/>
+          </a:prstGeom>
+        </p:spPr>
+      </p:pic>
+    </p:spTree>
+    <p:extLst>
+      <p:ext uri="{BB962C8B-B14F-4D97-AF65-F5344CB8AC3E}">
+        <p14:creationId xmlns:p14="http://schemas.microsoft.com/office/powerpoint/2010/main" val="3275783859"/>
+      </p:ext>
+    </p:extLst>
+  </p:cSld>
+  <p:clrMapOvr>
+    <a:masterClrMapping/>
+  </p:clrMapOvr>
+</p:sld>
+</file>
+
+<file path=ppt/slides/slide14.xml><?xml version="1.0" encoding="utf-8"?>
+<p:sld xmlns:a="http://schemas.openxmlformats.org/drawingml/2006/main" xmlns:r="http://schemas.openxmlformats.org/officeDocument/2006/relationships" xmlns:p="http://schemas.openxmlformats.org/presentationml/2006/main">
+  <p:cSld>
+    <p:spTree>
+      <p:nvGrpSpPr>
+        <p:cNvPr id="1" name=""/>
+        <p:cNvGrpSpPr/>
+        <p:nvPr/>
+      </p:nvGrpSpPr>
+      <p:grpSpPr>
+        <a:xfrm>
+          <a:off x="0" y="0"/>
+          <a:ext cx="0" cy="0"/>
+          <a:chOff x="0" y="0"/>
+          <a:chExt cx="0" cy="0"/>
+        </a:xfrm>
+      </p:grpSpPr>
+      <p:sp>
+        <p:nvSpPr>
+          <p:cNvPr id="2" name="Slide Number Placeholder 1"/>
+          <p:cNvSpPr>
+            <a:spLocks noGrp="1"/>
+          </p:cNvSpPr>
+          <p:nvPr>
+            <p:ph type="sldNum" sz="quarter" idx="4"/>
+          </p:nvPr>
+        </p:nvSpPr>
+        <p:spPr/>
+        <p:txBody>
+          <a:bodyPr/>
+          <a:lstStyle/>
+          <a:p>
+            <a:fld id="{813506F1-DB5F-4FC9-88BA-B486F30FE4BF}" type="slidenum">
+              <a:rPr lang="fr-FR" smtClean="0"/>
+              <a:pPr/>
+              <a:t>13</a:t>
+            </a:fld>
+            <a:endParaRPr lang="fr-FR" dirty="0"/>
+          </a:p>
+        </p:txBody>
+      </p:sp>
+      <p:pic>
+        <p:nvPicPr>
+          <p:cNvPr id="3" name="Image 2"/>
           <p:cNvPicPr>
             <a:picLocks noChangeAspect="1"/>
           </p:cNvPicPr>
@@ -13244,8 +11370,8 @@
         </p:blipFill>
         <p:spPr>
           <a:xfrm>
-            <a:off x="0" y="1711434"/>
-            <a:ext cx="8735483" cy="3648913"/>
+            <a:off x="2425237" y="1776376"/>
+            <a:ext cx="7053764" cy="5081624"/>
           </a:xfrm>
           <a:prstGeom prst="rect">
             <a:avLst/>
@@ -13257,77 +11383,10 @@
           </a:ln>
         </p:spPr>
       </p:pic>
-      <p:cxnSp>
-        <p:nvCxnSpPr>
-          <p:cNvPr id="9" name="Connecteur en angle 8"/>
-          <p:cNvCxnSpPr/>
-          <p:nvPr/>
-        </p:nvCxnSpPr>
-        <p:spPr>
-          <a:xfrm>
-            <a:off x="5994400" y="3416300"/>
-            <a:ext cx="3327400" cy="1171439"/>
-          </a:xfrm>
-          <a:prstGeom prst="bentConnector3">
-            <a:avLst>
-              <a:gd name="adj1" fmla="val 99237"/>
-            </a:avLst>
-          </a:prstGeom>
-          <a:ln w="28575">
-            <a:solidFill>
-              <a:schemeClr val="tx1"/>
-            </a:solidFill>
-            <a:tailEnd type="triangle"/>
-          </a:ln>
-        </p:spPr>
-        <p:style>
-          <a:lnRef idx="1">
-            <a:schemeClr val="accent1"/>
-          </a:lnRef>
-          <a:fillRef idx="0">
-            <a:schemeClr val="accent1"/>
-          </a:fillRef>
-          <a:effectRef idx="0">
-            <a:schemeClr val="accent1"/>
-          </a:effectRef>
-          <a:fontRef idx="minor">
-            <a:schemeClr val="tx1"/>
-          </a:fontRef>
-        </p:style>
-      </p:cxnSp>
-      <p:pic>
-        <p:nvPicPr>
-          <p:cNvPr id="11" name="Image 10"/>
-          <p:cNvPicPr>
-            <a:picLocks noChangeAspect="1"/>
-          </p:cNvPicPr>
-          <p:nvPr/>
-        </p:nvPicPr>
-        <p:blipFill>
-          <a:blip r:embed="rId3"/>
-          <a:stretch>
-            <a:fillRect/>
-          </a:stretch>
-        </p:blipFill>
-        <p:spPr>
-          <a:xfrm>
-            <a:off x="6078852" y="4587739"/>
-            <a:ext cx="6113148" cy="2183614"/>
-          </a:xfrm>
-          <a:prstGeom prst="rect">
-            <a:avLst/>
-          </a:prstGeom>
-          <a:ln>
-            <a:solidFill>
-              <a:schemeClr val="tx1"/>
-            </a:solidFill>
-          </a:ln>
-        </p:spPr>
-      </p:pic>
     </p:spTree>
     <p:extLst>
       <p:ext uri="{BB962C8B-B14F-4D97-AF65-F5344CB8AC3E}">
-        <p14:creationId xmlns:p14="http://schemas.microsoft.com/office/powerpoint/2010/main" val="1378456716"/>
+        <p14:creationId xmlns:p14="http://schemas.microsoft.com/office/powerpoint/2010/main" val="2980065524"/>
       </p:ext>
     </p:extLst>
   </p:cSld>
@@ -13337,7 +11396,7 @@
 </p:sld>
 </file>
 
-<file path=ppt/slides/slide12.xml><?xml version="1.0" encoding="utf-8"?>
+<file path=ppt/slides/slide15.xml><?xml version="1.0" encoding="utf-8"?>
 <p:sld xmlns:a="http://schemas.openxmlformats.org/drawingml/2006/main" xmlns:r="http://schemas.openxmlformats.org/officeDocument/2006/relationships" xmlns:p="http://schemas.openxmlformats.org/presentationml/2006/main">
   <p:cSld>
     <p:spTree>
@@ -13372,7 +11431,157 @@
             <a:fld id="{813506F1-DB5F-4FC9-88BA-B486F30FE4BF}" type="slidenum">
               <a:rPr lang="fr-FR" smtClean="0"/>
               <a:pPr/>
-              <a:t>11</a:t>
+              <a:t>14</a:t>
+            </a:fld>
+            <a:endParaRPr lang="fr-FR" dirty="0"/>
+          </a:p>
+        </p:txBody>
+      </p:sp>
+      <p:pic>
+        <p:nvPicPr>
+          <p:cNvPr id="5" name="Image 4"/>
+          <p:cNvPicPr>
+            <a:picLocks noChangeAspect="1"/>
+          </p:cNvPicPr>
+          <p:nvPr/>
+        </p:nvPicPr>
+        <p:blipFill>
+          <a:blip r:embed="rId2"/>
+          <a:stretch>
+            <a:fillRect/>
+          </a:stretch>
+        </p:blipFill>
+        <p:spPr>
+          <a:xfrm>
+            <a:off x="0" y="1711434"/>
+            <a:ext cx="8735483" cy="3648913"/>
+          </a:xfrm>
+          <a:prstGeom prst="rect">
+            <a:avLst/>
+          </a:prstGeom>
+          <a:ln>
+            <a:solidFill>
+              <a:schemeClr val="tx1"/>
+            </a:solidFill>
+          </a:ln>
+        </p:spPr>
+      </p:pic>
+      <p:cxnSp>
+        <p:nvCxnSpPr>
+          <p:cNvPr id="9" name="Connecteur en angle 8"/>
+          <p:cNvCxnSpPr/>
+          <p:nvPr/>
+        </p:nvCxnSpPr>
+        <p:spPr>
+          <a:xfrm>
+            <a:off x="5994400" y="3416300"/>
+            <a:ext cx="3327400" cy="1171439"/>
+          </a:xfrm>
+          <a:prstGeom prst="bentConnector3">
+            <a:avLst>
+              <a:gd name="adj1" fmla="val 99237"/>
+            </a:avLst>
+          </a:prstGeom>
+          <a:ln w="28575">
+            <a:solidFill>
+              <a:schemeClr val="tx1"/>
+            </a:solidFill>
+            <a:tailEnd type="triangle"/>
+          </a:ln>
+        </p:spPr>
+        <p:style>
+          <a:lnRef idx="1">
+            <a:schemeClr val="accent1"/>
+          </a:lnRef>
+          <a:fillRef idx="0">
+            <a:schemeClr val="accent1"/>
+          </a:fillRef>
+          <a:effectRef idx="0">
+            <a:schemeClr val="accent1"/>
+          </a:effectRef>
+          <a:fontRef idx="minor">
+            <a:schemeClr val="tx1"/>
+          </a:fontRef>
+        </p:style>
+      </p:cxnSp>
+      <p:pic>
+        <p:nvPicPr>
+          <p:cNvPr id="11" name="Image 10"/>
+          <p:cNvPicPr>
+            <a:picLocks noChangeAspect="1"/>
+          </p:cNvPicPr>
+          <p:nvPr/>
+        </p:nvPicPr>
+        <p:blipFill>
+          <a:blip r:embed="rId3"/>
+          <a:stretch>
+            <a:fillRect/>
+          </a:stretch>
+        </p:blipFill>
+        <p:spPr>
+          <a:xfrm>
+            <a:off x="6078852" y="4587739"/>
+            <a:ext cx="6113148" cy="2183614"/>
+          </a:xfrm>
+          <a:prstGeom prst="rect">
+            <a:avLst/>
+          </a:prstGeom>
+          <a:ln>
+            <a:solidFill>
+              <a:schemeClr val="tx1"/>
+            </a:solidFill>
+          </a:ln>
+        </p:spPr>
+      </p:pic>
+    </p:spTree>
+    <p:extLst>
+      <p:ext uri="{BB962C8B-B14F-4D97-AF65-F5344CB8AC3E}">
+        <p14:creationId xmlns:p14="http://schemas.microsoft.com/office/powerpoint/2010/main" val="1378456716"/>
+      </p:ext>
+    </p:extLst>
+  </p:cSld>
+  <p:clrMapOvr>
+    <a:masterClrMapping/>
+  </p:clrMapOvr>
+</p:sld>
+</file>
+
+<file path=ppt/slides/slide16.xml><?xml version="1.0" encoding="utf-8"?>
+<p:sld xmlns:a="http://schemas.openxmlformats.org/drawingml/2006/main" xmlns:r="http://schemas.openxmlformats.org/officeDocument/2006/relationships" xmlns:p="http://schemas.openxmlformats.org/presentationml/2006/main">
+  <p:cSld>
+    <p:spTree>
+      <p:nvGrpSpPr>
+        <p:cNvPr id="1" name=""/>
+        <p:cNvGrpSpPr/>
+        <p:nvPr/>
+      </p:nvGrpSpPr>
+      <p:grpSpPr>
+        <a:xfrm>
+          <a:off x="0" y="0"/>
+          <a:ext cx="0" cy="0"/>
+          <a:chOff x="0" y="0"/>
+          <a:chExt cx="0" cy="0"/>
+        </a:xfrm>
+      </p:grpSpPr>
+      <p:sp>
+        <p:nvSpPr>
+          <p:cNvPr id="2" name="Espace réservé du numéro de diapositive 1"/>
+          <p:cNvSpPr>
+            <a:spLocks noGrp="1"/>
+          </p:cNvSpPr>
+          <p:nvPr>
+            <p:ph type="sldNum" sz="quarter" idx="4"/>
+          </p:nvPr>
+        </p:nvSpPr>
+        <p:spPr/>
+        <p:txBody>
+          <a:bodyPr/>
+          <a:lstStyle/>
+          <a:p>
+            <a:fld id="{813506F1-DB5F-4FC9-88BA-B486F30FE4BF}" type="slidenum">
+              <a:rPr lang="fr-FR" smtClean="0"/>
+              <a:pPr/>
+              <a:t>15</a:t>
             </a:fld>
             <a:endParaRPr lang="fr-FR" dirty="0"/>
           </a:p>
@@ -13552,7 +11761,7 @@
 </p:sld>
 </file>
 
-<file path=ppt/slides/slide13.xml><?xml version="1.0" encoding="utf-8"?>
+<file path=ppt/slides/slide17.xml><?xml version="1.0" encoding="utf-8"?>
 <p:sld xmlns:a="http://schemas.openxmlformats.org/drawingml/2006/main" xmlns:r="http://schemas.openxmlformats.org/officeDocument/2006/relationships" xmlns:p="http://schemas.openxmlformats.org/presentationml/2006/main">
   <p:cSld>
     <p:spTree>
@@ -30406,7 +28615,7 @@
       </p:grpSpPr>
       <p:sp>
         <p:nvSpPr>
-          <p:cNvPr id="2" name="Espace réservé du numéro de diapositive 1"/>
+          <p:cNvPr id="2" name="Slide Number Placeholder 1"/>
           <p:cNvSpPr>
             <a:spLocks noGrp="1"/>
           </p:cNvSpPr>
@@ -30428,97 +28637,483 @@
           </a:p>
         </p:txBody>
       </p:sp>
-      <p:pic>
-        <p:nvPicPr>
-          <p:cNvPr id="4" name="Picture 2"/>
-          <p:cNvPicPr>
-            <a:picLocks noChangeAspect="1"/>
-          </p:cNvPicPr>
+      <p:sp>
+        <p:nvSpPr>
+          <p:cNvPr id="3" name="Title 1"/>
+          <p:cNvSpPr txBox="1">
+            <a:spLocks/>
+          </p:cNvSpPr>
           <p:nvPr/>
-        </p:nvPicPr>
-        <p:blipFill rotWithShape="1">
-          <a:blip r:embed="rId2" cstate="print">
-            <a:extLst>
-              <a:ext uri="{28A0092B-C50C-407E-A947-70E740481C1C}">
-                <a14:useLocalDpi xmlns:a14="http://schemas.microsoft.com/office/drawing/2010/main" val="0"/>
-              </a:ext>
-            </a:extLst>
-          </a:blip>
-          <a:srcRect t="7294"/>
-          <a:stretch/>
-        </p:blipFill>
+        </p:nvSpPr>
         <p:spPr>
           <a:xfrm>
-            <a:off x="648393" y="1756666"/>
-            <a:ext cx="5074114" cy="5101334"/>
+            <a:off x="648394" y="2101646"/>
+            <a:ext cx="5257456" cy="733833"/>
           </a:xfrm>
           <a:prstGeom prst="rect">
             <a:avLst/>
           </a:prstGeom>
         </p:spPr>
-      </p:pic>
-      <p:pic>
-        <p:nvPicPr>
-          <p:cNvPr id="5" name="Picture 3"/>
-          <p:cNvPicPr>
-            <a:picLocks noChangeAspect="1"/>
-          </p:cNvPicPr>
+        <p:txBody>
+          <a:bodyPr/>
+          <a:lstStyle>
+            <a:lvl1pPr algn="l" defTabSz="914400" rtl="0" eaLnBrk="1" latinLnBrk="0" hangingPunct="1">
+              <a:lnSpc>
+                <a:spcPct val="90000"/>
+              </a:lnSpc>
+              <a:spcBef>
+                <a:spcPct val="0"/>
+              </a:spcBef>
+              <a:buNone/>
+              <a:defRPr sz="4400" kern="1200">
+                <a:solidFill>
+                  <a:schemeClr val="tx1"/>
+                </a:solidFill>
+                <a:latin typeface="+mj-lt"/>
+                <a:ea typeface="+mj-ea"/>
+                <a:cs typeface="+mj-cs"/>
+              </a:defRPr>
+            </a:lvl1pPr>
+          </a:lstStyle>
+          <a:p>
+            <a:r>
+              <a:rPr lang="fr-FR" dirty="0" smtClean="0"/>
+              <a:t>Our </a:t>
+            </a:r>
+            <a:r>
+              <a:rPr lang="fr-FR" dirty="0" err="1" smtClean="0"/>
+              <a:t>results</a:t>
+            </a:r>
+            <a:endParaRPr lang="fr-FR" dirty="0"/>
+          </a:p>
+        </p:txBody>
+      </p:sp>
+      <p:sp>
+        <p:nvSpPr>
+          <p:cNvPr id="4" name="Content Placeholder 2"/>
+          <p:cNvSpPr txBox="1">
+            <a:spLocks/>
+          </p:cNvSpPr>
           <p:nvPr/>
-        </p:nvPicPr>
-        <p:blipFill rotWithShape="1">
-          <a:blip r:embed="rId3" cstate="print">
-            <a:extLst>
-              <a:ext uri="{28A0092B-C50C-407E-A947-70E740481C1C}">
-                <a14:useLocalDpi xmlns:a14="http://schemas.microsoft.com/office/drawing/2010/main" val="0"/>
-              </a:ext>
-            </a:extLst>
-          </a:blip>
-          <a:srcRect t="6500" b="29501"/>
-          <a:stretch/>
-        </p:blipFill>
+        </p:nvSpPr>
         <p:spPr>
           <a:xfrm>
-            <a:off x="6032614" y="1718225"/>
-            <a:ext cx="3454285" cy="2434675"/>
+            <a:off x="1236683" y="2835479"/>
+            <a:ext cx="7655647" cy="3842158"/>
           </a:xfrm>
           <a:prstGeom prst="rect">
             <a:avLst/>
           </a:prstGeom>
         </p:spPr>
-      </p:pic>
-      <p:pic>
-        <p:nvPicPr>
-          <p:cNvPr id="6" name="Picture 6"/>
-          <p:cNvPicPr>
-            <a:picLocks noChangeAspect="1"/>
-          </p:cNvPicPr>
-          <p:nvPr/>
-        </p:nvPicPr>
-        <p:blipFill rotWithShape="1">
-          <a:blip r:embed="rId4" cstate="print">
-            <a:extLst>
-              <a:ext uri="{28A0092B-C50C-407E-A947-70E740481C1C}">
-                <a14:useLocalDpi xmlns:a14="http://schemas.microsoft.com/office/drawing/2010/main" val="0"/>
-              </a:ext>
-            </a:extLst>
-          </a:blip>
-          <a:srcRect t="7626" r="14094" b="18958"/>
-          <a:stretch/>
-        </p:blipFill>
-        <p:spPr>
-          <a:xfrm>
-            <a:off x="6032615" y="4152900"/>
-            <a:ext cx="6045085" cy="2705100"/>
-          </a:xfrm>
-          <a:prstGeom prst="rect">
-            <a:avLst/>
-          </a:prstGeom>
-        </p:spPr>
-      </p:pic>
+        <p:txBody>
+          <a:bodyPr>
+            <a:normAutofit/>
+          </a:bodyPr>
+          <a:lstStyle>
+            <a:lvl1pPr marL="228600" indent="-228600" algn="l" defTabSz="914400" rtl="0" eaLnBrk="1" latinLnBrk="0" hangingPunct="1">
+              <a:lnSpc>
+                <a:spcPct val="90000"/>
+              </a:lnSpc>
+              <a:spcBef>
+                <a:spcPts val="1000"/>
+              </a:spcBef>
+              <a:buFont typeface="Arial" panose="020B0604020202020204" pitchFamily="34" charset="0"/>
+              <a:buChar char="•"/>
+              <a:defRPr sz="2800" kern="1200">
+                <a:solidFill>
+                  <a:schemeClr val="tx1"/>
+                </a:solidFill>
+                <a:latin typeface="+mn-lt"/>
+                <a:ea typeface="+mn-ea"/>
+                <a:cs typeface="+mn-cs"/>
+              </a:defRPr>
+            </a:lvl1pPr>
+            <a:lvl2pPr marL="685800" indent="-228600" algn="l" defTabSz="914400" rtl="0" eaLnBrk="1" latinLnBrk="0" hangingPunct="1">
+              <a:lnSpc>
+                <a:spcPct val="90000"/>
+              </a:lnSpc>
+              <a:spcBef>
+                <a:spcPts val="500"/>
+              </a:spcBef>
+              <a:buFont typeface="Arial" panose="020B0604020202020204" pitchFamily="34" charset="0"/>
+              <a:buChar char="•"/>
+              <a:defRPr sz="2400" kern="1200">
+                <a:solidFill>
+                  <a:schemeClr val="tx1"/>
+                </a:solidFill>
+                <a:latin typeface="+mn-lt"/>
+                <a:ea typeface="+mn-ea"/>
+                <a:cs typeface="+mn-cs"/>
+              </a:defRPr>
+            </a:lvl2pPr>
+            <a:lvl3pPr marL="1143000" indent="-228600" algn="l" defTabSz="914400" rtl="0" eaLnBrk="1" latinLnBrk="0" hangingPunct="1">
+              <a:lnSpc>
+                <a:spcPct val="90000"/>
+              </a:lnSpc>
+              <a:spcBef>
+                <a:spcPts val="500"/>
+              </a:spcBef>
+              <a:buFont typeface="Arial" panose="020B0604020202020204" pitchFamily="34" charset="0"/>
+              <a:buChar char="•"/>
+              <a:defRPr sz="2000" kern="1200">
+                <a:solidFill>
+                  <a:schemeClr val="tx1"/>
+                </a:solidFill>
+                <a:latin typeface="+mn-lt"/>
+                <a:ea typeface="+mn-ea"/>
+                <a:cs typeface="+mn-cs"/>
+              </a:defRPr>
+            </a:lvl3pPr>
+            <a:lvl4pPr marL="1600200" indent="-228600" algn="l" defTabSz="914400" rtl="0" eaLnBrk="1" latinLnBrk="0" hangingPunct="1">
+              <a:lnSpc>
+                <a:spcPct val="90000"/>
+              </a:lnSpc>
+              <a:spcBef>
+                <a:spcPts val="500"/>
+              </a:spcBef>
+              <a:buFont typeface="Arial" panose="020B0604020202020204" pitchFamily="34" charset="0"/>
+              <a:buChar char="•"/>
+              <a:defRPr sz="1800" kern="1200">
+                <a:solidFill>
+                  <a:schemeClr val="tx1"/>
+                </a:solidFill>
+                <a:latin typeface="+mn-lt"/>
+                <a:ea typeface="+mn-ea"/>
+                <a:cs typeface="+mn-cs"/>
+              </a:defRPr>
+            </a:lvl4pPr>
+            <a:lvl5pPr marL="2057400" indent="-228600" algn="l" defTabSz="914400" rtl="0" eaLnBrk="1" latinLnBrk="0" hangingPunct="1">
+              <a:lnSpc>
+                <a:spcPct val="90000"/>
+              </a:lnSpc>
+              <a:spcBef>
+                <a:spcPts val="500"/>
+              </a:spcBef>
+              <a:buFont typeface="Arial" panose="020B0604020202020204" pitchFamily="34" charset="0"/>
+              <a:buChar char="•"/>
+              <a:defRPr sz="1800" kern="1200">
+                <a:solidFill>
+                  <a:schemeClr val="tx1"/>
+                </a:solidFill>
+                <a:latin typeface="+mn-lt"/>
+                <a:ea typeface="+mn-ea"/>
+                <a:cs typeface="+mn-cs"/>
+              </a:defRPr>
+            </a:lvl5pPr>
+            <a:lvl6pPr marL="2514600" indent="-228600" algn="l" defTabSz="914400" rtl="0" eaLnBrk="1" latinLnBrk="0" hangingPunct="1">
+              <a:lnSpc>
+                <a:spcPct val="90000"/>
+              </a:lnSpc>
+              <a:spcBef>
+                <a:spcPts val="500"/>
+              </a:spcBef>
+              <a:buFont typeface="Arial" panose="020B0604020202020204" pitchFamily="34" charset="0"/>
+              <a:buChar char="•"/>
+              <a:defRPr sz="1800" kern="1200">
+                <a:solidFill>
+                  <a:schemeClr val="tx1"/>
+                </a:solidFill>
+                <a:latin typeface="+mn-lt"/>
+                <a:ea typeface="+mn-ea"/>
+                <a:cs typeface="+mn-cs"/>
+              </a:defRPr>
+            </a:lvl6pPr>
+            <a:lvl7pPr marL="2971800" indent="-228600" algn="l" defTabSz="914400" rtl="0" eaLnBrk="1" latinLnBrk="0" hangingPunct="1">
+              <a:lnSpc>
+                <a:spcPct val="90000"/>
+              </a:lnSpc>
+              <a:spcBef>
+                <a:spcPts val="500"/>
+              </a:spcBef>
+              <a:buFont typeface="Arial" panose="020B0604020202020204" pitchFamily="34" charset="0"/>
+              <a:buChar char="•"/>
+              <a:defRPr sz="1800" kern="1200">
+                <a:solidFill>
+                  <a:schemeClr val="tx1"/>
+                </a:solidFill>
+                <a:latin typeface="+mn-lt"/>
+                <a:ea typeface="+mn-ea"/>
+                <a:cs typeface="+mn-cs"/>
+              </a:defRPr>
+            </a:lvl7pPr>
+            <a:lvl8pPr marL="3429000" indent="-228600" algn="l" defTabSz="914400" rtl="0" eaLnBrk="1" latinLnBrk="0" hangingPunct="1">
+              <a:lnSpc>
+                <a:spcPct val="90000"/>
+              </a:lnSpc>
+              <a:spcBef>
+                <a:spcPts val="500"/>
+              </a:spcBef>
+              <a:buFont typeface="Arial" panose="020B0604020202020204" pitchFamily="34" charset="0"/>
+              <a:buChar char="•"/>
+              <a:defRPr sz="1800" kern="1200">
+                <a:solidFill>
+                  <a:schemeClr val="tx1"/>
+                </a:solidFill>
+                <a:latin typeface="+mn-lt"/>
+                <a:ea typeface="+mn-ea"/>
+                <a:cs typeface="+mn-cs"/>
+              </a:defRPr>
+            </a:lvl8pPr>
+            <a:lvl9pPr marL="3886200" indent="-228600" algn="l" defTabSz="914400" rtl="0" eaLnBrk="1" latinLnBrk="0" hangingPunct="1">
+              <a:lnSpc>
+                <a:spcPct val="90000"/>
+              </a:lnSpc>
+              <a:spcBef>
+                <a:spcPts val="500"/>
+              </a:spcBef>
+              <a:buFont typeface="Arial" panose="020B0604020202020204" pitchFamily="34" charset="0"/>
+              <a:buChar char="•"/>
+              <a:defRPr sz="1800" kern="1200">
+                <a:solidFill>
+                  <a:schemeClr val="tx1"/>
+                </a:solidFill>
+                <a:latin typeface="+mn-lt"/>
+                <a:ea typeface="+mn-ea"/>
+                <a:cs typeface="+mn-cs"/>
+              </a:defRPr>
+            </a:lvl9pPr>
+          </a:lstStyle>
+          <a:p>
+            <a:pPr algn="just"/>
+            <a:r>
+              <a:rPr lang="fr-FR" sz="2000" dirty="0" smtClean="0"/>
+              <a:t>A </a:t>
+            </a:r>
+            <a:r>
+              <a:rPr lang="fr-FR" sz="2000" dirty="0" err="1" smtClean="0"/>
+              <a:t>webpage</a:t>
+            </a:r>
+            <a:r>
+              <a:rPr lang="fr-FR" sz="2000" dirty="0"/>
+              <a:t> </a:t>
+            </a:r>
+            <a:r>
+              <a:rPr lang="fr-FR" sz="2000" dirty="0" err="1" smtClean="0"/>
+              <a:t>linked</a:t>
+            </a:r>
+            <a:r>
+              <a:rPr lang="fr-FR" sz="2000" dirty="0" smtClean="0"/>
+              <a:t> to </a:t>
+            </a:r>
+            <a:r>
+              <a:rPr lang="fr-FR" sz="2000" dirty="0" err="1" smtClean="0"/>
+              <a:t>Cellomet</a:t>
+            </a:r>
+            <a:r>
+              <a:rPr lang="fr-FR" sz="2000" dirty="0" smtClean="0"/>
+              <a:t> </a:t>
+            </a:r>
+            <a:r>
+              <a:rPr lang="fr-FR" sz="2000" dirty="0" err="1" smtClean="0"/>
+              <a:t>allowing</a:t>
+            </a:r>
+            <a:r>
+              <a:rPr lang="fr-FR" sz="2000" dirty="0" smtClean="0"/>
+              <a:t> </a:t>
+            </a:r>
+            <a:r>
+              <a:rPr lang="fr-FR" sz="2000" dirty="0" err="1" smtClean="0"/>
+              <a:t>users</a:t>
+            </a:r>
+            <a:r>
+              <a:rPr lang="fr-FR" sz="2000" dirty="0" smtClean="0"/>
+              <a:t> to </a:t>
+            </a:r>
+            <a:r>
+              <a:rPr lang="fr-FR" sz="2000" dirty="0" err="1" smtClean="0"/>
+              <a:t>download</a:t>
+            </a:r>
+            <a:r>
+              <a:rPr lang="fr-FR" sz="2000" dirty="0" smtClean="0"/>
+              <a:t> the </a:t>
+            </a:r>
+            <a:r>
+              <a:rPr lang="fr-FR" sz="2000" dirty="0" err="1" smtClean="0"/>
+              <a:t>app</a:t>
+            </a:r>
+            <a:endParaRPr lang="fr-FR" sz="2000" dirty="0"/>
+          </a:p>
+          <a:p>
+            <a:pPr marL="0" indent="0" algn="just">
+              <a:buNone/>
+            </a:pPr>
+            <a:endParaRPr lang="fr-FR" sz="2000" dirty="0"/>
+          </a:p>
+          <a:p>
+            <a:pPr algn="just"/>
+            <a:r>
+              <a:rPr lang="fr-FR" sz="2000" dirty="0" smtClean="0"/>
+              <a:t>A </a:t>
+            </a:r>
+            <a:r>
+              <a:rPr lang="fr-FR" sz="2000" dirty="0" err="1" smtClean="0"/>
+              <a:t>fully</a:t>
+            </a:r>
+            <a:r>
+              <a:rPr lang="fr-FR" sz="2000" dirty="0" smtClean="0"/>
+              <a:t> </a:t>
+            </a:r>
+            <a:r>
+              <a:rPr lang="fr-FR" sz="2000" dirty="0" err="1" smtClean="0"/>
+              <a:t>functionnal</a:t>
+            </a:r>
+            <a:r>
+              <a:rPr lang="fr-FR" sz="2000" dirty="0" smtClean="0"/>
+              <a:t> non-canonical </a:t>
+            </a:r>
+            <a:r>
+              <a:rPr lang="fr-FR" sz="2000" dirty="0" err="1" smtClean="0"/>
+              <a:t>gene</a:t>
+            </a:r>
+            <a:r>
+              <a:rPr lang="fr-FR" sz="2000" dirty="0" smtClean="0"/>
+              <a:t> </a:t>
+            </a:r>
+            <a:r>
+              <a:rPr lang="fr-FR" sz="2000" dirty="0" err="1" smtClean="0"/>
+              <a:t>analysis</a:t>
+            </a:r>
+            <a:r>
+              <a:rPr lang="fr-FR" sz="2000" dirty="0" smtClean="0"/>
+              <a:t> </a:t>
+            </a:r>
+            <a:r>
+              <a:rPr lang="fr-FR" sz="2000" dirty="0" err="1" smtClean="0"/>
+              <a:t>tool</a:t>
+            </a:r>
+            <a:endParaRPr lang="fr-FR" sz="2000" dirty="0"/>
+          </a:p>
+          <a:p>
+            <a:pPr algn="just"/>
+            <a:endParaRPr lang="fr-FR" sz="2000" dirty="0"/>
+          </a:p>
+          <a:p>
+            <a:pPr algn="just"/>
+            <a:r>
+              <a:rPr lang="fr-FR" sz="2000" dirty="0" smtClean="0"/>
+              <a:t>A extensive and </a:t>
+            </a:r>
+            <a:r>
+              <a:rPr lang="fr-FR" sz="2000" dirty="0" err="1" smtClean="0"/>
+              <a:t>comprehensive</a:t>
+            </a:r>
+            <a:r>
+              <a:rPr lang="fr-FR" sz="2000" dirty="0" smtClean="0"/>
+              <a:t> user guide</a:t>
+            </a:r>
+            <a:endParaRPr lang="fr-FR" sz="2000" dirty="0" smtClean="0"/>
+          </a:p>
+          <a:p>
+            <a:pPr algn="just"/>
+            <a:endParaRPr lang="fr-FR" sz="2000" dirty="0"/>
+          </a:p>
+          <a:p>
+            <a:pPr algn="just"/>
+            <a:r>
+              <a:rPr lang="fr-FR" sz="2000" dirty="0" smtClean="0"/>
+              <a:t>A </a:t>
+            </a:r>
+            <a:r>
+              <a:rPr lang="fr-FR" sz="2000" dirty="0" err="1" smtClean="0"/>
+              <a:t>simplified</a:t>
+            </a:r>
+            <a:r>
+              <a:rPr lang="fr-FR" sz="2000" dirty="0" smtClean="0"/>
+              <a:t> interaction </a:t>
+            </a:r>
+            <a:r>
+              <a:rPr lang="fr-FR" sz="2000" dirty="0" err="1" smtClean="0"/>
+              <a:t>with</a:t>
+            </a:r>
+            <a:r>
+              <a:rPr lang="fr-FR" sz="2000" dirty="0" smtClean="0"/>
+              <a:t> </a:t>
+            </a:r>
+            <a:r>
+              <a:rPr lang="fr-FR" sz="2000" dirty="0" err="1" smtClean="0"/>
+              <a:t>other</a:t>
+            </a:r>
+            <a:r>
+              <a:rPr lang="fr-FR" sz="2000" dirty="0" smtClean="0"/>
+              <a:t> </a:t>
+            </a:r>
+            <a:r>
+              <a:rPr lang="fr-FR" sz="2000" dirty="0" err="1" smtClean="0"/>
+              <a:t>bioinformatic</a:t>
+            </a:r>
+            <a:r>
+              <a:rPr lang="fr-FR" sz="2000" dirty="0" smtClean="0"/>
+              <a:t> </a:t>
+            </a:r>
+            <a:r>
+              <a:rPr lang="fr-FR" sz="2000" dirty="0" err="1" smtClean="0"/>
+              <a:t>tools</a:t>
+            </a:r>
+            <a:endParaRPr lang="fr-FR" sz="2000" dirty="0" smtClean="0"/>
+          </a:p>
+          <a:p>
+            <a:pPr algn="just"/>
+            <a:endParaRPr lang="fr-FR" sz="2000" dirty="0"/>
+          </a:p>
+          <a:p>
+            <a:pPr algn="just"/>
+            <a:r>
+              <a:rPr lang="fr-FR" sz="2000" dirty="0" smtClean="0"/>
+              <a:t>A </a:t>
+            </a:r>
+            <a:r>
+              <a:rPr lang="fr-FR" sz="2000" dirty="0" err="1" smtClean="0"/>
+              <a:t>webpage</a:t>
+            </a:r>
+            <a:r>
+              <a:rPr lang="fr-FR" sz="2000" dirty="0" smtClean="0"/>
+              <a:t> </a:t>
+            </a:r>
+            <a:r>
+              <a:rPr lang="fr-FR" sz="2000" dirty="0" err="1" smtClean="0"/>
+              <a:t>allowing</a:t>
+            </a:r>
+            <a:r>
+              <a:rPr lang="fr-FR" sz="2000" dirty="0" smtClean="0"/>
+              <a:t> the client to </a:t>
+            </a:r>
+            <a:r>
+              <a:rPr lang="fr-FR" sz="2000" dirty="0" err="1" smtClean="0"/>
+              <a:t>modify</a:t>
+            </a:r>
+            <a:r>
+              <a:rPr lang="fr-FR" sz="2000" dirty="0" smtClean="0"/>
+              <a:t> all aspects of a </a:t>
+            </a:r>
+            <a:r>
+              <a:rPr lang="fr-FR" sz="2000" dirty="0" err="1" smtClean="0"/>
+              <a:t>database</a:t>
+            </a:r>
+            <a:endParaRPr lang="fr-FR" sz="2000" dirty="0"/>
+          </a:p>
+          <a:p>
+            <a:pPr algn="just"/>
+            <a:endParaRPr lang="fr-FR" sz="2000" dirty="0"/>
+          </a:p>
+          <a:p>
+            <a:pPr marL="0" indent="0" algn="just">
+              <a:buNone/>
+            </a:pPr>
+            <a:endParaRPr lang="fr-FR" sz="2000" dirty="0"/>
+          </a:p>
+          <a:p>
+            <a:pPr marL="0" indent="0" algn="just">
+              <a:buFont typeface="Arial" panose="020B0604020202020204" pitchFamily="34" charset="0"/>
+              <a:buNone/>
+            </a:pPr>
+            <a:endParaRPr lang="fr-FR" sz="2000" dirty="0"/>
+          </a:p>
+        </p:txBody>
+      </p:sp>
     </p:spTree>
     <p:extLst>
       <p:ext uri="{BB962C8B-B14F-4D97-AF65-F5344CB8AC3E}">
-        <p14:creationId xmlns:p14="http://schemas.microsoft.com/office/powerpoint/2010/main" val="3275783859"/>
+        <p14:creationId xmlns:p14="http://schemas.microsoft.com/office/powerpoint/2010/main" val="2010621348"/>
       </p:ext>
     </p:extLst>
   </p:cSld>

</xml_diff>

<commit_message>
tested some server stuff, working on slides
</commit_message>
<xml_diff>
--- a/Slides/Soutenance_Final.pptx
+++ b/Slides/Soutenance_Final.pptx
@@ -4151,21 +4151,21 @@
     </dgm:pt>
   </dgm:ptLst>
   <dgm:cxnLst>
+    <dgm:cxn modelId="{BFE5F03E-99EE-488D-A25F-FA4A305398F3}" type="presOf" srcId="{EEB7DF95-B1E1-4355-BDED-67254F3A40BF}" destId="{156A4B50-5EBB-4BD2-8AF0-C722439DBC8D}" srcOrd="0" destOrd="0" presId="urn:microsoft.com/office/officeart/2005/8/layout/radial1"/>
     <dgm:cxn modelId="{CE2AF7AB-2949-4DCD-9C29-6B60E91D8468}" srcId="{0916D3E2-7950-4B1E-A80A-B1A0DFE4D7BE}" destId="{B8F4B4B5-48BB-4436-A4C8-0772D59377AC}" srcOrd="2" destOrd="0" parTransId="{EEB7DF95-B1E1-4355-BDED-67254F3A40BF}" sibTransId="{07F8EC93-687D-4C25-BBFA-77894EDF7DA2}"/>
+    <dgm:cxn modelId="{2D7DE33D-C3DB-49E5-ADF6-52C214CF1C59}" srcId="{0916D3E2-7950-4B1E-A80A-B1A0DFE4D7BE}" destId="{7F397B27-ED42-4C0B-84EB-F42483A443DB}" srcOrd="1" destOrd="0" parTransId="{DD81B84C-4525-4615-9233-87E402AFBABC}" sibTransId="{97EBF3C2-DAC2-40A4-AE80-264E3F21FCCC}"/>
+    <dgm:cxn modelId="{7470EB8E-365B-4C7B-B345-F3A82F2BDE86}" type="presOf" srcId="{EEB7DF95-B1E1-4355-BDED-67254F3A40BF}" destId="{0FA48441-B5ED-464B-AB5B-44DAB679EE64}" srcOrd="1" destOrd="0" presId="urn:microsoft.com/office/officeart/2005/8/layout/radial1"/>
     <dgm:cxn modelId="{D7CE5B38-4681-488A-875C-5BC6D4608B17}" type="presOf" srcId="{B8F4B4B5-48BB-4436-A4C8-0772D59377AC}" destId="{B8775ABA-3037-409F-B1F5-5479D38AC897}" srcOrd="0" destOrd="0" presId="urn:microsoft.com/office/officeart/2005/8/layout/radial1"/>
+    <dgm:cxn modelId="{A9B36F8A-C74B-47A9-B539-806F6BB77A1A}" srcId="{CC293B1C-4CF8-4FF0-BBC7-4942ED2D7F88}" destId="{0916D3E2-7950-4B1E-A80A-B1A0DFE4D7BE}" srcOrd="0" destOrd="0" parTransId="{78ED7DF1-7D14-4D64-A8E3-CBD6C30B03FB}" sibTransId="{402F8436-663D-4DB8-A22F-0A8F501EB425}"/>
+    <dgm:cxn modelId="{4F76CFC7-AC86-4FD6-BD3B-3B31C6A8EDDA}" type="presOf" srcId="{F26E0BCB-616E-4F5C-9212-B89461307743}" destId="{FB6E935B-AB56-4686-BAF4-89171D311D48}" srcOrd="0" destOrd="0" presId="urn:microsoft.com/office/officeart/2005/8/layout/radial1"/>
+    <dgm:cxn modelId="{53089D63-12EB-40F9-92A2-F39B07E20E6B}" type="presOf" srcId="{0916D3E2-7950-4B1E-A80A-B1A0DFE4D7BE}" destId="{334F0DA9-4D69-40E7-AE37-8BB2E71C3ACD}" srcOrd="0" destOrd="0" presId="urn:microsoft.com/office/officeart/2005/8/layout/radial1"/>
+    <dgm:cxn modelId="{2E6F4476-BF79-4C90-823B-71099E5FD8D3}" type="presOf" srcId="{DD81B84C-4525-4615-9233-87E402AFBABC}" destId="{9CD455AE-EC69-44E0-B929-B59BCD7E9894}" srcOrd="1" destOrd="0" presId="urn:microsoft.com/office/officeart/2005/8/layout/radial1"/>
+    <dgm:cxn modelId="{6037BACF-1495-4D63-973A-E9906686C9EC}" type="presOf" srcId="{9B35DA45-8824-4EE3-89F0-3F4E07F980E3}" destId="{51D4E2D9-6364-4FE7-BE7F-89898165258A}" srcOrd="0" destOrd="0" presId="urn:microsoft.com/office/officeart/2005/8/layout/radial1"/>
+    <dgm:cxn modelId="{4E83842D-6898-45A2-8C76-AC263926CE66}" type="presOf" srcId="{CC293B1C-4CF8-4FF0-BBC7-4942ED2D7F88}" destId="{05AAFE4B-4748-4F9C-AA5B-DEC71FC73E20}" srcOrd="0" destOrd="0" presId="urn:microsoft.com/office/officeart/2005/8/layout/radial1"/>
+    <dgm:cxn modelId="{EE79DC2E-EE32-4B0A-ADFD-E11D61A99647}" type="presOf" srcId="{DD81B84C-4525-4615-9233-87E402AFBABC}" destId="{3134C74D-D45F-4D44-8DA9-5DD9ACC7028A}" srcOrd="0" destOrd="0" presId="urn:microsoft.com/office/officeart/2005/8/layout/radial1"/>
     <dgm:cxn modelId="{08978BA1-AE5A-4DFF-A0C3-92D4A0078A98}" srcId="{0916D3E2-7950-4B1E-A80A-B1A0DFE4D7BE}" destId="{9B35DA45-8824-4EE3-89F0-3F4E07F980E3}" srcOrd="0" destOrd="0" parTransId="{F26E0BCB-616E-4F5C-9212-B89461307743}" sibTransId="{6FFF208B-A136-4388-9736-DE2BA4AFD5AF}"/>
+    <dgm:cxn modelId="{1173F0C1-237A-44C5-81A9-6289AFEB7E80}" type="presOf" srcId="{7F397B27-ED42-4C0B-84EB-F42483A443DB}" destId="{FC75532D-1A75-4D81-A458-80C91B398F9D}" srcOrd="0" destOrd="0" presId="urn:microsoft.com/office/officeart/2005/8/layout/radial1"/>
     <dgm:cxn modelId="{8C318C29-2BA6-4073-9DC3-993B41DBBD97}" type="presOf" srcId="{F26E0BCB-616E-4F5C-9212-B89461307743}" destId="{B26CA117-7877-4BBB-8697-7BAA6B4D1769}" srcOrd="1" destOrd="0" presId="urn:microsoft.com/office/officeart/2005/8/layout/radial1"/>
-    <dgm:cxn modelId="{BFE5F03E-99EE-488D-A25F-FA4A305398F3}" type="presOf" srcId="{EEB7DF95-B1E1-4355-BDED-67254F3A40BF}" destId="{156A4B50-5EBB-4BD2-8AF0-C722439DBC8D}" srcOrd="0" destOrd="0" presId="urn:microsoft.com/office/officeart/2005/8/layout/radial1"/>
-    <dgm:cxn modelId="{4F76CFC7-AC86-4FD6-BD3B-3B31C6A8EDDA}" type="presOf" srcId="{F26E0BCB-616E-4F5C-9212-B89461307743}" destId="{FB6E935B-AB56-4686-BAF4-89171D311D48}" srcOrd="0" destOrd="0" presId="urn:microsoft.com/office/officeart/2005/8/layout/radial1"/>
-    <dgm:cxn modelId="{7470EB8E-365B-4C7B-B345-F3A82F2BDE86}" type="presOf" srcId="{EEB7DF95-B1E1-4355-BDED-67254F3A40BF}" destId="{0FA48441-B5ED-464B-AB5B-44DAB679EE64}" srcOrd="1" destOrd="0" presId="urn:microsoft.com/office/officeart/2005/8/layout/radial1"/>
-    <dgm:cxn modelId="{2E6F4476-BF79-4C90-823B-71099E5FD8D3}" type="presOf" srcId="{DD81B84C-4525-4615-9233-87E402AFBABC}" destId="{9CD455AE-EC69-44E0-B929-B59BCD7E9894}" srcOrd="1" destOrd="0" presId="urn:microsoft.com/office/officeart/2005/8/layout/radial1"/>
-    <dgm:cxn modelId="{2D7DE33D-C3DB-49E5-ADF6-52C214CF1C59}" srcId="{0916D3E2-7950-4B1E-A80A-B1A0DFE4D7BE}" destId="{7F397B27-ED42-4C0B-84EB-F42483A443DB}" srcOrd="1" destOrd="0" parTransId="{DD81B84C-4525-4615-9233-87E402AFBABC}" sibTransId="{97EBF3C2-DAC2-40A4-AE80-264E3F21FCCC}"/>
-    <dgm:cxn modelId="{A9B36F8A-C74B-47A9-B539-806F6BB77A1A}" srcId="{CC293B1C-4CF8-4FF0-BBC7-4942ED2D7F88}" destId="{0916D3E2-7950-4B1E-A80A-B1A0DFE4D7BE}" srcOrd="0" destOrd="0" parTransId="{78ED7DF1-7D14-4D64-A8E3-CBD6C30B03FB}" sibTransId="{402F8436-663D-4DB8-A22F-0A8F501EB425}"/>
-    <dgm:cxn modelId="{4E83842D-6898-45A2-8C76-AC263926CE66}" type="presOf" srcId="{CC293B1C-4CF8-4FF0-BBC7-4942ED2D7F88}" destId="{05AAFE4B-4748-4F9C-AA5B-DEC71FC73E20}" srcOrd="0" destOrd="0" presId="urn:microsoft.com/office/officeart/2005/8/layout/radial1"/>
-    <dgm:cxn modelId="{53089D63-12EB-40F9-92A2-F39B07E20E6B}" type="presOf" srcId="{0916D3E2-7950-4B1E-A80A-B1A0DFE4D7BE}" destId="{334F0DA9-4D69-40E7-AE37-8BB2E71C3ACD}" srcOrd="0" destOrd="0" presId="urn:microsoft.com/office/officeart/2005/8/layout/radial1"/>
-    <dgm:cxn modelId="{EE79DC2E-EE32-4B0A-ADFD-E11D61A99647}" type="presOf" srcId="{DD81B84C-4525-4615-9233-87E402AFBABC}" destId="{3134C74D-D45F-4D44-8DA9-5DD9ACC7028A}" srcOrd="0" destOrd="0" presId="urn:microsoft.com/office/officeart/2005/8/layout/radial1"/>
-    <dgm:cxn modelId="{1173F0C1-237A-44C5-81A9-6289AFEB7E80}" type="presOf" srcId="{7F397B27-ED42-4C0B-84EB-F42483A443DB}" destId="{FC75532D-1A75-4D81-A458-80C91B398F9D}" srcOrd="0" destOrd="0" presId="urn:microsoft.com/office/officeart/2005/8/layout/radial1"/>
-    <dgm:cxn modelId="{6037BACF-1495-4D63-973A-E9906686C9EC}" type="presOf" srcId="{9B35DA45-8824-4EE3-89F0-3F4E07F980E3}" destId="{51D4E2D9-6364-4FE7-BE7F-89898165258A}" srcOrd="0" destOrd="0" presId="urn:microsoft.com/office/officeart/2005/8/layout/radial1"/>
     <dgm:cxn modelId="{772C3BB5-DF35-42DE-A439-0DCB31D63FB8}" type="presParOf" srcId="{05AAFE4B-4748-4F9C-AA5B-DEC71FC73E20}" destId="{334F0DA9-4D69-40E7-AE37-8BB2E71C3ACD}" srcOrd="0" destOrd="0" presId="urn:microsoft.com/office/officeart/2005/8/layout/radial1"/>
     <dgm:cxn modelId="{20FC6565-C496-4E94-8CCE-904149940058}" type="presParOf" srcId="{05AAFE4B-4748-4F9C-AA5B-DEC71FC73E20}" destId="{FB6E935B-AB56-4686-BAF4-89171D311D48}" srcOrd="1" destOrd="0" presId="urn:microsoft.com/office/officeart/2005/8/layout/radial1"/>
     <dgm:cxn modelId="{1BDA0C39-DB3E-4726-AC03-ECA79335B44E}" type="presParOf" srcId="{FB6E935B-AB56-4686-BAF4-89171D311D48}" destId="{B26CA117-7877-4BBB-8697-7BAA6B4D1769}" srcOrd="0" destOrd="0" presId="urn:microsoft.com/office/officeart/2005/8/layout/radial1"/>
@@ -4577,22 +4577,22 @@
     </dgm:pt>
   </dgm:ptLst>
   <dgm:cxnLst>
+    <dgm:cxn modelId="{AFAAAFAD-A0DE-47C1-9249-77B5BDE05E36}" type="presOf" srcId="{81607F9D-ACA8-4EBC-97F3-AE620D537126}" destId="{AECDF339-533B-4319-9DD1-FE0312AA5FE7}" srcOrd="0" destOrd="0" presId="urn:microsoft.com/office/officeart/2005/8/layout/hList7"/>
+    <dgm:cxn modelId="{38CD83C8-6796-4198-B7C8-EFF34EC9AA55}" type="presOf" srcId="{BA786E09-868C-446C-BCAD-1B9A337A2314}" destId="{9B6DBF9B-EFA6-45E8-AAE9-1FBCC2922B5E}" srcOrd="0" destOrd="0" presId="urn:microsoft.com/office/officeart/2005/8/layout/hList7"/>
+    <dgm:cxn modelId="{2E016A71-4A74-45F5-AD15-07D3B1D0466D}" srcId="{95C89F30-E4C0-41F0-9F78-CFBA2BC6B6E7}" destId="{47253CFC-4569-4709-81D3-DEEB42841B34}" srcOrd="2" destOrd="0" parTransId="{790D9CA9-D5EB-4ABB-B3FF-C076CA534420}" sibTransId="{2F25E3F7-E9EB-4C08-9116-69D5C4FD6E2A}"/>
+    <dgm:cxn modelId="{F6F9661A-BC21-475D-819D-50626DE6BCFB}" type="presOf" srcId="{2F25E3F7-E9EB-4C08-9116-69D5C4FD6E2A}" destId="{2845AC54-25A9-480C-BA9C-51BB56258253}" srcOrd="0" destOrd="0" presId="urn:microsoft.com/office/officeart/2005/8/layout/hList7"/>
     <dgm:cxn modelId="{C645A4BB-EDB6-4E76-AB82-9AD72E6BF557}" type="presOf" srcId="{BA786E09-868C-446C-BCAD-1B9A337A2314}" destId="{31F77346-6636-44FE-8237-42E5F75F0855}" srcOrd="1" destOrd="0" presId="urn:microsoft.com/office/officeart/2005/8/layout/hList7"/>
+    <dgm:cxn modelId="{194860A3-1900-4650-B671-CEC4587BA924}" type="presOf" srcId="{94CA40FB-60B0-465C-89DE-37B57251E362}" destId="{6A4D6A8E-A18C-499A-84BC-74FED5388C93}" srcOrd="0" destOrd="0" presId="urn:microsoft.com/office/officeart/2005/8/layout/hList7"/>
     <dgm:cxn modelId="{57921F95-0423-45E7-AE0D-672371E39D53}" type="presOf" srcId="{5EE301F9-AA62-4FDD-BBD4-EB5F68D85FEC}" destId="{6B2B5E85-AAEA-413B-89EF-96FC0B61D0DB}" srcOrd="1" destOrd="0" presId="urn:microsoft.com/office/officeart/2005/8/layout/hList7"/>
-    <dgm:cxn modelId="{F6F9661A-BC21-475D-819D-50626DE6BCFB}" type="presOf" srcId="{2F25E3F7-E9EB-4C08-9116-69D5C4FD6E2A}" destId="{2845AC54-25A9-480C-BA9C-51BB56258253}" srcOrd="0" destOrd="0" presId="urn:microsoft.com/office/officeart/2005/8/layout/hList7"/>
+    <dgm:cxn modelId="{4E004507-C92D-4D0B-9DBB-DB4591A9B903}" srcId="{95C89F30-E4C0-41F0-9F78-CFBA2BC6B6E7}" destId="{BA786E09-868C-446C-BCAD-1B9A337A2314}" srcOrd="3" destOrd="0" parTransId="{59BE49D1-A09D-46A0-A218-5983A849445B}" sibTransId="{870FB8E6-A3E1-4439-9131-142A0512FE32}"/>
+    <dgm:cxn modelId="{1AE06204-B328-4A88-90DE-47487907D919}" type="presOf" srcId="{47253CFC-4569-4709-81D3-DEEB42841B34}" destId="{65C1CC62-47DD-4AE0-BB4E-E1AA4210EAD1}" srcOrd="1" destOrd="0" presId="urn:microsoft.com/office/officeart/2005/8/layout/hList7"/>
+    <dgm:cxn modelId="{F309A241-CAAA-4CAA-89A7-3EF413DFED5F}" type="presOf" srcId="{47253CFC-4569-4709-81D3-DEEB42841B34}" destId="{18E220CA-4E07-4273-9F20-D66E44D1CC15}" srcOrd="0" destOrd="0" presId="urn:microsoft.com/office/officeart/2005/8/layout/hList7"/>
+    <dgm:cxn modelId="{E53B2165-E749-413E-9F1A-C9CC76DA6A5C}" srcId="{95C89F30-E4C0-41F0-9F78-CFBA2BC6B6E7}" destId="{5EE301F9-AA62-4FDD-BBD4-EB5F68D85FEC}" srcOrd="0" destOrd="0" parTransId="{752A3FC9-4F42-4B45-864D-D48201C144BC}" sibTransId="{7A2D0BBB-4796-4683-A258-869CCE2EFDEE}"/>
     <dgm:cxn modelId="{CF0035A1-5E18-4F9A-AAAD-C4F8302A689F}" type="presOf" srcId="{81607F9D-ACA8-4EBC-97F3-AE620D537126}" destId="{FCBD48AD-6356-4016-B622-1476036943D2}" srcOrd="1" destOrd="0" presId="urn:microsoft.com/office/officeart/2005/8/layout/hList7"/>
-    <dgm:cxn modelId="{AFAAAFAD-A0DE-47C1-9249-77B5BDE05E36}" type="presOf" srcId="{81607F9D-ACA8-4EBC-97F3-AE620D537126}" destId="{AECDF339-533B-4319-9DD1-FE0312AA5FE7}" srcOrd="0" destOrd="0" presId="urn:microsoft.com/office/officeart/2005/8/layout/hList7"/>
     <dgm:cxn modelId="{BDD1CA52-8007-48A8-B091-1E74889DEE99}" type="presOf" srcId="{95C89F30-E4C0-41F0-9F78-CFBA2BC6B6E7}" destId="{68497B09-3716-4EBD-AC6B-8AE2BDCC8972}" srcOrd="0" destOrd="0" presId="urn:microsoft.com/office/officeart/2005/8/layout/hList7"/>
-    <dgm:cxn modelId="{E53B2165-E749-413E-9F1A-C9CC76DA6A5C}" srcId="{95C89F30-E4C0-41F0-9F78-CFBA2BC6B6E7}" destId="{5EE301F9-AA62-4FDD-BBD4-EB5F68D85FEC}" srcOrd="0" destOrd="0" parTransId="{752A3FC9-4F42-4B45-864D-D48201C144BC}" sibTransId="{7A2D0BBB-4796-4683-A258-869CCE2EFDEE}"/>
     <dgm:cxn modelId="{B6D21F72-7318-4B23-BC86-23B4E85AD610}" type="presOf" srcId="{5EE301F9-AA62-4FDD-BBD4-EB5F68D85FEC}" destId="{90FFEDE6-D24B-46AA-AC61-5A2CA3E513CC}" srcOrd="0" destOrd="0" presId="urn:microsoft.com/office/officeart/2005/8/layout/hList7"/>
     <dgm:cxn modelId="{C503CDFC-F7CF-4B5B-9CB9-D0B888450B80}" srcId="{95C89F30-E4C0-41F0-9F78-CFBA2BC6B6E7}" destId="{81607F9D-ACA8-4EBC-97F3-AE620D537126}" srcOrd="1" destOrd="0" parTransId="{5614C387-4578-47E1-B8ED-4C19C139B6D6}" sibTransId="{94CA40FB-60B0-465C-89DE-37B57251E362}"/>
-    <dgm:cxn modelId="{2E016A71-4A74-45F5-AD15-07D3B1D0466D}" srcId="{95C89F30-E4C0-41F0-9F78-CFBA2BC6B6E7}" destId="{47253CFC-4569-4709-81D3-DEEB42841B34}" srcOrd="2" destOrd="0" parTransId="{790D9CA9-D5EB-4ABB-B3FF-C076CA534420}" sibTransId="{2F25E3F7-E9EB-4C08-9116-69D5C4FD6E2A}"/>
-    <dgm:cxn modelId="{1AE06204-B328-4A88-90DE-47487907D919}" type="presOf" srcId="{47253CFC-4569-4709-81D3-DEEB42841B34}" destId="{65C1CC62-47DD-4AE0-BB4E-E1AA4210EAD1}" srcOrd="1" destOrd="0" presId="urn:microsoft.com/office/officeart/2005/8/layout/hList7"/>
     <dgm:cxn modelId="{2EC55B3D-BFE3-4C06-B5CF-4DA8F00E7DD6}" type="presOf" srcId="{7A2D0BBB-4796-4683-A258-869CCE2EFDEE}" destId="{46B8E31D-92A9-4F7C-AC64-291B22E56C19}" srcOrd="0" destOrd="0" presId="urn:microsoft.com/office/officeart/2005/8/layout/hList7"/>
-    <dgm:cxn modelId="{194860A3-1900-4650-B671-CEC4587BA924}" type="presOf" srcId="{94CA40FB-60B0-465C-89DE-37B57251E362}" destId="{6A4D6A8E-A18C-499A-84BC-74FED5388C93}" srcOrd="0" destOrd="0" presId="urn:microsoft.com/office/officeart/2005/8/layout/hList7"/>
-    <dgm:cxn modelId="{F309A241-CAAA-4CAA-89A7-3EF413DFED5F}" type="presOf" srcId="{47253CFC-4569-4709-81D3-DEEB42841B34}" destId="{18E220CA-4E07-4273-9F20-D66E44D1CC15}" srcOrd="0" destOrd="0" presId="urn:microsoft.com/office/officeart/2005/8/layout/hList7"/>
-    <dgm:cxn modelId="{4E004507-C92D-4D0B-9DBB-DB4591A9B903}" srcId="{95C89F30-E4C0-41F0-9F78-CFBA2BC6B6E7}" destId="{BA786E09-868C-446C-BCAD-1B9A337A2314}" srcOrd="3" destOrd="0" parTransId="{59BE49D1-A09D-46A0-A218-5983A849445B}" sibTransId="{870FB8E6-A3E1-4439-9131-142A0512FE32}"/>
-    <dgm:cxn modelId="{38CD83C8-6796-4198-B7C8-EFF34EC9AA55}" type="presOf" srcId="{BA786E09-868C-446C-BCAD-1B9A337A2314}" destId="{9B6DBF9B-EFA6-45E8-AAE9-1FBCC2922B5E}" srcOrd="0" destOrd="0" presId="urn:microsoft.com/office/officeart/2005/8/layout/hList7"/>
     <dgm:cxn modelId="{4D0448AB-072A-4D18-810D-2383F44A3112}" type="presParOf" srcId="{68497B09-3716-4EBD-AC6B-8AE2BDCC8972}" destId="{5C007895-D27B-4555-8633-C9BBD58A106D}" srcOrd="0" destOrd="0" presId="urn:microsoft.com/office/officeart/2005/8/layout/hList7"/>
     <dgm:cxn modelId="{EB40CABA-D7D8-449B-A3EF-706C96A2B35D}" type="presParOf" srcId="{68497B09-3716-4EBD-AC6B-8AE2BDCC8972}" destId="{851E5CC9-679F-4CF6-B00F-A025B4DEF2B3}" srcOrd="1" destOrd="0" presId="urn:microsoft.com/office/officeart/2005/8/layout/hList7"/>
     <dgm:cxn modelId="{E6D0BBE2-1389-41E3-A561-EB44452418BA}" type="presParOf" srcId="{851E5CC9-679F-4CF6-B00F-A025B4DEF2B3}" destId="{02F5FF00-4C9F-4B29-8EE7-22E5EFD6E9BE}" srcOrd="0" destOrd="0" presId="urn:microsoft.com/office/officeart/2005/8/layout/hList7"/>
@@ -9163,7 +9163,7 @@
           <a:p>
             <a:fld id="{EC83963A-FCD1-4BA3-8F52-F2285ACE2A6A}" type="datetimeFigureOut">
               <a:rPr lang="fr-FR" smtClean="0"/>
-              <a:t>01/02/2020</a:t>
+              <a:t>03/02/2020</a:t>
             </a:fld>
             <a:endParaRPr lang="fr-FR"/>
           </a:p>
@@ -9328,7 +9328,7 @@
           <a:p>
             <a:fld id="{12D3AF9D-FD63-43BA-9EB6-902B12D2DD5D}" type="datetimeFigureOut">
               <a:rPr lang="fr-FR" smtClean="0"/>
-              <a:t>01/02/2020</a:t>
+              <a:t>03/02/2020</a:t>
             </a:fld>
             <a:endParaRPr lang="fr-FR"/>
           </a:p>
@@ -12336,7 +12336,6 @@
               <a:rPr lang="fr-FR" sz="2000" dirty="0" smtClean="0"/>
               <a:t> analyses</a:t>
             </a:r>
-            <a:endParaRPr lang="fr-FR" sz="2000" dirty="0" smtClean="0"/>
           </a:p>
           <a:p>
             <a:pPr algn="just"/>
@@ -12839,7 +12838,6 @@
               <a:rPr lang="fr-FR" sz="2000" dirty="0" smtClean="0"/>
               <a:t> for MA plots</a:t>
             </a:r>
-            <a:endParaRPr lang="fr-FR" sz="2000" dirty="0" smtClean="0"/>
           </a:p>
           <a:p>
             <a:pPr marL="0" indent="0" algn="just">
@@ -13496,6 +13494,770 @@
               <a:t>16</a:t>
             </a:fld>
             <a:endParaRPr lang="fr-FR" dirty="0"/>
+          </a:p>
+        </p:txBody>
+      </p:sp>
+      <p:pic>
+        <p:nvPicPr>
+          <p:cNvPr id="5" name="Picture 4"/>
+          <p:cNvPicPr>
+            <a:picLocks noChangeAspect="1"/>
+          </p:cNvPicPr>
+          <p:nvPr/>
+        </p:nvPicPr>
+        <p:blipFill>
+          <a:blip r:embed="rId2" cstate="print">
+            <a:extLst>
+              <a:ext uri="{28A0092B-C50C-407E-A947-70E740481C1C}">
+                <a14:useLocalDpi xmlns:a14="http://schemas.microsoft.com/office/drawing/2010/main" val="0"/>
+              </a:ext>
+            </a:extLst>
+          </a:blip>
+          <a:stretch>
+            <a:fillRect/>
+          </a:stretch>
+        </p:blipFill>
+        <p:spPr>
+          <a:xfrm>
+            <a:off x="-108191" y="1868647"/>
+            <a:ext cx="1513167" cy="1008778"/>
+          </a:xfrm>
+          <a:prstGeom prst="rect">
+            <a:avLst/>
+          </a:prstGeom>
+        </p:spPr>
+      </p:pic>
+      <p:pic>
+        <p:nvPicPr>
+          <p:cNvPr id="7" name="Picture 6"/>
+          <p:cNvPicPr>
+            <a:picLocks noChangeAspect="1"/>
+          </p:cNvPicPr>
+          <p:nvPr/>
+        </p:nvPicPr>
+        <p:blipFill>
+          <a:blip r:embed="rId3" cstate="print">
+            <a:extLst>
+              <a:ext uri="{28A0092B-C50C-407E-A947-70E740481C1C}">
+                <a14:useLocalDpi xmlns:a14="http://schemas.microsoft.com/office/drawing/2010/main" val="0"/>
+              </a:ext>
+            </a:extLst>
+          </a:blip>
+          <a:stretch>
+            <a:fillRect/>
+          </a:stretch>
+        </p:blipFill>
+        <p:spPr>
+          <a:xfrm>
+            <a:off x="1286311" y="1918981"/>
+            <a:ext cx="1023457" cy="1023457"/>
+          </a:xfrm>
+          <a:prstGeom prst="rect">
+            <a:avLst/>
+          </a:prstGeom>
+        </p:spPr>
+      </p:pic>
+      <p:sp>
+        <p:nvSpPr>
+          <p:cNvPr id="8" name="Rectangle 7"/>
+          <p:cNvSpPr/>
+          <p:nvPr/>
+        </p:nvSpPr>
+        <p:spPr>
+          <a:xfrm>
+            <a:off x="847287" y="3624044"/>
+            <a:ext cx="1157681" cy="427839"/>
+          </a:xfrm>
+          <a:prstGeom prst="rect">
+            <a:avLst/>
+          </a:prstGeom>
+          <a:noFill/>
+          <a:ln>
+            <a:solidFill>
+              <a:schemeClr val="tx1"/>
+            </a:solidFill>
+          </a:ln>
+        </p:spPr>
+        <p:style>
+          <a:lnRef idx="2">
+            <a:schemeClr val="accent1">
+              <a:shade val="50000"/>
+            </a:schemeClr>
+          </a:lnRef>
+          <a:fillRef idx="1">
+            <a:schemeClr val="accent1"/>
+          </a:fillRef>
+          <a:effectRef idx="0">
+            <a:schemeClr val="accent1"/>
+          </a:effectRef>
+          <a:fontRef idx="minor">
+            <a:schemeClr val="lt1"/>
+          </a:fontRef>
+        </p:style>
+        <p:txBody>
+          <a:bodyPr rtlCol="0" anchor="ctr"/>
+          <a:lstStyle/>
+          <a:p>
+            <a:pPr algn="ctr"/>
+            <a:r>
+              <a:rPr lang="en-CA" dirty="0" smtClean="0">
+                <a:solidFill>
+                  <a:schemeClr val="tx1"/>
+                </a:solidFill>
+              </a:rPr>
+              <a:t>DESeq2</a:t>
+            </a:r>
+            <a:endParaRPr lang="en-CA" dirty="0">
+              <a:solidFill>
+                <a:schemeClr val="tx1"/>
+              </a:solidFill>
+            </a:endParaRPr>
+          </a:p>
+        </p:txBody>
+      </p:sp>
+      <p:sp>
+        <p:nvSpPr>
+          <p:cNvPr id="9" name="Rectangle 8"/>
+          <p:cNvSpPr/>
+          <p:nvPr/>
+        </p:nvSpPr>
+        <p:spPr>
+          <a:xfrm>
+            <a:off x="2328474" y="2759979"/>
+            <a:ext cx="2017022" cy="566256"/>
+          </a:xfrm>
+          <a:prstGeom prst="rect">
+            <a:avLst/>
+          </a:prstGeom>
+          <a:noFill/>
+          <a:ln>
+            <a:solidFill>
+              <a:schemeClr val="tx1"/>
+            </a:solidFill>
+          </a:ln>
+        </p:spPr>
+        <p:style>
+          <a:lnRef idx="2">
+            <a:schemeClr val="accent1">
+              <a:shade val="50000"/>
+            </a:schemeClr>
+          </a:lnRef>
+          <a:fillRef idx="1">
+            <a:schemeClr val="accent1"/>
+          </a:fillRef>
+          <a:effectRef idx="0">
+            <a:schemeClr val="accent1"/>
+          </a:effectRef>
+          <a:fontRef idx="minor">
+            <a:schemeClr val="lt1"/>
+          </a:fontRef>
+        </p:style>
+        <p:txBody>
+          <a:bodyPr rtlCol="0" anchor="ctr"/>
+          <a:lstStyle/>
+          <a:p>
+            <a:pPr algn="ctr"/>
+            <a:r>
+              <a:rPr lang="en-CA" dirty="0" smtClean="0">
+                <a:solidFill>
+                  <a:schemeClr val="tx1"/>
+                </a:solidFill>
+              </a:rPr>
+              <a:t>Differential gene expressions</a:t>
+            </a:r>
+            <a:endParaRPr lang="en-CA" dirty="0">
+              <a:solidFill>
+                <a:schemeClr val="tx1"/>
+              </a:solidFill>
+            </a:endParaRPr>
+          </a:p>
+        </p:txBody>
+      </p:sp>
+      <p:sp>
+        <p:nvSpPr>
+          <p:cNvPr id="10" name="Rectangle 9"/>
+          <p:cNvSpPr/>
+          <p:nvPr/>
+        </p:nvSpPr>
+        <p:spPr>
+          <a:xfrm>
+            <a:off x="2328475" y="3514986"/>
+            <a:ext cx="2327416" cy="822121"/>
+          </a:xfrm>
+          <a:prstGeom prst="rect">
+            <a:avLst/>
+          </a:prstGeom>
+          <a:noFill/>
+          <a:ln>
+            <a:solidFill>
+              <a:schemeClr val="tx1"/>
+            </a:solidFill>
+          </a:ln>
+        </p:spPr>
+        <p:style>
+          <a:lnRef idx="2">
+            <a:schemeClr val="accent1">
+              <a:shade val="50000"/>
+            </a:schemeClr>
+          </a:lnRef>
+          <a:fillRef idx="1">
+            <a:schemeClr val="accent1"/>
+          </a:fillRef>
+          <a:effectRef idx="0">
+            <a:schemeClr val="accent1"/>
+          </a:effectRef>
+          <a:fontRef idx="minor">
+            <a:schemeClr val="lt1"/>
+          </a:fontRef>
+        </p:style>
+        <p:txBody>
+          <a:bodyPr rtlCol="0" anchor="ctr"/>
+          <a:lstStyle/>
+          <a:p>
+            <a:pPr algn="ctr"/>
+            <a:r>
+              <a:rPr lang="en-CA" dirty="0" smtClean="0">
+                <a:solidFill>
+                  <a:schemeClr val="tx1"/>
+                </a:solidFill>
+              </a:rPr>
+              <a:t>Differential expressions for significant genes</a:t>
+            </a:r>
+            <a:endParaRPr lang="en-CA" dirty="0">
+              <a:solidFill>
+                <a:schemeClr val="tx1"/>
+              </a:solidFill>
+            </a:endParaRPr>
+          </a:p>
+        </p:txBody>
+      </p:sp>
+      <p:sp>
+        <p:nvSpPr>
+          <p:cNvPr id="11" name="Rectangle 10"/>
+          <p:cNvSpPr/>
+          <p:nvPr/>
+        </p:nvSpPr>
+        <p:spPr>
+          <a:xfrm>
+            <a:off x="2328474" y="4714610"/>
+            <a:ext cx="1157681" cy="528507"/>
+          </a:xfrm>
+          <a:prstGeom prst="rect">
+            <a:avLst/>
+          </a:prstGeom>
+          <a:noFill/>
+          <a:ln>
+            <a:solidFill>
+              <a:schemeClr val="tx1"/>
+            </a:solidFill>
+          </a:ln>
+        </p:spPr>
+        <p:style>
+          <a:lnRef idx="2">
+            <a:schemeClr val="accent1">
+              <a:shade val="50000"/>
+            </a:schemeClr>
+          </a:lnRef>
+          <a:fillRef idx="1">
+            <a:schemeClr val="accent1"/>
+          </a:fillRef>
+          <a:effectRef idx="0">
+            <a:schemeClr val="accent1"/>
+          </a:effectRef>
+          <a:fontRef idx="minor">
+            <a:schemeClr val="lt1"/>
+          </a:fontRef>
+        </p:style>
+        <p:txBody>
+          <a:bodyPr rtlCol="0" anchor="ctr"/>
+          <a:lstStyle/>
+          <a:p>
+            <a:pPr algn="ctr"/>
+            <a:r>
+              <a:rPr lang="en-CA" dirty="0" smtClean="0">
+                <a:solidFill>
+                  <a:schemeClr val="tx1"/>
+                </a:solidFill>
+              </a:rPr>
+              <a:t>Significant gene list</a:t>
+            </a:r>
+            <a:endParaRPr lang="en-CA" dirty="0">
+              <a:solidFill>
+                <a:schemeClr val="tx1"/>
+              </a:solidFill>
+            </a:endParaRPr>
+          </a:p>
+        </p:txBody>
+      </p:sp>
+      <p:sp>
+        <p:nvSpPr>
+          <p:cNvPr id="12" name="Rectangle 11"/>
+          <p:cNvSpPr/>
+          <p:nvPr/>
+        </p:nvSpPr>
+        <p:spPr>
+          <a:xfrm>
+            <a:off x="5083728" y="2116124"/>
+            <a:ext cx="2017022" cy="566256"/>
+          </a:xfrm>
+          <a:prstGeom prst="rect">
+            <a:avLst/>
+          </a:prstGeom>
+          <a:noFill/>
+          <a:ln>
+            <a:solidFill>
+              <a:schemeClr val="tx1"/>
+            </a:solidFill>
+          </a:ln>
+        </p:spPr>
+        <p:style>
+          <a:lnRef idx="2">
+            <a:schemeClr val="accent1">
+              <a:shade val="50000"/>
+            </a:schemeClr>
+          </a:lnRef>
+          <a:fillRef idx="1">
+            <a:schemeClr val="accent1"/>
+          </a:fillRef>
+          <a:effectRef idx="0">
+            <a:schemeClr val="accent1"/>
+          </a:effectRef>
+          <a:fontRef idx="minor">
+            <a:schemeClr val="lt1"/>
+          </a:fontRef>
+        </p:style>
+        <p:txBody>
+          <a:bodyPr rtlCol="0" anchor="ctr"/>
+          <a:lstStyle/>
+          <a:p>
+            <a:pPr algn="ctr"/>
+            <a:r>
+              <a:rPr lang="en-CA" dirty="0" smtClean="0">
+                <a:solidFill>
+                  <a:schemeClr val="tx1"/>
+                </a:solidFill>
+              </a:rPr>
+              <a:t>Custom MA plot</a:t>
+            </a:r>
+            <a:endParaRPr lang="en-CA" dirty="0">
+              <a:solidFill>
+                <a:schemeClr val="tx1"/>
+              </a:solidFill>
+            </a:endParaRPr>
+          </a:p>
+        </p:txBody>
+      </p:sp>
+      <p:sp>
+        <p:nvSpPr>
+          <p:cNvPr id="13" name="Rectangle 12"/>
+          <p:cNvSpPr/>
+          <p:nvPr/>
+        </p:nvSpPr>
+        <p:spPr>
+          <a:xfrm>
+            <a:off x="5083728" y="2877425"/>
+            <a:ext cx="2017022" cy="566256"/>
+          </a:xfrm>
+          <a:prstGeom prst="rect">
+            <a:avLst/>
+          </a:prstGeom>
+          <a:noFill/>
+          <a:ln>
+            <a:solidFill>
+              <a:schemeClr val="tx1"/>
+            </a:solidFill>
+          </a:ln>
+        </p:spPr>
+        <p:style>
+          <a:lnRef idx="2">
+            <a:schemeClr val="accent1">
+              <a:shade val="50000"/>
+            </a:schemeClr>
+          </a:lnRef>
+          <a:fillRef idx="1">
+            <a:schemeClr val="accent1"/>
+          </a:fillRef>
+          <a:effectRef idx="0">
+            <a:schemeClr val="accent1"/>
+          </a:effectRef>
+          <a:fontRef idx="minor">
+            <a:schemeClr val="lt1"/>
+          </a:fontRef>
+        </p:style>
+        <p:txBody>
+          <a:bodyPr rtlCol="0" anchor="ctr"/>
+          <a:lstStyle/>
+          <a:p>
+            <a:pPr algn="ctr"/>
+            <a:r>
+              <a:rPr lang="en-CA" dirty="0" smtClean="0">
+                <a:solidFill>
+                  <a:schemeClr val="tx1"/>
+                </a:solidFill>
+              </a:rPr>
+              <a:t>Custom Volcano plot</a:t>
+            </a:r>
+            <a:endParaRPr lang="en-CA" dirty="0">
+              <a:solidFill>
+                <a:schemeClr val="tx1"/>
+              </a:solidFill>
+            </a:endParaRPr>
+          </a:p>
+        </p:txBody>
+      </p:sp>
+      <p:sp>
+        <p:nvSpPr>
+          <p:cNvPr id="14" name="Rectangle 13"/>
+          <p:cNvSpPr/>
+          <p:nvPr/>
+        </p:nvSpPr>
+        <p:spPr>
+          <a:xfrm>
+            <a:off x="5083728" y="3645019"/>
+            <a:ext cx="2017022" cy="566256"/>
+          </a:xfrm>
+          <a:prstGeom prst="rect">
+            <a:avLst/>
+          </a:prstGeom>
+          <a:noFill/>
+          <a:ln>
+            <a:solidFill>
+              <a:schemeClr val="tx1"/>
+            </a:solidFill>
+          </a:ln>
+        </p:spPr>
+        <p:style>
+          <a:lnRef idx="2">
+            <a:schemeClr val="accent1">
+              <a:shade val="50000"/>
+            </a:schemeClr>
+          </a:lnRef>
+          <a:fillRef idx="1">
+            <a:schemeClr val="accent1"/>
+          </a:fillRef>
+          <a:effectRef idx="0">
+            <a:schemeClr val="accent1"/>
+          </a:effectRef>
+          <a:fontRef idx="minor">
+            <a:schemeClr val="lt1"/>
+          </a:fontRef>
+        </p:style>
+        <p:txBody>
+          <a:bodyPr rtlCol="0" anchor="ctr"/>
+          <a:lstStyle/>
+          <a:p>
+            <a:pPr algn="ctr"/>
+            <a:r>
+              <a:rPr lang="en-CA" dirty="0" smtClean="0">
+                <a:solidFill>
+                  <a:schemeClr val="tx1"/>
+                </a:solidFill>
+              </a:rPr>
+              <a:t>Non-canonic analysis</a:t>
+            </a:r>
+            <a:endParaRPr lang="en-CA" dirty="0">
+              <a:solidFill>
+                <a:schemeClr val="tx1"/>
+              </a:solidFill>
+            </a:endParaRPr>
+          </a:p>
+        </p:txBody>
+      </p:sp>
+      <p:sp>
+        <p:nvSpPr>
+          <p:cNvPr id="15" name="Rectangle 14"/>
+          <p:cNvSpPr/>
+          <p:nvPr/>
+        </p:nvSpPr>
+        <p:spPr>
+          <a:xfrm>
+            <a:off x="9692079" y="2877425"/>
+            <a:ext cx="2017022" cy="566256"/>
+          </a:xfrm>
+          <a:prstGeom prst="rect">
+            <a:avLst/>
+          </a:prstGeom>
+          <a:noFill/>
+          <a:ln>
+            <a:solidFill>
+              <a:schemeClr val="tx1"/>
+            </a:solidFill>
+          </a:ln>
+        </p:spPr>
+        <p:style>
+          <a:lnRef idx="2">
+            <a:schemeClr val="accent1">
+              <a:shade val="50000"/>
+            </a:schemeClr>
+          </a:lnRef>
+          <a:fillRef idx="1">
+            <a:schemeClr val="accent1"/>
+          </a:fillRef>
+          <a:effectRef idx="0">
+            <a:schemeClr val="accent1"/>
+          </a:effectRef>
+          <a:fontRef idx="minor">
+            <a:schemeClr val="lt1"/>
+          </a:fontRef>
+        </p:style>
+        <p:txBody>
+          <a:bodyPr rtlCol="0" anchor="ctr"/>
+          <a:lstStyle/>
+          <a:p>
+            <a:pPr algn="ctr"/>
+            <a:r>
+              <a:rPr lang="en-CA" dirty="0" smtClean="0">
+                <a:solidFill>
+                  <a:schemeClr val="tx1"/>
+                </a:solidFill>
+              </a:rPr>
+              <a:t>MERAV</a:t>
+            </a:r>
+            <a:endParaRPr lang="en-CA" dirty="0">
+              <a:solidFill>
+                <a:schemeClr val="tx1"/>
+              </a:solidFill>
+            </a:endParaRPr>
+          </a:p>
+        </p:txBody>
+      </p:sp>
+      <p:sp>
+        <p:nvSpPr>
+          <p:cNvPr id="16" name="Rectangle 15"/>
+          <p:cNvSpPr/>
+          <p:nvPr/>
+        </p:nvSpPr>
+        <p:spPr>
+          <a:xfrm>
+            <a:off x="9692079" y="4525865"/>
+            <a:ext cx="2017022" cy="566256"/>
+          </a:xfrm>
+          <a:prstGeom prst="rect">
+            <a:avLst/>
+          </a:prstGeom>
+          <a:noFill/>
+          <a:ln>
+            <a:solidFill>
+              <a:schemeClr val="tx1"/>
+            </a:solidFill>
+          </a:ln>
+        </p:spPr>
+        <p:style>
+          <a:lnRef idx="2">
+            <a:schemeClr val="accent1">
+              <a:shade val="50000"/>
+            </a:schemeClr>
+          </a:lnRef>
+          <a:fillRef idx="1">
+            <a:schemeClr val="accent1"/>
+          </a:fillRef>
+          <a:effectRef idx="0">
+            <a:schemeClr val="accent1"/>
+          </a:effectRef>
+          <a:fontRef idx="minor">
+            <a:schemeClr val="lt1"/>
+          </a:fontRef>
+        </p:style>
+        <p:txBody>
+          <a:bodyPr rtlCol="0" anchor="ctr"/>
+          <a:lstStyle/>
+          <a:p>
+            <a:pPr algn="ctr"/>
+            <a:r>
+              <a:rPr lang="en-CA" dirty="0" smtClean="0">
+                <a:solidFill>
+                  <a:schemeClr val="tx1"/>
+                </a:solidFill>
+              </a:rPr>
+              <a:t>KEGG Mapper</a:t>
+            </a:r>
+            <a:endParaRPr lang="en-CA" dirty="0">
+              <a:solidFill>
+                <a:schemeClr val="tx1"/>
+              </a:solidFill>
+            </a:endParaRPr>
+          </a:p>
+        </p:txBody>
+      </p:sp>
+      <p:sp>
+        <p:nvSpPr>
+          <p:cNvPr id="17" name="Rectangle 16"/>
+          <p:cNvSpPr/>
+          <p:nvPr/>
+        </p:nvSpPr>
+        <p:spPr>
+          <a:xfrm>
+            <a:off x="7375320" y="2877425"/>
+            <a:ext cx="2017022" cy="566256"/>
+          </a:xfrm>
+          <a:prstGeom prst="rect">
+            <a:avLst/>
+          </a:prstGeom>
+          <a:noFill/>
+          <a:ln>
+            <a:solidFill>
+              <a:schemeClr val="tx1"/>
+            </a:solidFill>
+          </a:ln>
+        </p:spPr>
+        <p:style>
+          <a:lnRef idx="2">
+            <a:schemeClr val="accent1">
+              <a:shade val="50000"/>
+            </a:schemeClr>
+          </a:lnRef>
+          <a:fillRef idx="1">
+            <a:schemeClr val="accent1"/>
+          </a:fillRef>
+          <a:effectRef idx="0">
+            <a:schemeClr val="accent1"/>
+          </a:effectRef>
+          <a:fontRef idx="minor">
+            <a:schemeClr val="lt1"/>
+          </a:fontRef>
+        </p:style>
+        <p:txBody>
+          <a:bodyPr rtlCol="0" anchor="ctr"/>
+          <a:lstStyle/>
+          <a:p>
+            <a:pPr algn="ctr"/>
+            <a:r>
+              <a:rPr lang="en-CA" dirty="0" smtClean="0">
+                <a:solidFill>
+                  <a:schemeClr val="tx1"/>
+                </a:solidFill>
+              </a:rPr>
+              <a:t>Custom significant gene list</a:t>
+            </a:r>
+            <a:endParaRPr lang="en-CA" dirty="0">
+              <a:solidFill>
+                <a:schemeClr val="tx1"/>
+              </a:solidFill>
+            </a:endParaRPr>
+          </a:p>
+        </p:txBody>
+      </p:sp>
+      <p:sp>
+        <p:nvSpPr>
+          <p:cNvPr id="18" name="Rectangle 17"/>
+          <p:cNvSpPr/>
+          <p:nvPr/>
+        </p:nvSpPr>
+        <p:spPr>
+          <a:xfrm>
+            <a:off x="7375320" y="3701645"/>
+            <a:ext cx="2017022" cy="566256"/>
+          </a:xfrm>
+          <a:prstGeom prst="rect">
+            <a:avLst/>
+          </a:prstGeom>
+          <a:noFill/>
+          <a:ln>
+            <a:solidFill>
+              <a:schemeClr val="tx1"/>
+            </a:solidFill>
+          </a:ln>
+        </p:spPr>
+        <p:style>
+          <a:lnRef idx="2">
+            <a:schemeClr val="accent1">
+              <a:shade val="50000"/>
+            </a:schemeClr>
+          </a:lnRef>
+          <a:fillRef idx="1">
+            <a:schemeClr val="accent1"/>
+          </a:fillRef>
+          <a:effectRef idx="0">
+            <a:schemeClr val="accent1"/>
+          </a:effectRef>
+          <a:fontRef idx="minor">
+            <a:schemeClr val="lt1"/>
+          </a:fontRef>
+        </p:style>
+        <p:txBody>
+          <a:bodyPr rtlCol="0" anchor="ctr"/>
+          <a:lstStyle/>
+          <a:p>
+            <a:pPr algn="ctr"/>
+            <a:r>
+              <a:rPr lang="en-CA" dirty="0" smtClean="0">
+                <a:solidFill>
+                  <a:schemeClr val="tx1"/>
+                </a:solidFill>
+              </a:rPr>
+              <a:t>Non-canonic results</a:t>
+            </a:r>
+            <a:endParaRPr lang="en-CA" dirty="0">
+              <a:solidFill>
+                <a:schemeClr val="tx1"/>
+              </a:solidFill>
+            </a:endParaRPr>
+          </a:p>
+        </p:txBody>
+      </p:sp>
+      <p:sp>
+        <p:nvSpPr>
+          <p:cNvPr id="19" name="Rectangle 18"/>
+          <p:cNvSpPr/>
+          <p:nvPr/>
+        </p:nvSpPr>
+        <p:spPr>
+          <a:xfrm>
+            <a:off x="7375320" y="4525865"/>
+            <a:ext cx="2017022" cy="566256"/>
+          </a:xfrm>
+          <a:prstGeom prst="rect">
+            <a:avLst/>
+          </a:prstGeom>
+          <a:noFill/>
+          <a:ln>
+            <a:solidFill>
+              <a:schemeClr val="tx1"/>
+            </a:solidFill>
+          </a:ln>
+        </p:spPr>
+        <p:style>
+          <a:lnRef idx="2">
+            <a:schemeClr val="accent1">
+              <a:shade val="50000"/>
+            </a:schemeClr>
+          </a:lnRef>
+          <a:fillRef idx="1">
+            <a:schemeClr val="accent1"/>
+          </a:fillRef>
+          <a:effectRef idx="0">
+            <a:schemeClr val="accent1"/>
+          </a:effectRef>
+          <a:fontRef idx="minor">
+            <a:schemeClr val="lt1"/>
+          </a:fontRef>
+        </p:style>
+        <p:txBody>
+          <a:bodyPr rtlCol="0" anchor="ctr"/>
+          <a:lstStyle/>
+          <a:p>
+            <a:pPr algn="ctr"/>
+            <a:r>
+              <a:rPr lang="en-CA" dirty="0" err="1" smtClean="0">
+                <a:solidFill>
+                  <a:schemeClr val="tx1"/>
+                </a:solidFill>
+              </a:rPr>
+              <a:t>hsa</a:t>
+            </a:r>
+            <a:r>
+              <a:rPr lang="en-CA" dirty="0" smtClean="0">
+                <a:solidFill>
+                  <a:schemeClr val="tx1"/>
+                </a:solidFill>
+              </a:rPr>
+              <a:t> conversions</a:t>
+            </a:r>
+            <a:endParaRPr lang="en-CA" dirty="0">
+              <a:solidFill>
+                <a:schemeClr val="tx1"/>
+              </a:solidFill>
+            </a:endParaRPr>
           </a:p>
         </p:txBody>
       </p:sp>

</xml_diff>

<commit_message>
done, will require some tweaking as a group
</commit_message>
<xml_diff>
--- a/Slides/Soutenance_Final.pptx
+++ b/Slides/Soutenance_Final.pptx
@@ -4149,21 +4149,21 @@
     </dgm:pt>
   </dgm:ptLst>
   <dgm:cxnLst>
+    <dgm:cxn modelId="{CE2AF7AB-2949-4DCD-9C29-6B60E91D8468}" srcId="{0916D3E2-7950-4B1E-A80A-B1A0DFE4D7BE}" destId="{B8F4B4B5-48BB-4436-A4C8-0772D59377AC}" srcOrd="2" destOrd="0" parTransId="{EEB7DF95-B1E1-4355-BDED-67254F3A40BF}" sibTransId="{07F8EC93-687D-4C25-BBFA-77894EDF7DA2}"/>
+    <dgm:cxn modelId="{D7CE5B38-4681-488A-875C-5BC6D4608B17}" type="presOf" srcId="{B8F4B4B5-48BB-4436-A4C8-0772D59377AC}" destId="{B8775ABA-3037-409F-B1F5-5479D38AC897}" srcOrd="0" destOrd="0" presId="urn:microsoft.com/office/officeart/2005/8/layout/radial1"/>
+    <dgm:cxn modelId="{08978BA1-AE5A-4DFF-A0C3-92D4A0078A98}" srcId="{0916D3E2-7950-4B1E-A80A-B1A0DFE4D7BE}" destId="{9B35DA45-8824-4EE3-89F0-3F4E07F980E3}" srcOrd="0" destOrd="0" parTransId="{F26E0BCB-616E-4F5C-9212-B89461307743}" sibTransId="{6FFF208B-A136-4388-9736-DE2BA4AFD5AF}"/>
+    <dgm:cxn modelId="{8C318C29-2BA6-4073-9DC3-993B41DBBD97}" type="presOf" srcId="{F26E0BCB-616E-4F5C-9212-B89461307743}" destId="{B26CA117-7877-4BBB-8697-7BAA6B4D1769}" srcOrd="1" destOrd="0" presId="urn:microsoft.com/office/officeart/2005/8/layout/radial1"/>
     <dgm:cxn modelId="{BFE5F03E-99EE-488D-A25F-FA4A305398F3}" type="presOf" srcId="{EEB7DF95-B1E1-4355-BDED-67254F3A40BF}" destId="{156A4B50-5EBB-4BD2-8AF0-C722439DBC8D}" srcOrd="0" destOrd="0" presId="urn:microsoft.com/office/officeart/2005/8/layout/radial1"/>
-    <dgm:cxn modelId="{CE2AF7AB-2949-4DCD-9C29-6B60E91D8468}" srcId="{0916D3E2-7950-4B1E-A80A-B1A0DFE4D7BE}" destId="{B8F4B4B5-48BB-4436-A4C8-0772D59377AC}" srcOrd="2" destOrd="0" parTransId="{EEB7DF95-B1E1-4355-BDED-67254F3A40BF}" sibTransId="{07F8EC93-687D-4C25-BBFA-77894EDF7DA2}"/>
+    <dgm:cxn modelId="{4F76CFC7-AC86-4FD6-BD3B-3B31C6A8EDDA}" type="presOf" srcId="{F26E0BCB-616E-4F5C-9212-B89461307743}" destId="{FB6E935B-AB56-4686-BAF4-89171D311D48}" srcOrd="0" destOrd="0" presId="urn:microsoft.com/office/officeart/2005/8/layout/radial1"/>
+    <dgm:cxn modelId="{7470EB8E-365B-4C7B-B345-F3A82F2BDE86}" type="presOf" srcId="{EEB7DF95-B1E1-4355-BDED-67254F3A40BF}" destId="{0FA48441-B5ED-464B-AB5B-44DAB679EE64}" srcOrd="1" destOrd="0" presId="urn:microsoft.com/office/officeart/2005/8/layout/radial1"/>
+    <dgm:cxn modelId="{2E6F4476-BF79-4C90-823B-71099E5FD8D3}" type="presOf" srcId="{DD81B84C-4525-4615-9233-87E402AFBABC}" destId="{9CD455AE-EC69-44E0-B929-B59BCD7E9894}" srcOrd="1" destOrd="0" presId="urn:microsoft.com/office/officeart/2005/8/layout/radial1"/>
     <dgm:cxn modelId="{2D7DE33D-C3DB-49E5-ADF6-52C214CF1C59}" srcId="{0916D3E2-7950-4B1E-A80A-B1A0DFE4D7BE}" destId="{7F397B27-ED42-4C0B-84EB-F42483A443DB}" srcOrd="1" destOrd="0" parTransId="{DD81B84C-4525-4615-9233-87E402AFBABC}" sibTransId="{97EBF3C2-DAC2-40A4-AE80-264E3F21FCCC}"/>
-    <dgm:cxn modelId="{7470EB8E-365B-4C7B-B345-F3A82F2BDE86}" type="presOf" srcId="{EEB7DF95-B1E1-4355-BDED-67254F3A40BF}" destId="{0FA48441-B5ED-464B-AB5B-44DAB679EE64}" srcOrd="1" destOrd="0" presId="urn:microsoft.com/office/officeart/2005/8/layout/radial1"/>
-    <dgm:cxn modelId="{D7CE5B38-4681-488A-875C-5BC6D4608B17}" type="presOf" srcId="{B8F4B4B5-48BB-4436-A4C8-0772D59377AC}" destId="{B8775ABA-3037-409F-B1F5-5479D38AC897}" srcOrd="0" destOrd="0" presId="urn:microsoft.com/office/officeart/2005/8/layout/radial1"/>
     <dgm:cxn modelId="{A9B36F8A-C74B-47A9-B539-806F6BB77A1A}" srcId="{CC293B1C-4CF8-4FF0-BBC7-4942ED2D7F88}" destId="{0916D3E2-7950-4B1E-A80A-B1A0DFE4D7BE}" srcOrd="0" destOrd="0" parTransId="{78ED7DF1-7D14-4D64-A8E3-CBD6C30B03FB}" sibTransId="{402F8436-663D-4DB8-A22F-0A8F501EB425}"/>
-    <dgm:cxn modelId="{4F76CFC7-AC86-4FD6-BD3B-3B31C6A8EDDA}" type="presOf" srcId="{F26E0BCB-616E-4F5C-9212-B89461307743}" destId="{FB6E935B-AB56-4686-BAF4-89171D311D48}" srcOrd="0" destOrd="0" presId="urn:microsoft.com/office/officeart/2005/8/layout/radial1"/>
+    <dgm:cxn modelId="{4E83842D-6898-45A2-8C76-AC263926CE66}" type="presOf" srcId="{CC293B1C-4CF8-4FF0-BBC7-4942ED2D7F88}" destId="{05AAFE4B-4748-4F9C-AA5B-DEC71FC73E20}" srcOrd="0" destOrd="0" presId="urn:microsoft.com/office/officeart/2005/8/layout/radial1"/>
     <dgm:cxn modelId="{53089D63-12EB-40F9-92A2-F39B07E20E6B}" type="presOf" srcId="{0916D3E2-7950-4B1E-A80A-B1A0DFE4D7BE}" destId="{334F0DA9-4D69-40E7-AE37-8BB2E71C3ACD}" srcOrd="0" destOrd="0" presId="urn:microsoft.com/office/officeart/2005/8/layout/radial1"/>
-    <dgm:cxn modelId="{2E6F4476-BF79-4C90-823B-71099E5FD8D3}" type="presOf" srcId="{DD81B84C-4525-4615-9233-87E402AFBABC}" destId="{9CD455AE-EC69-44E0-B929-B59BCD7E9894}" srcOrd="1" destOrd="0" presId="urn:microsoft.com/office/officeart/2005/8/layout/radial1"/>
+    <dgm:cxn modelId="{EE79DC2E-EE32-4B0A-ADFD-E11D61A99647}" type="presOf" srcId="{DD81B84C-4525-4615-9233-87E402AFBABC}" destId="{3134C74D-D45F-4D44-8DA9-5DD9ACC7028A}" srcOrd="0" destOrd="0" presId="urn:microsoft.com/office/officeart/2005/8/layout/radial1"/>
+    <dgm:cxn modelId="{1173F0C1-237A-44C5-81A9-6289AFEB7E80}" type="presOf" srcId="{7F397B27-ED42-4C0B-84EB-F42483A443DB}" destId="{FC75532D-1A75-4D81-A458-80C91B398F9D}" srcOrd="0" destOrd="0" presId="urn:microsoft.com/office/officeart/2005/8/layout/radial1"/>
     <dgm:cxn modelId="{6037BACF-1495-4D63-973A-E9906686C9EC}" type="presOf" srcId="{9B35DA45-8824-4EE3-89F0-3F4E07F980E3}" destId="{51D4E2D9-6364-4FE7-BE7F-89898165258A}" srcOrd="0" destOrd="0" presId="urn:microsoft.com/office/officeart/2005/8/layout/radial1"/>
-    <dgm:cxn modelId="{4E83842D-6898-45A2-8C76-AC263926CE66}" type="presOf" srcId="{CC293B1C-4CF8-4FF0-BBC7-4942ED2D7F88}" destId="{05AAFE4B-4748-4F9C-AA5B-DEC71FC73E20}" srcOrd="0" destOrd="0" presId="urn:microsoft.com/office/officeart/2005/8/layout/radial1"/>
-    <dgm:cxn modelId="{EE79DC2E-EE32-4B0A-ADFD-E11D61A99647}" type="presOf" srcId="{DD81B84C-4525-4615-9233-87E402AFBABC}" destId="{3134C74D-D45F-4D44-8DA9-5DD9ACC7028A}" srcOrd="0" destOrd="0" presId="urn:microsoft.com/office/officeart/2005/8/layout/radial1"/>
-    <dgm:cxn modelId="{08978BA1-AE5A-4DFF-A0C3-92D4A0078A98}" srcId="{0916D3E2-7950-4B1E-A80A-B1A0DFE4D7BE}" destId="{9B35DA45-8824-4EE3-89F0-3F4E07F980E3}" srcOrd="0" destOrd="0" parTransId="{F26E0BCB-616E-4F5C-9212-B89461307743}" sibTransId="{6FFF208B-A136-4388-9736-DE2BA4AFD5AF}"/>
-    <dgm:cxn modelId="{1173F0C1-237A-44C5-81A9-6289AFEB7E80}" type="presOf" srcId="{7F397B27-ED42-4C0B-84EB-F42483A443DB}" destId="{FC75532D-1A75-4D81-A458-80C91B398F9D}" srcOrd="0" destOrd="0" presId="urn:microsoft.com/office/officeart/2005/8/layout/radial1"/>
-    <dgm:cxn modelId="{8C318C29-2BA6-4073-9DC3-993B41DBBD97}" type="presOf" srcId="{F26E0BCB-616E-4F5C-9212-B89461307743}" destId="{B26CA117-7877-4BBB-8697-7BAA6B4D1769}" srcOrd="1" destOrd="0" presId="urn:microsoft.com/office/officeart/2005/8/layout/radial1"/>
     <dgm:cxn modelId="{772C3BB5-DF35-42DE-A439-0DCB31D63FB8}" type="presParOf" srcId="{05AAFE4B-4748-4F9C-AA5B-DEC71FC73E20}" destId="{334F0DA9-4D69-40E7-AE37-8BB2E71C3ACD}" srcOrd="0" destOrd="0" presId="urn:microsoft.com/office/officeart/2005/8/layout/radial1"/>
     <dgm:cxn modelId="{20FC6565-C496-4E94-8CCE-904149940058}" type="presParOf" srcId="{05AAFE4B-4748-4F9C-AA5B-DEC71FC73E20}" destId="{FB6E935B-AB56-4686-BAF4-89171D311D48}" srcOrd="1" destOrd="0" presId="urn:microsoft.com/office/officeart/2005/8/layout/radial1"/>
     <dgm:cxn modelId="{1BDA0C39-DB3E-4726-AC03-ECA79335B44E}" type="presParOf" srcId="{FB6E935B-AB56-4686-BAF4-89171D311D48}" destId="{B26CA117-7877-4BBB-8697-7BAA6B4D1769}" srcOrd="0" destOrd="0" presId="urn:microsoft.com/office/officeart/2005/8/layout/radial1"/>
@@ -4575,22 +4575,22 @@
     </dgm:pt>
   </dgm:ptLst>
   <dgm:cxnLst>
+    <dgm:cxn modelId="{C645A4BB-EDB6-4E76-AB82-9AD72E6BF557}" type="presOf" srcId="{BA786E09-868C-446C-BCAD-1B9A337A2314}" destId="{31F77346-6636-44FE-8237-42E5F75F0855}" srcOrd="1" destOrd="0" presId="urn:microsoft.com/office/officeart/2005/8/layout/hList7"/>
+    <dgm:cxn modelId="{57921F95-0423-45E7-AE0D-672371E39D53}" type="presOf" srcId="{5EE301F9-AA62-4FDD-BBD4-EB5F68D85FEC}" destId="{6B2B5E85-AAEA-413B-89EF-96FC0B61D0DB}" srcOrd="1" destOrd="0" presId="urn:microsoft.com/office/officeart/2005/8/layout/hList7"/>
+    <dgm:cxn modelId="{F6F9661A-BC21-475D-819D-50626DE6BCFB}" type="presOf" srcId="{2F25E3F7-E9EB-4C08-9116-69D5C4FD6E2A}" destId="{2845AC54-25A9-480C-BA9C-51BB56258253}" srcOrd="0" destOrd="0" presId="urn:microsoft.com/office/officeart/2005/8/layout/hList7"/>
+    <dgm:cxn modelId="{CF0035A1-5E18-4F9A-AAAD-C4F8302A689F}" type="presOf" srcId="{81607F9D-ACA8-4EBC-97F3-AE620D537126}" destId="{FCBD48AD-6356-4016-B622-1476036943D2}" srcOrd="1" destOrd="0" presId="urn:microsoft.com/office/officeart/2005/8/layout/hList7"/>
     <dgm:cxn modelId="{AFAAAFAD-A0DE-47C1-9249-77B5BDE05E36}" type="presOf" srcId="{81607F9D-ACA8-4EBC-97F3-AE620D537126}" destId="{AECDF339-533B-4319-9DD1-FE0312AA5FE7}" srcOrd="0" destOrd="0" presId="urn:microsoft.com/office/officeart/2005/8/layout/hList7"/>
-    <dgm:cxn modelId="{38CD83C8-6796-4198-B7C8-EFF34EC9AA55}" type="presOf" srcId="{BA786E09-868C-446C-BCAD-1B9A337A2314}" destId="{9B6DBF9B-EFA6-45E8-AAE9-1FBCC2922B5E}" srcOrd="0" destOrd="0" presId="urn:microsoft.com/office/officeart/2005/8/layout/hList7"/>
-    <dgm:cxn modelId="{2E016A71-4A74-45F5-AD15-07D3B1D0466D}" srcId="{95C89F30-E4C0-41F0-9F78-CFBA2BC6B6E7}" destId="{47253CFC-4569-4709-81D3-DEEB42841B34}" srcOrd="2" destOrd="0" parTransId="{790D9CA9-D5EB-4ABB-B3FF-C076CA534420}" sibTransId="{2F25E3F7-E9EB-4C08-9116-69D5C4FD6E2A}"/>
-    <dgm:cxn modelId="{F6F9661A-BC21-475D-819D-50626DE6BCFB}" type="presOf" srcId="{2F25E3F7-E9EB-4C08-9116-69D5C4FD6E2A}" destId="{2845AC54-25A9-480C-BA9C-51BB56258253}" srcOrd="0" destOrd="0" presId="urn:microsoft.com/office/officeart/2005/8/layout/hList7"/>
-    <dgm:cxn modelId="{C645A4BB-EDB6-4E76-AB82-9AD72E6BF557}" type="presOf" srcId="{BA786E09-868C-446C-BCAD-1B9A337A2314}" destId="{31F77346-6636-44FE-8237-42E5F75F0855}" srcOrd="1" destOrd="0" presId="urn:microsoft.com/office/officeart/2005/8/layout/hList7"/>
-    <dgm:cxn modelId="{194860A3-1900-4650-B671-CEC4587BA924}" type="presOf" srcId="{94CA40FB-60B0-465C-89DE-37B57251E362}" destId="{6A4D6A8E-A18C-499A-84BC-74FED5388C93}" srcOrd="0" destOrd="0" presId="urn:microsoft.com/office/officeart/2005/8/layout/hList7"/>
-    <dgm:cxn modelId="{57921F95-0423-45E7-AE0D-672371E39D53}" type="presOf" srcId="{5EE301F9-AA62-4FDD-BBD4-EB5F68D85FEC}" destId="{6B2B5E85-AAEA-413B-89EF-96FC0B61D0DB}" srcOrd="1" destOrd="0" presId="urn:microsoft.com/office/officeart/2005/8/layout/hList7"/>
-    <dgm:cxn modelId="{4E004507-C92D-4D0B-9DBB-DB4591A9B903}" srcId="{95C89F30-E4C0-41F0-9F78-CFBA2BC6B6E7}" destId="{BA786E09-868C-446C-BCAD-1B9A337A2314}" srcOrd="3" destOrd="0" parTransId="{59BE49D1-A09D-46A0-A218-5983A849445B}" sibTransId="{870FB8E6-A3E1-4439-9131-142A0512FE32}"/>
-    <dgm:cxn modelId="{1AE06204-B328-4A88-90DE-47487907D919}" type="presOf" srcId="{47253CFC-4569-4709-81D3-DEEB42841B34}" destId="{65C1CC62-47DD-4AE0-BB4E-E1AA4210EAD1}" srcOrd="1" destOrd="0" presId="urn:microsoft.com/office/officeart/2005/8/layout/hList7"/>
-    <dgm:cxn modelId="{F309A241-CAAA-4CAA-89A7-3EF413DFED5F}" type="presOf" srcId="{47253CFC-4569-4709-81D3-DEEB42841B34}" destId="{18E220CA-4E07-4273-9F20-D66E44D1CC15}" srcOrd="0" destOrd="0" presId="urn:microsoft.com/office/officeart/2005/8/layout/hList7"/>
+    <dgm:cxn modelId="{BDD1CA52-8007-48A8-B091-1E74889DEE99}" type="presOf" srcId="{95C89F30-E4C0-41F0-9F78-CFBA2BC6B6E7}" destId="{68497B09-3716-4EBD-AC6B-8AE2BDCC8972}" srcOrd="0" destOrd="0" presId="urn:microsoft.com/office/officeart/2005/8/layout/hList7"/>
     <dgm:cxn modelId="{E53B2165-E749-413E-9F1A-C9CC76DA6A5C}" srcId="{95C89F30-E4C0-41F0-9F78-CFBA2BC6B6E7}" destId="{5EE301F9-AA62-4FDD-BBD4-EB5F68D85FEC}" srcOrd="0" destOrd="0" parTransId="{752A3FC9-4F42-4B45-864D-D48201C144BC}" sibTransId="{7A2D0BBB-4796-4683-A258-869CCE2EFDEE}"/>
-    <dgm:cxn modelId="{CF0035A1-5E18-4F9A-AAAD-C4F8302A689F}" type="presOf" srcId="{81607F9D-ACA8-4EBC-97F3-AE620D537126}" destId="{FCBD48AD-6356-4016-B622-1476036943D2}" srcOrd="1" destOrd="0" presId="urn:microsoft.com/office/officeart/2005/8/layout/hList7"/>
-    <dgm:cxn modelId="{BDD1CA52-8007-48A8-B091-1E74889DEE99}" type="presOf" srcId="{95C89F30-E4C0-41F0-9F78-CFBA2BC6B6E7}" destId="{68497B09-3716-4EBD-AC6B-8AE2BDCC8972}" srcOrd="0" destOrd="0" presId="urn:microsoft.com/office/officeart/2005/8/layout/hList7"/>
     <dgm:cxn modelId="{B6D21F72-7318-4B23-BC86-23B4E85AD610}" type="presOf" srcId="{5EE301F9-AA62-4FDD-BBD4-EB5F68D85FEC}" destId="{90FFEDE6-D24B-46AA-AC61-5A2CA3E513CC}" srcOrd="0" destOrd="0" presId="urn:microsoft.com/office/officeart/2005/8/layout/hList7"/>
     <dgm:cxn modelId="{C503CDFC-F7CF-4B5B-9CB9-D0B888450B80}" srcId="{95C89F30-E4C0-41F0-9F78-CFBA2BC6B6E7}" destId="{81607F9D-ACA8-4EBC-97F3-AE620D537126}" srcOrd="1" destOrd="0" parTransId="{5614C387-4578-47E1-B8ED-4C19C139B6D6}" sibTransId="{94CA40FB-60B0-465C-89DE-37B57251E362}"/>
+    <dgm:cxn modelId="{2E016A71-4A74-45F5-AD15-07D3B1D0466D}" srcId="{95C89F30-E4C0-41F0-9F78-CFBA2BC6B6E7}" destId="{47253CFC-4569-4709-81D3-DEEB42841B34}" srcOrd="2" destOrd="0" parTransId="{790D9CA9-D5EB-4ABB-B3FF-C076CA534420}" sibTransId="{2F25E3F7-E9EB-4C08-9116-69D5C4FD6E2A}"/>
+    <dgm:cxn modelId="{1AE06204-B328-4A88-90DE-47487907D919}" type="presOf" srcId="{47253CFC-4569-4709-81D3-DEEB42841B34}" destId="{65C1CC62-47DD-4AE0-BB4E-E1AA4210EAD1}" srcOrd="1" destOrd="0" presId="urn:microsoft.com/office/officeart/2005/8/layout/hList7"/>
     <dgm:cxn modelId="{2EC55B3D-BFE3-4C06-B5CF-4DA8F00E7DD6}" type="presOf" srcId="{7A2D0BBB-4796-4683-A258-869CCE2EFDEE}" destId="{46B8E31D-92A9-4F7C-AC64-291B22E56C19}" srcOrd="0" destOrd="0" presId="urn:microsoft.com/office/officeart/2005/8/layout/hList7"/>
+    <dgm:cxn modelId="{194860A3-1900-4650-B671-CEC4587BA924}" type="presOf" srcId="{94CA40FB-60B0-465C-89DE-37B57251E362}" destId="{6A4D6A8E-A18C-499A-84BC-74FED5388C93}" srcOrd="0" destOrd="0" presId="urn:microsoft.com/office/officeart/2005/8/layout/hList7"/>
+    <dgm:cxn modelId="{F309A241-CAAA-4CAA-89A7-3EF413DFED5F}" type="presOf" srcId="{47253CFC-4569-4709-81D3-DEEB42841B34}" destId="{18E220CA-4E07-4273-9F20-D66E44D1CC15}" srcOrd="0" destOrd="0" presId="urn:microsoft.com/office/officeart/2005/8/layout/hList7"/>
+    <dgm:cxn modelId="{4E004507-C92D-4D0B-9DBB-DB4591A9B903}" srcId="{95C89F30-E4C0-41F0-9F78-CFBA2BC6B6E7}" destId="{BA786E09-868C-446C-BCAD-1B9A337A2314}" srcOrd="3" destOrd="0" parTransId="{59BE49D1-A09D-46A0-A218-5983A849445B}" sibTransId="{870FB8E6-A3E1-4439-9131-142A0512FE32}"/>
+    <dgm:cxn modelId="{38CD83C8-6796-4198-B7C8-EFF34EC9AA55}" type="presOf" srcId="{BA786E09-868C-446C-BCAD-1B9A337A2314}" destId="{9B6DBF9B-EFA6-45E8-AAE9-1FBCC2922B5E}" srcOrd="0" destOrd="0" presId="urn:microsoft.com/office/officeart/2005/8/layout/hList7"/>
     <dgm:cxn modelId="{4D0448AB-072A-4D18-810D-2383F44A3112}" type="presParOf" srcId="{68497B09-3716-4EBD-AC6B-8AE2BDCC8972}" destId="{5C007895-D27B-4555-8633-C9BBD58A106D}" srcOrd="0" destOrd="0" presId="urn:microsoft.com/office/officeart/2005/8/layout/hList7"/>
     <dgm:cxn modelId="{EB40CABA-D7D8-449B-A3EF-706C96A2B35D}" type="presParOf" srcId="{68497B09-3716-4EBD-AC6B-8AE2BDCC8972}" destId="{851E5CC9-679F-4CF6-B00F-A025B4DEF2B3}" srcOrd="1" destOrd="0" presId="urn:microsoft.com/office/officeart/2005/8/layout/hList7"/>
     <dgm:cxn modelId="{E6D0BBE2-1389-41E3-A561-EB44452418BA}" type="presParOf" srcId="{851E5CC9-679F-4CF6-B00F-A025B4DEF2B3}" destId="{02F5FF00-4C9F-4B29-8EE7-22E5EFD6E9BE}" srcOrd="0" destOrd="0" presId="urn:microsoft.com/office/officeart/2005/8/layout/hList7"/>
@@ -13222,11 +13222,7 @@
           <a:p>
             <a:r>
               <a:rPr lang="fr-FR" dirty="0" smtClean="0"/>
-              <a:t>App – </a:t>
-            </a:r>
-            <a:r>
-              <a:rPr lang="fr-FR" dirty="0" smtClean="0"/>
-              <a:t>User </a:t>
+              <a:t>App – User </a:t>
             </a:r>
             <a:r>
               <a:rPr lang="fr-FR" dirty="0" err="1" smtClean="0"/>
@@ -13490,7 +13486,6 @@
               <a:rPr lang="fr-FR" sz="2000" dirty="0" smtClean="0"/>
               <a:t> for the client</a:t>
             </a:r>
-            <a:endParaRPr lang="fr-FR" sz="2000" dirty="0" smtClean="0"/>
           </a:p>
           <a:p>
             <a:pPr marL="0" indent="0" algn="just">
@@ -18592,13 +18587,8 @@
             </a:r>
             <a:r>
               <a:rPr lang="fr-FR" sz="2000" dirty="0" smtClean="0"/>
-              <a:t> KEGG </a:t>
+              <a:t> KEGG Mapper</a:t>
             </a:r>
-            <a:r>
-              <a:rPr lang="fr-FR" sz="2000" dirty="0" smtClean="0"/>
-              <a:t>Mapper</a:t>
-            </a:r>
-            <a:endParaRPr lang="fr-FR" sz="2000" dirty="0" smtClean="0"/>
           </a:p>
           <a:p>
             <a:pPr algn="just"/>
@@ -20102,11 +20092,7 @@
           <a:p>
             <a:r>
               <a:rPr lang="fr-FR" dirty="0" smtClean="0"/>
-              <a:t>App – Custom </a:t>
-            </a:r>
-            <a:r>
-              <a:rPr lang="fr-FR" dirty="0" smtClean="0"/>
-              <a:t>fig.</a:t>
+              <a:t>App – Custom fig.</a:t>
             </a:r>
             <a:endParaRPr lang="fr-FR" dirty="0"/>
           </a:p>
@@ -31160,9 +31146,9 @@
       </p:sp>
       <p:pic>
         <p:nvPicPr>
-          <p:cNvPr id="5" name="Picture 4"/>
+          <p:cNvPr id="6" name="Picture 2" descr="Résultat de recherche d'images pour &quot;project&quot;&quot;"/>
           <p:cNvPicPr>
-            <a:picLocks noChangeAspect="1"/>
+            <a:picLocks noChangeAspect="1" noChangeArrowheads="1"/>
           </p:cNvPicPr>
           <p:nvPr/>
         </p:nvPicPr>
@@ -31174,18 +31160,29 @@
               </a:ext>
             </a:extLst>
           </a:blip>
+          <a:srcRect/>
           <a:stretch>
             <a:fillRect/>
           </a:stretch>
         </p:blipFill>
-        <p:spPr>
+        <p:spPr bwMode="auto">
           <a:xfrm>
-            <a:off x="6494350" y="2390862"/>
-            <a:ext cx="3938212" cy="3842158"/>
+            <a:off x="7285500" y="2835479"/>
+            <a:ext cx="2940047" cy="3449031"/>
           </a:xfrm>
           <a:prstGeom prst="rect">
             <a:avLst/>
           </a:prstGeom>
+          <a:noFill/>
+          <a:extLst>
+            <a:ext uri="{909E8E84-426E-40DD-AFC4-6F175D3DCCD1}">
+              <a14:hiddenFill xmlns:a14="http://schemas.microsoft.com/office/drawing/2010/main">
+                <a:solidFill>
+                  <a:srgbClr val="FFFFFF"/>
+                </a:solidFill>
+              </a14:hiddenFill>
+            </a:ext>
+          </a:extLst>
         </p:spPr>
       </p:pic>
     </p:spTree>
@@ -39879,13 +39876,13 @@
           <p:nvPr>
             <p:extLst>
               <p:ext uri="{D42A27DB-BD31-4B8C-83A1-F6EECF244321}">
-                <p14:modId xmlns:p14="http://schemas.microsoft.com/office/powerpoint/2010/main" val="1044012481"/>
+                <p14:modId xmlns:p14="http://schemas.microsoft.com/office/powerpoint/2010/main" val="824564919"/>
               </p:ext>
             </p:extLst>
           </p:nvPr>
         </p:nvGraphicFramePr>
         <p:xfrm>
-          <a:off x="2265149" y="1829006"/>
+          <a:off x="3690827" y="1829006"/>
           <a:ext cx="8363522" cy="4863689"/>
         </p:xfrm>
         <a:graphic>
@@ -39916,7 +39913,7 @@
         </p:blipFill>
         <p:spPr>
           <a:xfrm>
-            <a:off x="4974212" y="3868863"/>
+            <a:off x="6399890" y="3868863"/>
             <a:ext cx="818055" cy="948943"/>
           </a:xfrm>
           <a:prstGeom prst="rect">
@@ -39946,7 +39943,7 @@
         </p:blipFill>
         <p:spPr>
           <a:xfrm>
-            <a:off x="4961408" y="4956862"/>
+            <a:off x="6387086" y="4956862"/>
             <a:ext cx="843661" cy="977214"/>
           </a:xfrm>
           <a:prstGeom prst="rect">
@@ -39976,7 +39973,7 @@
         </p:blipFill>
         <p:spPr>
           <a:xfrm>
-            <a:off x="2779030" y="3868863"/>
+            <a:off x="4204708" y="3868863"/>
             <a:ext cx="970817" cy="970817"/>
           </a:xfrm>
           <a:prstGeom prst="rect">
@@ -40006,7 +40003,7 @@
         </p:blipFill>
         <p:spPr>
           <a:xfrm>
-            <a:off x="2597688" y="4956862"/>
+            <a:off x="4023366" y="4956862"/>
             <a:ext cx="1333500" cy="1333500"/>
           </a:xfrm>
           <a:prstGeom prst="rect">
@@ -40036,7 +40033,7 @@
         </p:blipFill>
         <p:spPr>
           <a:xfrm>
-            <a:off x="9122502" y="3881525"/>
+            <a:off x="10548180" y="3881525"/>
             <a:ext cx="916402" cy="923618"/>
           </a:xfrm>
           <a:prstGeom prst="rect">
@@ -40066,7 +40063,7 @@
         </p:blipFill>
         <p:spPr>
           <a:xfrm>
-            <a:off x="8986608" y="4894048"/>
+            <a:off x="10412286" y="4894048"/>
             <a:ext cx="1195326" cy="1195326"/>
           </a:xfrm>
           <a:prstGeom prst="rect">
@@ -40096,7 +40093,7 @@
         </p:blipFill>
         <p:spPr>
           <a:xfrm>
-            <a:off x="6756519" y="3968875"/>
+            <a:off x="8182197" y="3968875"/>
             <a:ext cx="1490778" cy="1469899"/>
           </a:xfrm>
           <a:prstGeom prst="rect">
@@ -40104,6 +40101,260 @@
           </a:prstGeom>
         </p:spPr>
       </p:pic>
+      <p:sp>
+        <p:nvSpPr>
+          <p:cNvPr id="13" name="Content Placeholder 2"/>
+          <p:cNvSpPr txBox="1">
+            <a:spLocks/>
+          </p:cNvSpPr>
+          <p:nvPr/>
+        </p:nvSpPr>
+        <p:spPr>
+          <a:xfrm>
+            <a:off x="1236683" y="2835479"/>
+            <a:ext cx="2454143" cy="3842158"/>
+          </a:xfrm>
+          <a:prstGeom prst="rect">
+            <a:avLst/>
+          </a:prstGeom>
+        </p:spPr>
+        <p:txBody>
+          <a:bodyPr>
+            <a:normAutofit/>
+          </a:bodyPr>
+          <a:lstStyle>
+            <a:lvl1pPr marL="228600" indent="-228600" algn="l" defTabSz="914400" rtl="0" eaLnBrk="1" latinLnBrk="0" hangingPunct="1">
+              <a:lnSpc>
+                <a:spcPct val="90000"/>
+              </a:lnSpc>
+              <a:spcBef>
+                <a:spcPts val="1000"/>
+              </a:spcBef>
+              <a:buFont typeface="Arial" panose="020B0604020202020204" pitchFamily="34" charset="0"/>
+              <a:buChar char="•"/>
+              <a:defRPr sz="2800" kern="1200">
+                <a:solidFill>
+                  <a:schemeClr val="tx1"/>
+                </a:solidFill>
+                <a:latin typeface="+mn-lt"/>
+                <a:ea typeface="+mn-ea"/>
+                <a:cs typeface="+mn-cs"/>
+              </a:defRPr>
+            </a:lvl1pPr>
+            <a:lvl2pPr marL="685800" indent="-228600" algn="l" defTabSz="914400" rtl="0" eaLnBrk="1" latinLnBrk="0" hangingPunct="1">
+              <a:lnSpc>
+                <a:spcPct val="90000"/>
+              </a:lnSpc>
+              <a:spcBef>
+                <a:spcPts val="500"/>
+              </a:spcBef>
+              <a:buFont typeface="Arial" panose="020B0604020202020204" pitchFamily="34" charset="0"/>
+              <a:buChar char="•"/>
+              <a:defRPr sz="2400" kern="1200">
+                <a:solidFill>
+                  <a:schemeClr val="tx1"/>
+                </a:solidFill>
+                <a:latin typeface="+mn-lt"/>
+                <a:ea typeface="+mn-ea"/>
+                <a:cs typeface="+mn-cs"/>
+              </a:defRPr>
+            </a:lvl2pPr>
+            <a:lvl3pPr marL="1143000" indent="-228600" algn="l" defTabSz="914400" rtl="0" eaLnBrk="1" latinLnBrk="0" hangingPunct="1">
+              <a:lnSpc>
+                <a:spcPct val="90000"/>
+              </a:lnSpc>
+              <a:spcBef>
+                <a:spcPts val="500"/>
+              </a:spcBef>
+              <a:buFont typeface="Arial" panose="020B0604020202020204" pitchFamily="34" charset="0"/>
+              <a:buChar char="•"/>
+              <a:defRPr sz="2000" kern="1200">
+                <a:solidFill>
+                  <a:schemeClr val="tx1"/>
+                </a:solidFill>
+                <a:latin typeface="+mn-lt"/>
+                <a:ea typeface="+mn-ea"/>
+                <a:cs typeface="+mn-cs"/>
+              </a:defRPr>
+            </a:lvl3pPr>
+            <a:lvl4pPr marL="1600200" indent="-228600" algn="l" defTabSz="914400" rtl="0" eaLnBrk="1" latinLnBrk="0" hangingPunct="1">
+              <a:lnSpc>
+                <a:spcPct val="90000"/>
+              </a:lnSpc>
+              <a:spcBef>
+                <a:spcPts val="500"/>
+              </a:spcBef>
+              <a:buFont typeface="Arial" panose="020B0604020202020204" pitchFamily="34" charset="0"/>
+              <a:buChar char="•"/>
+              <a:defRPr sz="1800" kern="1200">
+                <a:solidFill>
+                  <a:schemeClr val="tx1"/>
+                </a:solidFill>
+                <a:latin typeface="+mn-lt"/>
+                <a:ea typeface="+mn-ea"/>
+                <a:cs typeface="+mn-cs"/>
+              </a:defRPr>
+            </a:lvl4pPr>
+            <a:lvl5pPr marL="2057400" indent="-228600" algn="l" defTabSz="914400" rtl="0" eaLnBrk="1" latinLnBrk="0" hangingPunct="1">
+              <a:lnSpc>
+                <a:spcPct val="90000"/>
+              </a:lnSpc>
+              <a:spcBef>
+                <a:spcPts val="500"/>
+              </a:spcBef>
+              <a:buFont typeface="Arial" panose="020B0604020202020204" pitchFamily="34" charset="0"/>
+              <a:buChar char="•"/>
+              <a:defRPr sz="1800" kern="1200">
+                <a:solidFill>
+                  <a:schemeClr val="tx1"/>
+                </a:solidFill>
+                <a:latin typeface="+mn-lt"/>
+                <a:ea typeface="+mn-ea"/>
+                <a:cs typeface="+mn-cs"/>
+              </a:defRPr>
+            </a:lvl5pPr>
+            <a:lvl6pPr marL="2514600" indent="-228600" algn="l" defTabSz="914400" rtl="0" eaLnBrk="1" latinLnBrk="0" hangingPunct="1">
+              <a:lnSpc>
+                <a:spcPct val="90000"/>
+              </a:lnSpc>
+              <a:spcBef>
+                <a:spcPts val="500"/>
+              </a:spcBef>
+              <a:buFont typeface="Arial" panose="020B0604020202020204" pitchFamily="34" charset="0"/>
+              <a:buChar char="•"/>
+              <a:defRPr sz="1800" kern="1200">
+                <a:solidFill>
+                  <a:schemeClr val="tx1"/>
+                </a:solidFill>
+                <a:latin typeface="+mn-lt"/>
+                <a:ea typeface="+mn-ea"/>
+                <a:cs typeface="+mn-cs"/>
+              </a:defRPr>
+            </a:lvl6pPr>
+            <a:lvl7pPr marL="2971800" indent="-228600" algn="l" defTabSz="914400" rtl="0" eaLnBrk="1" latinLnBrk="0" hangingPunct="1">
+              <a:lnSpc>
+                <a:spcPct val="90000"/>
+              </a:lnSpc>
+              <a:spcBef>
+                <a:spcPts val="500"/>
+              </a:spcBef>
+              <a:buFont typeface="Arial" panose="020B0604020202020204" pitchFamily="34" charset="0"/>
+              <a:buChar char="•"/>
+              <a:defRPr sz="1800" kern="1200">
+                <a:solidFill>
+                  <a:schemeClr val="tx1"/>
+                </a:solidFill>
+                <a:latin typeface="+mn-lt"/>
+                <a:ea typeface="+mn-ea"/>
+                <a:cs typeface="+mn-cs"/>
+              </a:defRPr>
+            </a:lvl7pPr>
+            <a:lvl8pPr marL="3429000" indent="-228600" algn="l" defTabSz="914400" rtl="0" eaLnBrk="1" latinLnBrk="0" hangingPunct="1">
+              <a:lnSpc>
+                <a:spcPct val="90000"/>
+              </a:lnSpc>
+              <a:spcBef>
+                <a:spcPts val="500"/>
+              </a:spcBef>
+              <a:buFont typeface="Arial" panose="020B0604020202020204" pitchFamily="34" charset="0"/>
+              <a:buChar char="•"/>
+              <a:defRPr sz="1800" kern="1200">
+                <a:solidFill>
+                  <a:schemeClr val="tx1"/>
+                </a:solidFill>
+                <a:latin typeface="+mn-lt"/>
+                <a:ea typeface="+mn-ea"/>
+                <a:cs typeface="+mn-cs"/>
+              </a:defRPr>
+            </a:lvl8pPr>
+            <a:lvl9pPr marL="3886200" indent="-228600" algn="l" defTabSz="914400" rtl="0" eaLnBrk="1" latinLnBrk="0" hangingPunct="1">
+              <a:lnSpc>
+                <a:spcPct val="90000"/>
+              </a:lnSpc>
+              <a:spcBef>
+                <a:spcPts val="500"/>
+              </a:spcBef>
+              <a:buFont typeface="Arial" panose="020B0604020202020204" pitchFamily="34" charset="0"/>
+              <a:buChar char="•"/>
+              <a:defRPr sz="1800" kern="1200">
+                <a:solidFill>
+                  <a:schemeClr val="tx1"/>
+                </a:solidFill>
+                <a:latin typeface="+mn-lt"/>
+                <a:ea typeface="+mn-ea"/>
+                <a:cs typeface="+mn-cs"/>
+              </a:defRPr>
+            </a:lvl9pPr>
+          </a:lstStyle>
+          <a:p>
+            <a:r>
+              <a:rPr lang="fr-FR" sz="2000" dirty="0" err="1" smtClean="0"/>
+              <a:t>GitKraken</a:t>
+            </a:r>
+            <a:endParaRPr lang="fr-FR" sz="2000" dirty="0"/>
+          </a:p>
+          <a:p>
+            <a:pPr marL="0" indent="0">
+              <a:buNone/>
+            </a:pPr>
+            <a:endParaRPr lang="fr-FR" sz="2000" dirty="0"/>
+          </a:p>
+          <a:p>
+            <a:r>
+              <a:rPr lang="fr-FR" sz="2000" dirty="0" smtClean="0"/>
+              <a:t>R </a:t>
+            </a:r>
+            <a:r>
+              <a:rPr lang="fr-FR" sz="2000" dirty="0" err="1" smtClean="0"/>
+              <a:t>statistical</a:t>
+            </a:r>
+            <a:r>
+              <a:rPr lang="fr-FR" sz="2000" dirty="0" smtClean="0"/>
+              <a:t> </a:t>
+            </a:r>
+            <a:r>
+              <a:rPr lang="fr-FR" sz="2000" dirty="0" err="1" smtClean="0"/>
+              <a:t>programming</a:t>
+            </a:r>
+            <a:endParaRPr lang="fr-FR" sz="2000" dirty="0"/>
+          </a:p>
+          <a:p>
+            <a:endParaRPr lang="fr-FR" sz="2000" dirty="0"/>
+          </a:p>
+          <a:p>
+            <a:r>
+              <a:rPr lang="fr-FR" sz="2000" dirty="0" err="1" smtClean="0"/>
+              <a:t>Nuxit</a:t>
+            </a:r>
+            <a:r>
+              <a:rPr lang="fr-FR" sz="2000" dirty="0" smtClean="0"/>
+              <a:t> </a:t>
+            </a:r>
+            <a:r>
+              <a:rPr lang="fr-FR" sz="2000" dirty="0" err="1" smtClean="0"/>
+              <a:t>environment</a:t>
+            </a:r>
+            <a:endParaRPr lang="fr-FR" sz="2000" dirty="0" smtClean="0"/>
+          </a:p>
+          <a:p>
+            <a:endParaRPr lang="fr-FR" sz="2000" dirty="0"/>
+          </a:p>
+          <a:p>
+            <a:r>
+              <a:rPr lang="fr-FR" sz="2000" dirty="0" smtClean="0"/>
+              <a:t>Web design</a:t>
+            </a:r>
+            <a:endParaRPr lang="fr-FR" sz="2000" dirty="0"/>
+          </a:p>
+          <a:p>
+            <a:pPr marL="0" indent="0" algn="just">
+              <a:buFont typeface="Arial" panose="020B0604020202020204" pitchFamily="34" charset="0"/>
+              <a:buNone/>
+            </a:pPr>
+            <a:endParaRPr lang="fr-FR" sz="2000" dirty="0"/>
+          </a:p>
+        </p:txBody>
+      </p:sp>
     </p:spTree>
     <p:extLst>
       <p:ext uri="{BB962C8B-B14F-4D97-AF65-F5344CB8AC3E}">

</xml_diff>

<commit_message>
Added project specifications (cahiers des charges) to presentation
</commit_message>
<xml_diff>
--- a/Slides/Soutenance_Final.pptx
+++ b/Slides/Soutenance_Final.pptx
@@ -4149,21 +4149,21 @@
     </dgm:pt>
   </dgm:ptLst>
   <dgm:cxnLst>
+    <dgm:cxn modelId="{BFE5F03E-99EE-488D-A25F-FA4A305398F3}" type="presOf" srcId="{EEB7DF95-B1E1-4355-BDED-67254F3A40BF}" destId="{156A4B50-5EBB-4BD2-8AF0-C722439DBC8D}" srcOrd="0" destOrd="0" presId="urn:microsoft.com/office/officeart/2005/8/layout/radial1"/>
     <dgm:cxn modelId="{CE2AF7AB-2949-4DCD-9C29-6B60E91D8468}" srcId="{0916D3E2-7950-4B1E-A80A-B1A0DFE4D7BE}" destId="{B8F4B4B5-48BB-4436-A4C8-0772D59377AC}" srcOrd="2" destOrd="0" parTransId="{EEB7DF95-B1E1-4355-BDED-67254F3A40BF}" sibTransId="{07F8EC93-687D-4C25-BBFA-77894EDF7DA2}"/>
+    <dgm:cxn modelId="{2D7DE33D-C3DB-49E5-ADF6-52C214CF1C59}" srcId="{0916D3E2-7950-4B1E-A80A-B1A0DFE4D7BE}" destId="{7F397B27-ED42-4C0B-84EB-F42483A443DB}" srcOrd="1" destOrd="0" parTransId="{DD81B84C-4525-4615-9233-87E402AFBABC}" sibTransId="{97EBF3C2-DAC2-40A4-AE80-264E3F21FCCC}"/>
+    <dgm:cxn modelId="{7470EB8E-365B-4C7B-B345-F3A82F2BDE86}" type="presOf" srcId="{EEB7DF95-B1E1-4355-BDED-67254F3A40BF}" destId="{0FA48441-B5ED-464B-AB5B-44DAB679EE64}" srcOrd="1" destOrd="0" presId="urn:microsoft.com/office/officeart/2005/8/layout/radial1"/>
     <dgm:cxn modelId="{D7CE5B38-4681-488A-875C-5BC6D4608B17}" type="presOf" srcId="{B8F4B4B5-48BB-4436-A4C8-0772D59377AC}" destId="{B8775ABA-3037-409F-B1F5-5479D38AC897}" srcOrd="0" destOrd="0" presId="urn:microsoft.com/office/officeart/2005/8/layout/radial1"/>
+    <dgm:cxn modelId="{A9B36F8A-C74B-47A9-B539-806F6BB77A1A}" srcId="{CC293B1C-4CF8-4FF0-BBC7-4942ED2D7F88}" destId="{0916D3E2-7950-4B1E-A80A-B1A0DFE4D7BE}" srcOrd="0" destOrd="0" parTransId="{78ED7DF1-7D14-4D64-A8E3-CBD6C30B03FB}" sibTransId="{402F8436-663D-4DB8-A22F-0A8F501EB425}"/>
+    <dgm:cxn modelId="{4F76CFC7-AC86-4FD6-BD3B-3B31C6A8EDDA}" type="presOf" srcId="{F26E0BCB-616E-4F5C-9212-B89461307743}" destId="{FB6E935B-AB56-4686-BAF4-89171D311D48}" srcOrd="0" destOrd="0" presId="urn:microsoft.com/office/officeart/2005/8/layout/radial1"/>
+    <dgm:cxn modelId="{53089D63-12EB-40F9-92A2-F39B07E20E6B}" type="presOf" srcId="{0916D3E2-7950-4B1E-A80A-B1A0DFE4D7BE}" destId="{334F0DA9-4D69-40E7-AE37-8BB2E71C3ACD}" srcOrd="0" destOrd="0" presId="urn:microsoft.com/office/officeart/2005/8/layout/radial1"/>
+    <dgm:cxn modelId="{2E6F4476-BF79-4C90-823B-71099E5FD8D3}" type="presOf" srcId="{DD81B84C-4525-4615-9233-87E402AFBABC}" destId="{9CD455AE-EC69-44E0-B929-B59BCD7E9894}" srcOrd="1" destOrd="0" presId="urn:microsoft.com/office/officeart/2005/8/layout/radial1"/>
+    <dgm:cxn modelId="{6037BACF-1495-4D63-973A-E9906686C9EC}" type="presOf" srcId="{9B35DA45-8824-4EE3-89F0-3F4E07F980E3}" destId="{51D4E2D9-6364-4FE7-BE7F-89898165258A}" srcOrd="0" destOrd="0" presId="urn:microsoft.com/office/officeart/2005/8/layout/radial1"/>
+    <dgm:cxn modelId="{4E83842D-6898-45A2-8C76-AC263926CE66}" type="presOf" srcId="{CC293B1C-4CF8-4FF0-BBC7-4942ED2D7F88}" destId="{05AAFE4B-4748-4F9C-AA5B-DEC71FC73E20}" srcOrd="0" destOrd="0" presId="urn:microsoft.com/office/officeart/2005/8/layout/radial1"/>
+    <dgm:cxn modelId="{EE79DC2E-EE32-4B0A-ADFD-E11D61A99647}" type="presOf" srcId="{DD81B84C-4525-4615-9233-87E402AFBABC}" destId="{3134C74D-D45F-4D44-8DA9-5DD9ACC7028A}" srcOrd="0" destOrd="0" presId="urn:microsoft.com/office/officeart/2005/8/layout/radial1"/>
     <dgm:cxn modelId="{08978BA1-AE5A-4DFF-A0C3-92D4A0078A98}" srcId="{0916D3E2-7950-4B1E-A80A-B1A0DFE4D7BE}" destId="{9B35DA45-8824-4EE3-89F0-3F4E07F980E3}" srcOrd="0" destOrd="0" parTransId="{F26E0BCB-616E-4F5C-9212-B89461307743}" sibTransId="{6FFF208B-A136-4388-9736-DE2BA4AFD5AF}"/>
+    <dgm:cxn modelId="{1173F0C1-237A-44C5-81A9-6289AFEB7E80}" type="presOf" srcId="{7F397B27-ED42-4C0B-84EB-F42483A443DB}" destId="{FC75532D-1A75-4D81-A458-80C91B398F9D}" srcOrd="0" destOrd="0" presId="urn:microsoft.com/office/officeart/2005/8/layout/radial1"/>
     <dgm:cxn modelId="{8C318C29-2BA6-4073-9DC3-993B41DBBD97}" type="presOf" srcId="{F26E0BCB-616E-4F5C-9212-B89461307743}" destId="{B26CA117-7877-4BBB-8697-7BAA6B4D1769}" srcOrd="1" destOrd="0" presId="urn:microsoft.com/office/officeart/2005/8/layout/radial1"/>
-    <dgm:cxn modelId="{BFE5F03E-99EE-488D-A25F-FA4A305398F3}" type="presOf" srcId="{EEB7DF95-B1E1-4355-BDED-67254F3A40BF}" destId="{156A4B50-5EBB-4BD2-8AF0-C722439DBC8D}" srcOrd="0" destOrd="0" presId="urn:microsoft.com/office/officeart/2005/8/layout/radial1"/>
-    <dgm:cxn modelId="{4F76CFC7-AC86-4FD6-BD3B-3B31C6A8EDDA}" type="presOf" srcId="{F26E0BCB-616E-4F5C-9212-B89461307743}" destId="{FB6E935B-AB56-4686-BAF4-89171D311D48}" srcOrd="0" destOrd="0" presId="urn:microsoft.com/office/officeart/2005/8/layout/radial1"/>
-    <dgm:cxn modelId="{7470EB8E-365B-4C7B-B345-F3A82F2BDE86}" type="presOf" srcId="{EEB7DF95-B1E1-4355-BDED-67254F3A40BF}" destId="{0FA48441-B5ED-464B-AB5B-44DAB679EE64}" srcOrd="1" destOrd="0" presId="urn:microsoft.com/office/officeart/2005/8/layout/radial1"/>
-    <dgm:cxn modelId="{2E6F4476-BF79-4C90-823B-71099E5FD8D3}" type="presOf" srcId="{DD81B84C-4525-4615-9233-87E402AFBABC}" destId="{9CD455AE-EC69-44E0-B929-B59BCD7E9894}" srcOrd="1" destOrd="0" presId="urn:microsoft.com/office/officeart/2005/8/layout/radial1"/>
-    <dgm:cxn modelId="{2D7DE33D-C3DB-49E5-ADF6-52C214CF1C59}" srcId="{0916D3E2-7950-4B1E-A80A-B1A0DFE4D7BE}" destId="{7F397B27-ED42-4C0B-84EB-F42483A443DB}" srcOrd="1" destOrd="0" parTransId="{DD81B84C-4525-4615-9233-87E402AFBABC}" sibTransId="{97EBF3C2-DAC2-40A4-AE80-264E3F21FCCC}"/>
-    <dgm:cxn modelId="{A9B36F8A-C74B-47A9-B539-806F6BB77A1A}" srcId="{CC293B1C-4CF8-4FF0-BBC7-4942ED2D7F88}" destId="{0916D3E2-7950-4B1E-A80A-B1A0DFE4D7BE}" srcOrd="0" destOrd="0" parTransId="{78ED7DF1-7D14-4D64-A8E3-CBD6C30B03FB}" sibTransId="{402F8436-663D-4DB8-A22F-0A8F501EB425}"/>
-    <dgm:cxn modelId="{4E83842D-6898-45A2-8C76-AC263926CE66}" type="presOf" srcId="{CC293B1C-4CF8-4FF0-BBC7-4942ED2D7F88}" destId="{05AAFE4B-4748-4F9C-AA5B-DEC71FC73E20}" srcOrd="0" destOrd="0" presId="urn:microsoft.com/office/officeart/2005/8/layout/radial1"/>
-    <dgm:cxn modelId="{53089D63-12EB-40F9-92A2-F39B07E20E6B}" type="presOf" srcId="{0916D3E2-7950-4B1E-A80A-B1A0DFE4D7BE}" destId="{334F0DA9-4D69-40E7-AE37-8BB2E71C3ACD}" srcOrd="0" destOrd="0" presId="urn:microsoft.com/office/officeart/2005/8/layout/radial1"/>
-    <dgm:cxn modelId="{EE79DC2E-EE32-4B0A-ADFD-E11D61A99647}" type="presOf" srcId="{DD81B84C-4525-4615-9233-87E402AFBABC}" destId="{3134C74D-D45F-4D44-8DA9-5DD9ACC7028A}" srcOrd="0" destOrd="0" presId="urn:microsoft.com/office/officeart/2005/8/layout/radial1"/>
-    <dgm:cxn modelId="{1173F0C1-237A-44C5-81A9-6289AFEB7E80}" type="presOf" srcId="{7F397B27-ED42-4C0B-84EB-F42483A443DB}" destId="{FC75532D-1A75-4D81-A458-80C91B398F9D}" srcOrd="0" destOrd="0" presId="urn:microsoft.com/office/officeart/2005/8/layout/radial1"/>
-    <dgm:cxn modelId="{6037BACF-1495-4D63-973A-E9906686C9EC}" type="presOf" srcId="{9B35DA45-8824-4EE3-89F0-3F4E07F980E3}" destId="{51D4E2D9-6364-4FE7-BE7F-89898165258A}" srcOrd="0" destOrd="0" presId="urn:microsoft.com/office/officeart/2005/8/layout/radial1"/>
     <dgm:cxn modelId="{772C3BB5-DF35-42DE-A439-0DCB31D63FB8}" type="presParOf" srcId="{05AAFE4B-4748-4F9C-AA5B-DEC71FC73E20}" destId="{334F0DA9-4D69-40E7-AE37-8BB2E71C3ACD}" srcOrd="0" destOrd="0" presId="urn:microsoft.com/office/officeart/2005/8/layout/radial1"/>
     <dgm:cxn modelId="{20FC6565-C496-4E94-8CCE-904149940058}" type="presParOf" srcId="{05AAFE4B-4748-4F9C-AA5B-DEC71FC73E20}" destId="{FB6E935B-AB56-4686-BAF4-89171D311D48}" srcOrd="1" destOrd="0" presId="urn:microsoft.com/office/officeart/2005/8/layout/radial1"/>
     <dgm:cxn modelId="{1BDA0C39-DB3E-4726-AC03-ECA79335B44E}" type="presParOf" srcId="{FB6E935B-AB56-4686-BAF4-89171D311D48}" destId="{B26CA117-7877-4BBB-8697-7BAA6B4D1769}" srcOrd="0" destOrd="0" presId="urn:microsoft.com/office/officeart/2005/8/layout/radial1"/>
@@ -4575,22 +4575,22 @@
     </dgm:pt>
   </dgm:ptLst>
   <dgm:cxnLst>
+    <dgm:cxn modelId="{AFAAAFAD-A0DE-47C1-9249-77B5BDE05E36}" type="presOf" srcId="{81607F9D-ACA8-4EBC-97F3-AE620D537126}" destId="{AECDF339-533B-4319-9DD1-FE0312AA5FE7}" srcOrd="0" destOrd="0" presId="urn:microsoft.com/office/officeart/2005/8/layout/hList7"/>
+    <dgm:cxn modelId="{38CD83C8-6796-4198-B7C8-EFF34EC9AA55}" type="presOf" srcId="{BA786E09-868C-446C-BCAD-1B9A337A2314}" destId="{9B6DBF9B-EFA6-45E8-AAE9-1FBCC2922B5E}" srcOrd="0" destOrd="0" presId="urn:microsoft.com/office/officeart/2005/8/layout/hList7"/>
+    <dgm:cxn modelId="{2E016A71-4A74-45F5-AD15-07D3B1D0466D}" srcId="{95C89F30-E4C0-41F0-9F78-CFBA2BC6B6E7}" destId="{47253CFC-4569-4709-81D3-DEEB42841B34}" srcOrd="2" destOrd="0" parTransId="{790D9CA9-D5EB-4ABB-B3FF-C076CA534420}" sibTransId="{2F25E3F7-E9EB-4C08-9116-69D5C4FD6E2A}"/>
+    <dgm:cxn modelId="{F6F9661A-BC21-475D-819D-50626DE6BCFB}" type="presOf" srcId="{2F25E3F7-E9EB-4C08-9116-69D5C4FD6E2A}" destId="{2845AC54-25A9-480C-BA9C-51BB56258253}" srcOrd="0" destOrd="0" presId="urn:microsoft.com/office/officeart/2005/8/layout/hList7"/>
     <dgm:cxn modelId="{C645A4BB-EDB6-4E76-AB82-9AD72E6BF557}" type="presOf" srcId="{BA786E09-868C-446C-BCAD-1B9A337A2314}" destId="{31F77346-6636-44FE-8237-42E5F75F0855}" srcOrd="1" destOrd="0" presId="urn:microsoft.com/office/officeart/2005/8/layout/hList7"/>
+    <dgm:cxn modelId="{194860A3-1900-4650-B671-CEC4587BA924}" type="presOf" srcId="{94CA40FB-60B0-465C-89DE-37B57251E362}" destId="{6A4D6A8E-A18C-499A-84BC-74FED5388C93}" srcOrd="0" destOrd="0" presId="urn:microsoft.com/office/officeart/2005/8/layout/hList7"/>
     <dgm:cxn modelId="{57921F95-0423-45E7-AE0D-672371E39D53}" type="presOf" srcId="{5EE301F9-AA62-4FDD-BBD4-EB5F68D85FEC}" destId="{6B2B5E85-AAEA-413B-89EF-96FC0B61D0DB}" srcOrd="1" destOrd="0" presId="urn:microsoft.com/office/officeart/2005/8/layout/hList7"/>
-    <dgm:cxn modelId="{F6F9661A-BC21-475D-819D-50626DE6BCFB}" type="presOf" srcId="{2F25E3F7-E9EB-4C08-9116-69D5C4FD6E2A}" destId="{2845AC54-25A9-480C-BA9C-51BB56258253}" srcOrd="0" destOrd="0" presId="urn:microsoft.com/office/officeart/2005/8/layout/hList7"/>
+    <dgm:cxn modelId="{4E004507-C92D-4D0B-9DBB-DB4591A9B903}" srcId="{95C89F30-E4C0-41F0-9F78-CFBA2BC6B6E7}" destId="{BA786E09-868C-446C-BCAD-1B9A337A2314}" srcOrd="3" destOrd="0" parTransId="{59BE49D1-A09D-46A0-A218-5983A849445B}" sibTransId="{870FB8E6-A3E1-4439-9131-142A0512FE32}"/>
+    <dgm:cxn modelId="{1AE06204-B328-4A88-90DE-47487907D919}" type="presOf" srcId="{47253CFC-4569-4709-81D3-DEEB42841B34}" destId="{65C1CC62-47DD-4AE0-BB4E-E1AA4210EAD1}" srcOrd="1" destOrd="0" presId="urn:microsoft.com/office/officeart/2005/8/layout/hList7"/>
+    <dgm:cxn modelId="{F309A241-CAAA-4CAA-89A7-3EF413DFED5F}" type="presOf" srcId="{47253CFC-4569-4709-81D3-DEEB42841B34}" destId="{18E220CA-4E07-4273-9F20-D66E44D1CC15}" srcOrd="0" destOrd="0" presId="urn:microsoft.com/office/officeart/2005/8/layout/hList7"/>
+    <dgm:cxn modelId="{E53B2165-E749-413E-9F1A-C9CC76DA6A5C}" srcId="{95C89F30-E4C0-41F0-9F78-CFBA2BC6B6E7}" destId="{5EE301F9-AA62-4FDD-BBD4-EB5F68D85FEC}" srcOrd="0" destOrd="0" parTransId="{752A3FC9-4F42-4B45-864D-D48201C144BC}" sibTransId="{7A2D0BBB-4796-4683-A258-869CCE2EFDEE}"/>
     <dgm:cxn modelId="{CF0035A1-5E18-4F9A-AAAD-C4F8302A689F}" type="presOf" srcId="{81607F9D-ACA8-4EBC-97F3-AE620D537126}" destId="{FCBD48AD-6356-4016-B622-1476036943D2}" srcOrd="1" destOrd="0" presId="urn:microsoft.com/office/officeart/2005/8/layout/hList7"/>
-    <dgm:cxn modelId="{AFAAAFAD-A0DE-47C1-9249-77B5BDE05E36}" type="presOf" srcId="{81607F9D-ACA8-4EBC-97F3-AE620D537126}" destId="{AECDF339-533B-4319-9DD1-FE0312AA5FE7}" srcOrd="0" destOrd="0" presId="urn:microsoft.com/office/officeart/2005/8/layout/hList7"/>
     <dgm:cxn modelId="{BDD1CA52-8007-48A8-B091-1E74889DEE99}" type="presOf" srcId="{95C89F30-E4C0-41F0-9F78-CFBA2BC6B6E7}" destId="{68497B09-3716-4EBD-AC6B-8AE2BDCC8972}" srcOrd="0" destOrd="0" presId="urn:microsoft.com/office/officeart/2005/8/layout/hList7"/>
-    <dgm:cxn modelId="{E53B2165-E749-413E-9F1A-C9CC76DA6A5C}" srcId="{95C89F30-E4C0-41F0-9F78-CFBA2BC6B6E7}" destId="{5EE301F9-AA62-4FDD-BBD4-EB5F68D85FEC}" srcOrd="0" destOrd="0" parTransId="{752A3FC9-4F42-4B45-864D-D48201C144BC}" sibTransId="{7A2D0BBB-4796-4683-A258-869CCE2EFDEE}"/>
     <dgm:cxn modelId="{B6D21F72-7318-4B23-BC86-23B4E85AD610}" type="presOf" srcId="{5EE301F9-AA62-4FDD-BBD4-EB5F68D85FEC}" destId="{90FFEDE6-D24B-46AA-AC61-5A2CA3E513CC}" srcOrd="0" destOrd="0" presId="urn:microsoft.com/office/officeart/2005/8/layout/hList7"/>
     <dgm:cxn modelId="{C503CDFC-F7CF-4B5B-9CB9-D0B888450B80}" srcId="{95C89F30-E4C0-41F0-9F78-CFBA2BC6B6E7}" destId="{81607F9D-ACA8-4EBC-97F3-AE620D537126}" srcOrd="1" destOrd="0" parTransId="{5614C387-4578-47E1-B8ED-4C19C139B6D6}" sibTransId="{94CA40FB-60B0-465C-89DE-37B57251E362}"/>
-    <dgm:cxn modelId="{2E016A71-4A74-45F5-AD15-07D3B1D0466D}" srcId="{95C89F30-E4C0-41F0-9F78-CFBA2BC6B6E7}" destId="{47253CFC-4569-4709-81D3-DEEB42841B34}" srcOrd="2" destOrd="0" parTransId="{790D9CA9-D5EB-4ABB-B3FF-C076CA534420}" sibTransId="{2F25E3F7-E9EB-4C08-9116-69D5C4FD6E2A}"/>
-    <dgm:cxn modelId="{1AE06204-B328-4A88-90DE-47487907D919}" type="presOf" srcId="{47253CFC-4569-4709-81D3-DEEB42841B34}" destId="{65C1CC62-47DD-4AE0-BB4E-E1AA4210EAD1}" srcOrd="1" destOrd="0" presId="urn:microsoft.com/office/officeart/2005/8/layout/hList7"/>
     <dgm:cxn modelId="{2EC55B3D-BFE3-4C06-B5CF-4DA8F00E7DD6}" type="presOf" srcId="{7A2D0BBB-4796-4683-A258-869CCE2EFDEE}" destId="{46B8E31D-92A9-4F7C-AC64-291B22E56C19}" srcOrd="0" destOrd="0" presId="urn:microsoft.com/office/officeart/2005/8/layout/hList7"/>
-    <dgm:cxn modelId="{194860A3-1900-4650-B671-CEC4587BA924}" type="presOf" srcId="{94CA40FB-60B0-465C-89DE-37B57251E362}" destId="{6A4D6A8E-A18C-499A-84BC-74FED5388C93}" srcOrd="0" destOrd="0" presId="urn:microsoft.com/office/officeart/2005/8/layout/hList7"/>
-    <dgm:cxn modelId="{F309A241-CAAA-4CAA-89A7-3EF413DFED5F}" type="presOf" srcId="{47253CFC-4569-4709-81D3-DEEB42841B34}" destId="{18E220CA-4E07-4273-9F20-D66E44D1CC15}" srcOrd="0" destOrd="0" presId="urn:microsoft.com/office/officeart/2005/8/layout/hList7"/>
-    <dgm:cxn modelId="{4E004507-C92D-4D0B-9DBB-DB4591A9B903}" srcId="{95C89F30-E4C0-41F0-9F78-CFBA2BC6B6E7}" destId="{BA786E09-868C-446C-BCAD-1B9A337A2314}" srcOrd="3" destOrd="0" parTransId="{59BE49D1-A09D-46A0-A218-5983A849445B}" sibTransId="{870FB8E6-A3E1-4439-9131-142A0512FE32}"/>
-    <dgm:cxn modelId="{38CD83C8-6796-4198-B7C8-EFF34EC9AA55}" type="presOf" srcId="{BA786E09-868C-446C-BCAD-1B9A337A2314}" destId="{9B6DBF9B-EFA6-45E8-AAE9-1FBCC2922B5E}" srcOrd="0" destOrd="0" presId="urn:microsoft.com/office/officeart/2005/8/layout/hList7"/>
     <dgm:cxn modelId="{4D0448AB-072A-4D18-810D-2383F44A3112}" type="presParOf" srcId="{68497B09-3716-4EBD-AC6B-8AE2BDCC8972}" destId="{5C007895-D27B-4555-8633-C9BBD58A106D}" srcOrd="0" destOrd="0" presId="urn:microsoft.com/office/officeart/2005/8/layout/hList7"/>
     <dgm:cxn modelId="{EB40CABA-D7D8-449B-A3EF-706C96A2B35D}" type="presParOf" srcId="{68497B09-3716-4EBD-AC6B-8AE2BDCC8972}" destId="{851E5CC9-679F-4CF6-B00F-A025B4DEF2B3}" srcOrd="1" destOrd="0" presId="urn:microsoft.com/office/officeart/2005/8/layout/hList7"/>
     <dgm:cxn modelId="{E6D0BBE2-1389-41E3-A561-EB44452418BA}" type="presParOf" srcId="{851E5CC9-679F-4CF6-B00F-A025B4DEF2B3}" destId="{02F5FF00-4C9F-4B29-8EE7-22E5EFD6E9BE}" srcOrd="0" destOrd="0" presId="urn:microsoft.com/office/officeart/2005/8/layout/hList7"/>
@@ -11361,7 +11361,7 @@
           <a:p>
             <a:fld id="{EC83963A-FCD1-4BA3-8F52-F2285ACE2A6A}" type="datetimeFigureOut">
               <a:rPr lang="fr-FR" smtClean="0"/>
-              <a:t>04/02/2020</a:t>
+              <a:t>08/02/2020</a:t>
             </a:fld>
             <a:endParaRPr lang="fr-FR"/>
           </a:p>
@@ -11526,7 +11526,7 @@
           <a:p>
             <a:fld id="{12D3AF9D-FD63-43BA-9EB6-902B12D2DD5D}" type="datetimeFigureOut">
               <a:rPr lang="fr-FR" smtClean="0"/>
-              <a:t>04/02/2020</a:t>
+              <a:t>08/02/2020</a:t>
             </a:fld>
             <a:endParaRPr lang="fr-FR"/>
           </a:p>
@@ -40482,7 +40482,7 @@
         </p:spPr>
         <p:txBody>
           <a:bodyPr>
-            <a:normAutofit/>
+            <a:normAutofit lnSpcReduction="10000"/>
           </a:bodyPr>
           <a:lstStyle>
             <a:lvl1pPr marL="228600" indent="-228600" algn="l" defTabSz="914400" rtl="0" eaLnBrk="1" latinLnBrk="0" hangingPunct="1">
@@ -40649,7 +40649,6 @@
             </a:lvl9pPr>
           </a:lstStyle>
           <a:p>
-            <a:pPr algn="just"/>
             <a:r>
               <a:rPr lang="fr-FR" sz="2000" dirty="0" err="1" smtClean="0"/>
               <a:t>Strong</a:t>
@@ -40670,16 +40669,49 @@
               <a:rPr lang="fr-FR" sz="2000" dirty="0" err="1" smtClean="0"/>
               <a:t>KanBan</a:t>
             </a:r>
+            <a:endParaRPr lang="fr-FR" sz="2000" dirty="0" smtClean="0"/>
+          </a:p>
+          <a:p>
             <a:endParaRPr lang="fr-FR" sz="2000" dirty="0"/>
           </a:p>
           <a:p>
-            <a:pPr marL="0" indent="0" algn="just">
+            <a:r>
+              <a:rPr lang="fr-FR" sz="2000" dirty="0" err="1" smtClean="0"/>
+              <a:t>Established</a:t>
+            </a:r>
+            <a:r>
+              <a:rPr lang="fr-FR" sz="2000" dirty="0" smtClean="0"/>
+              <a:t> </a:t>
+            </a:r>
+            <a:r>
+              <a:rPr lang="fr-FR" sz="2000" dirty="0" err="1" smtClean="0"/>
+              <a:t>project</a:t>
+            </a:r>
+            <a:r>
+              <a:rPr lang="fr-FR" sz="2000" dirty="0" smtClean="0"/>
+              <a:t> </a:t>
+            </a:r>
+            <a:r>
+              <a:rPr lang="fr-FR" sz="2000" dirty="0" err="1" smtClean="0"/>
+              <a:t>specifications</a:t>
+            </a:r>
+            <a:r>
+              <a:rPr lang="fr-FR" sz="2000" dirty="0"/>
+              <a:t> </a:t>
+            </a:r>
+            <a:r>
+              <a:rPr lang="fr-FR" sz="2000" dirty="0" smtClean="0"/>
+              <a:t>(cahiers des charges)</a:t>
+            </a:r>
+            <a:endParaRPr lang="fr-FR" sz="2000" dirty="0"/>
+          </a:p>
+          <a:p>
+            <a:pPr marL="0" indent="0">
               <a:buNone/>
             </a:pPr>
             <a:endParaRPr lang="fr-FR" sz="2000" dirty="0"/>
           </a:p>
           <a:p>
-            <a:pPr algn="just"/>
             <a:r>
               <a:rPr lang="fr-FR" sz="2000" dirty="0" smtClean="0"/>
               <a:t>Meeting </a:t>
@@ -40699,11 +40731,9 @@
             <a:endParaRPr lang="fr-FR" sz="2000" dirty="0"/>
           </a:p>
           <a:p>
-            <a:pPr algn="just"/>
             <a:endParaRPr lang="fr-FR" sz="2000" dirty="0"/>
           </a:p>
           <a:p>
-            <a:pPr algn="just"/>
             <a:r>
               <a:rPr lang="fr-FR" sz="2000" dirty="0" smtClean="0"/>
               <a:t>Close </a:t>
@@ -40731,11 +40761,9 @@
             <a:endParaRPr lang="fr-FR" sz="2000" dirty="0" smtClean="0"/>
           </a:p>
           <a:p>
-            <a:pPr algn="just"/>
             <a:endParaRPr lang="fr-FR" sz="2000" dirty="0"/>
           </a:p>
           <a:p>
-            <a:pPr algn="just"/>
             <a:r>
               <a:rPr lang="fr-FR" sz="2000" dirty="0" err="1" smtClean="0"/>
               <a:t>Independant</a:t>
@@ -40748,23 +40776,6 @@
               <a:rPr lang="fr-FR" sz="2000" dirty="0" err="1" smtClean="0"/>
               <a:t>reactive</a:t>
             </a:r>
-            <a:endParaRPr lang="fr-FR" sz="2000" dirty="0"/>
-          </a:p>
-          <a:p>
-            <a:pPr algn="just"/>
-            <a:endParaRPr lang="fr-FR" sz="2000" dirty="0"/>
-          </a:p>
-          <a:p>
-            <a:pPr marL="0" indent="0" algn="just">
-              <a:buNone/>
-            </a:pPr>
-            <a:endParaRPr lang="fr-FR" sz="2000" dirty="0"/>
-          </a:p>
-          <a:p>
-            <a:pPr marL="0" indent="0" algn="just">
-              <a:buFont typeface="Arial" panose="020B0604020202020204" pitchFamily="34" charset="0"/>
-              <a:buNone/>
-            </a:pPr>
             <a:endParaRPr lang="fr-FR" sz="2000" dirty="0"/>
           </a:p>
         </p:txBody>

</xml_diff>